<commit_message>
added content to deck
</commit_message>
<xml_diff>
--- a/Week2_PeopleAspects/BachmeierNTIM8301-2.pptx
+++ b/Week2_PeopleAspects/BachmeierNTIM8301-2.pptx
@@ -37279,23 +37279,6 @@
           <a:bodyPr/>
           <a:lstStyle/>
           <a:p>
-            <a:pPr marL="0" marR="0" lvl="0" indent="0" algn="l" defTabSz="914400" rtl="0" eaLnBrk="1" fontAlgn="auto" latinLnBrk="0" hangingPunct="1">
-              <a:lnSpc>
-                <a:spcPct val="100000"/>
-              </a:lnSpc>
-              <a:spcBef>
-                <a:spcPts val="0"/>
-              </a:spcBef>
-              <a:spcAft>
-                <a:spcPts val="0"/>
-              </a:spcAft>
-              <a:buClrTx/>
-              <a:buSzTx/>
-              <a:buFontTx/>
-              <a:buNone/>
-              <a:tabLst/>
-              <a:defRPr/>
-            </a:pPr>
             <a:r>
               <a:rPr lang="en-US" sz="1200" kern="1200" dirty="0">
                 <a:solidFill>
@@ -37306,55 +37289,20 @@
                 <a:ea typeface="+mn-ea"/>
                 <a:cs typeface="+mn-cs"/>
               </a:rPr>
-              <a:t>It can be challenging to communicate the criticality of security to a broad organizational audience because too many experts have poorly framed the conversation in the past.  Traditional approaches describe the Internet as being full of Boogiemen, that live in basements dressed in hoodies.  They are sophisticated adversaries that will stop at nothing to exploit your website and exfiltrate the data.  </a:t>
+              <a:t>It can be challenging to communicate the criticality of security to a broad organizational audience because too many experts have poorly framed the conversation in the past.  Traditional approaches describe the Internet as being full of Boogiemen, that live in basements dressed in hoodies (Bruijn &amp; Janssen, 2017).  These sophisticated adversaries will stop at nothing to exploit our websites and exfiltrate the data.  From the employee perspective, this sounds far fetched and reminiscent of a Michael Bay film.   They do not understand why they should care. Admittedly, our data is not attractive, so why would anyone bother to attack us?  Instead, the message should center around the risks that our software and business processes accept, implicitly, and explicitly.  Many risks exist within technology, though a more alarming number originate from the employees  (</a:t>
             </a:r>
-          </a:p>
-          <a:p>
-            <a:pPr marL="0" marR="0" lvl="0" indent="0" algn="l" defTabSz="914400" rtl="0" eaLnBrk="1" fontAlgn="auto" latinLnBrk="0" hangingPunct="1">
-              <a:lnSpc>
-                <a:spcPct val="100000"/>
-              </a:lnSpc>
-              <a:spcBef>
-                <a:spcPts val="0"/>
-              </a:spcBef>
-              <a:spcAft>
-                <a:spcPts val="0"/>
-              </a:spcAft>
-              <a:buClrTx/>
-              <a:buSzTx/>
-              <a:buFontTx/>
-              <a:buNone/>
-              <a:tabLst/>
-              <a:defRPr/>
-            </a:pPr>
-            <a:endParaRPr lang="en-US" sz="1200" kern="1200" dirty="0">
-              <a:solidFill>
-                <a:schemeClr val="tx1"/>
-              </a:solidFill>
-              <a:effectLst/>
-              <a:latin typeface="+mn-lt"/>
-              <a:ea typeface="+mn-ea"/>
-              <a:cs typeface="+mn-cs"/>
-            </a:endParaRPr>
-          </a:p>
-          <a:p>
-            <a:pPr marL="0" marR="0" lvl="0" indent="0" algn="l" defTabSz="914400" rtl="0" eaLnBrk="1" fontAlgn="auto" latinLnBrk="0" hangingPunct="1">
-              <a:lnSpc>
-                <a:spcPct val="100000"/>
-              </a:lnSpc>
-              <a:spcBef>
-                <a:spcPts val="0"/>
-              </a:spcBef>
-              <a:spcAft>
-                <a:spcPts val="0"/>
-              </a:spcAft>
-              <a:buClrTx/>
-              <a:buSzTx/>
-              <a:buFontTx/>
-              <a:buNone/>
-              <a:tabLst/>
-              <a:defRPr/>
-            </a:pPr>
+            <a:r>
+              <a:rPr lang="en-US" sz="1200" kern="1200" dirty="0" err="1">
+                <a:solidFill>
+                  <a:schemeClr val="tx1"/>
+                </a:solidFill>
+                <a:effectLst/>
+                <a:latin typeface="+mn-lt"/>
+                <a:ea typeface="+mn-ea"/>
+                <a:cs typeface="+mn-cs"/>
+              </a:rPr>
+              <a:t>Valiente</a:t>
+            </a:r>
             <a:r>
               <a:rPr lang="en-US" sz="1200" kern="1200" dirty="0">
                 <a:solidFill>
@@ -37365,129 +37313,8 @@
                 <a:ea typeface="+mn-ea"/>
                 <a:cs typeface="+mn-cs"/>
               </a:rPr>
-              <a:t>From the employee perspective, this sounds far fetched premise to a Michael Bay film, and do not understand why they should care. Admittedly, our data is not attractive, so why would anyone bother to attack us?  </a:t>
+              <a:t>, 2017).  The employees have access to customer data, production services, and other sensitive assets.  When they fat-finger a database command, there is a chance of data corruption, and that will require a backup and restore operation.  Fundamentally, conveying these risks results in the awareness and the formation of strategies around both prevention and recovery.  Perhaps more importantly, it addresses the question, “why should I care?”</a:t>
             </a:r>
-          </a:p>
-          <a:p>
-            <a:pPr marL="0" marR="0" lvl="0" indent="0" algn="l" defTabSz="914400" rtl="0" eaLnBrk="1" fontAlgn="auto" latinLnBrk="0" hangingPunct="1">
-              <a:lnSpc>
-                <a:spcPct val="100000"/>
-              </a:lnSpc>
-              <a:spcBef>
-                <a:spcPts val="0"/>
-              </a:spcBef>
-              <a:spcAft>
-                <a:spcPts val="0"/>
-              </a:spcAft>
-              <a:buClrTx/>
-              <a:buSzTx/>
-              <a:buFontTx/>
-              <a:buNone/>
-              <a:tabLst/>
-              <a:defRPr/>
-            </a:pPr>
-            <a:endParaRPr lang="en-US" sz="1200" kern="1200" dirty="0">
-              <a:solidFill>
-                <a:schemeClr val="tx1"/>
-              </a:solidFill>
-              <a:effectLst/>
-              <a:latin typeface="+mn-lt"/>
-              <a:ea typeface="+mn-ea"/>
-              <a:cs typeface="+mn-cs"/>
-            </a:endParaRPr>
-          </a:p>
-          <a:p>
-            <a:pPr marL="0" marR="0" lvl="0" indent="0" algn="l" defTabSz="914400" rtl="0" eaLnBrk="1" fontAlgn="auto" latinLnBrk="0" hangingPunct="1">
-              <a:lnSpc>
-                <a:spcPct val="100000"/>
-              </a:lnSpc>
-              <a:spcBef>
-                <a:spcPts val="0"/>
-              </a:spcBef>
-              <a:spcAft>
-                <a:spcPts val="0"/>
-              </a:spcAft>
-              <a:buClrTx/>
-              <a:buSzTx/>
-              <a:buFontTx/>
-              <a:buNone/>
-              <a:tabLst/>
-              <a:defRPr/>
-            </a:pPr>
-            <a:r>
-              <a:rPr lang="en-US" sz="1200" kern="1200" dirty="0">
-                <a:solidFill>
-                  <a:schemeClr val="tx1"/>
-                </a:solidFill>
-                <a:effectLst/>
-                <a:latin typeface="+mn-lt"/>
-                <a:ea typeface="+mn-ea"/>
-                <a:cs typeface="+mn-cs"/>
-              </a:rPr>
-              <a:t>Instead, the message should center around the risks that our software and business processes implicitly and explicitly accept.  Many risks exist within technology, though a more alarming number originate from the employees.</a:t>
-            </a:r>
-          </a:p>
-          <a:p>
-            <a:pPr marL="0" marR="0" lvl="0" indent="0" algn="l" defTabSz="914400" rtl="0" eaLnBrk="1" fontAlgn="auto" latinLnBrk="0" hangingPunct="1">
-              <a:lnSpc>
-                <a:spcPct val="100000"/>
-              </a:lnSpc>
-              <a:spcBef>
-                <a:spcPts val="0"/>
-              </a:spcBef>
-              <a:spcAft>
-                <a:spcPts val="0"/>
-              </a:spcAft>
-              <a:buClrTx/>
-              <a:buSzTx/>
-              <a:buFontTx/>
-              <a:buNone/>
-              <a:tabLst/>
-              <a:defRPr/>
-            </a:pPr>
-            <a:endParaRPr lang="en-US" sz="1200" kern="1200" dirty="0">
-              <a:solidFill>
-                <a:schemeClr val="tx1"/>
-              </a:solidFill>
-              <a:effectLst/>
-              <a:latin typeface="+mn-lt"/>
-              <a:ea typeface="+mn-ea"/>
-              <a:cs typeface="+mn-cs"/>
-            </a:endParaRPr>
-          </a:p>
-          <a:p>
-            <a:pPr marL="0" marR="0" lvl="0" indent="0" algn="l" defTabSz="914400" rtl="0" eaLnBrk="1" fontAlgn="auto" latinLnBrk="0" hangingPunct="1">
-              <a:lnSpc>
-                <a:spcPct val="100000"/>
-              </a:lnSpc>
-              <a:spcBef>
-                <a:spcPts val="0"/>
-              </a:spcBef>
-              <a:spcAft>
-                <a:spcPts val="0"/>
-              </a:spcAft>
-              <a:buClrTx/>
-              <a:buSzTx/>
-              <a:buFontTx/>
-              <a:buNone/>
-              <a:tabLst/>
-              <a:defRPr/>
-            </a:pPr>
-            <a:r>
-              <a:rPr lang="en-US" sz="1200" kern="1200" dirty="0">
-                <a:solidFill>
-                  <a:schemeClr val="tx1"/>
-                </a:solidFill>
-                <a:effectLst/>
-                <a:latin typeface="+mn-lt"/>
-                <a:ea typeface="+mn-ea"/>
-                <a:cs typeface="+mn-cs"/>
-              </a:rPr>
-              <a:t>The employees have access to customer data, production services, and other sensitive assets.  When they fat-finger a database command, there is a chance of data corruption, and that will require a backup and restore operation.  How we prevent and recover from these negligent incidents, is fundamental to communicating why one should care and how it impacts them.</a:t>
-            </a:r>
-          </a:p>
-          <a:p>
-            <a:endParaRPr lang="en-US" dirty="0"/>
           </a:p>
         </p:txBody>
       </p:sp>
@@ -37581,19 +37408,8 @@
                 <a:ea typeface="+mn-ea"/>
                 <a:cs typeface="+mn-cs"/>
               </a:rPr>
-              <a:t>The notion of a password made sense in the dark ages of MIT mainframes, where a dozen people shared a room-sized computer.  However, as the availability of digit resources has grown, the concept has become outdated.  Not wanting to let a bad idea die, password complexity policies arose requiring symbols and numbers, along with requirements to rotate passwords on a regular cadence.  End-users replied by reusing these secure passwords across multiple sites, doing minor translations such as “o” to “0,” and writing them on post-it notes.  </a:t>
+              <a:t>The notion of a password made sense in the dark ages of MIT mainframes, where a dozen people shared a room-sized computer.  However, as the accessibility of digit resources has grown, the concept has become outdated.  Not wanting to let a bad idea die, password complexity policies arose requiring symbols and numbers, along with requirements to rotate passwords on a regular cadence.  End-users replied by reusing these secure passwords across multiple sites, doing minor translations such as “o” to “0,” and writing them on post-it notes (Hunt, 2019).  The challenge comes from passwords are inherently difficult for humans to remember.  Instead, a security-aware culture should consider using passphrases and short sentences, as these are difficult for computers and easy for humans to remember.  Introducing Multi-Factor Authentication (MFA) protects against credential theft by confirming not only something the user knows but something they have, are, do, and location. In essence, it increases security guarantees through additional dimensions of authenticity (Jonathan et al., 2017).  </a:t>
             </a:r>
-          </a:p>
-          <a:p>
-            <a:endParaRPr lang="en-US" sz="1200" kern="1200" dirty="0">
-              <a:solidFill>
-                <a:schemeClr val="tx1"/>
-              </a:solidFill>
-              <a:effectLst/>
-              <a:latin typeface="+mn-lt"/>
-              <a:ea typeface="+mn-ea"/>
-              <a:cs typeface="+mn-cs"/>
-            </a:endParaRPr>
           </a:p>
           <a:p>
             <a:r>
@@ -37606,21 +37422,20 @@
                 <a:ea typeface="+mn-ea"/>
                 <a:cs typeface="+mn-cs"/>
               </a:rPr>
-              <a:t>The challenge comes from passwords are inherently difficult for humans to remember.  Instead, a security-aware culture should consider using passphrases and short sentences, as these are difficult for computers and easy for humans to remember.  Introducing Multi-Factor Authentication (MFA) protects against credential theft. When the system confirms not only something the user knows but something they have, are, do, and location. It increases security guarantees through additional dimensions of authenticity. </a:t>
+              <a:t>Single Sign-On (SSO) and Open Authentication (OAuth) both remove and create problems for the organization.  On the one hand, having a consistent identity allows the user to remember fewer passwords and centralizes the storage of credentials.  However, these digital identities can accumulate baggage, as we mindlessly click through websites (</a:t>
             </a:r>
-          </a:p>
-          <a:p>
-            <a:endParaRPr lang="en-US" sz="1200" kern="1200" dirty="0">
-              <a:solidFill>
-                <a:schemeClr val="tx1"/>
-              </a:solidFill>
-              <a:effectLst/>
-              <a:latin typeface="+mn-lt"/>
-              <a:ea typeface="+mn-ea"/>
-              <a:cs typeface="+mn-cs"/>
-            </a:endParaRPr>
-          </a:p>
-          <a:p>
+            <a:r>
+              <a:rPr lang="en-US" sz="1200" kern="1200" dirty="0" err="1">
+                <a:solidFill>
+                  <a:schemeClr val="tx1"/>
+                </a:solidFill>
+                <a:effectLst/>
+                <a:latin typeface="+mn-lt"/>
+                <a:ea typeface="+mn-ea"/>
+                <a:cs typeface="+mn-cs"/>
+              </a:rPr>
+              <a:t>Paller</a:t>
+            </a:r>
             <a:r>
               <a:rPr lang="en-US" sz="1200" kern="1200" dirty="0">
                 <a:solidFill>
@@ -37631,36 +37446,8 @@
                 <a:ea typeface="+mn-ea"/>
                 <a:cs typeface="+mn-cs"/>
               </a:rPr>
-              <a:t>Single Sign-On (SSO) and Open Authentication (OAuth) both remove and create problems for the organization.  On the one hand, having a consistent identity allows the user to remember fewer passwords and increase the centralization of credentials.  However, these digital identities can accumulate baggage, as we mindlessly click through websites.  For example, a review of my personal Google account shows that three websites are authorized to access location data.  </a:t>
+              <a:t> et al., 2019).  For example, a review of my personal Google account shows that three websites are authorized to access location data.  From the end-user perspective, these OAuth approval messages are noise that prevents their access to cat articles.  Organizations need to augment training programs with periodic reminders that end-users should review access and periodically trim the fat.</a:t>
             </a:r>
-          </a:p>
-          <a:p>
-            <a:endParaRPr lang="en-US" sz="1200" kern="1200" dirty="0">
-              <a:solidFill>
-                <a:schemeClr val="tx1"/>
-              </a:solidFill>
-              <a:effectLst/>
-              <a:latin typeface="+mn-lt"/>
-              <a:ea typeface="+mn-ea"/>
-              <a:cs typeface="+mn-cs"/>
-            </a:endParaRPr>
-          </a:p>
-          <a:p>
-            <a:r>
-              <a:rPr lang="en-US" sz="1200" kern="1200" dirty="0">
-                <a:solidFill>
-                  <a:schemeClr val="tx1"/>
-                </a:solidFill>
-                <a:effectLst/>
-                <a:latin typeface="+mn-lt"/>
-                <a:ea typeface="+mn-ea"/>
-                <a:cs typeface="+mn-cs"/>
-              </a:rPr>
-              <a:t>From the end-user perspective, these OAuth approval messages are more noise that is getting in the way of reading this cat article.  Perhaps they should be a national review of our OAuth Day.  However, until then, training and communication about the impact of these decisions need to take place.</a:t>
-            </a:r>
-          </a:p>
-          <a:p>
-            <a:endParaRPr lang="en-US" dirty="0"/>
           </a:p>
         </p:txBody>
       </p:sp>
@@ -37744,23 +37531,6 @@
           <a:bodyPr/>
           <a:lstStyle/>
           <a:p>
-            <a:pPr marL="0" marR="0" lvl="0" indent="0" algn="l" defTabSz="914400" rtl="0" eaLnBrk="1" fontAlgn="auto" latinLnBrk="0" hangingPunct="1">
-              <a:lnSpc>
-                <a:spcPct val="100000"/>
-              </a:lnSpc>
-              <a:spcBef>
-                <a:spcPts val="0"/>
-              </a:spcBef>
-              <a:spcAft>
-                <a:spcPts val="0"/>
-              </a:spcAft>
-              <a:buClrTx/>
-              <a:buSzTx/>
-              <a:buFontTx/>
-              <a:buNone/>
-              <a:tabLst/>
-              <a:defRPr/>
-            </a:pPr>
             <a:r>
               <a:rPr lang="en-US" sz="1200" kern="1200" dirty="0">
                 <a:solidFill>
@@ -37771,7 +37541,7 @@
                 <a:ea typeface="+mn-ea"/>
                 <a:cs typeface="+mn-cs"/>
               </a:rPr>
-              <a:t>Mobile apps can accumulate dangerous levels of access to our devices.  Like the OAuth approval messages, users do not understand what these mean, why would a flashlight app be malicious?  While many of these apps are </a:t>
+              <a:t>Mobile apps can accumulate dangerous levels of access to our devices.  Like the OAuth approval messages, users do not understand what these mean or how could a flashlight app be malicious (Hunt, 2019)?  While many of these apps are </a:t>
             </a:r>
             <a:r>
               <a:rPr lang="en-US" sz="1200" kern="1200" dirty="0" err="1">
@@ -37795,55 +37565,20 @@
                 <a:ea typeface="+mn-ea"/>
                 <a:cs typeface="+mn-cs"/>
               </a:rPr>
-              <a:t>, others are trojan horses that will exfiltrate our contacts and other personal information.  This scenario is particularly concerning since many professionals also keep emails and sensitive documentation on the device.  Some IT departments even allow Virtual Private Network (VPN) connections, creating a direct route from the Google Play store to the back office.  Yikes.  </a:t>
+              <a:t>, others are trojan horses that will exfiltrate our contacts and other personal information.  This scenario is particularly concerning since many professionals also keep emails and sensitive documentation on personal devices.  Some IT departments even allow device Virtual Private Network (VPN) connections, creating a direct route from the Google </a:t>
             </a:r>
-          </a:p>
-          <a:p>
-            <a:pPr marL="0" marR="0" lvl="0" indent="0" algn="l" defTabSz="914400" rtl="0" eaLnBrk="1" fontAlgn="auto" latinLnBrk="0" hangingPunct="1">
-              <a:lnSpc>
-                <a:spcPct val="100000"/>
-              </a:lnSpc>
-              <a:spcBef>
-                <a:spcPts val="0"/>
-              </a:spcBef>
-              <a:spcAft>
-                <a:spcPts val="0"/>
-              </a:spcAft>
-              <a:buClrTx/>
-              <a:buSzTx/>
-              <a:buFontTx/>
-              <a:buNone/>
-              <a:tabLst/>
-              <a:defRPr/>
-            </a:pPr>
-            <a:endParaRPr lang="en-US" sz="1200" kern="1200" dirty="0">
-              <a:solidFill>
-                <a:schemeClr val="tx1"/>
-              </a:solidFill>
-              <a:effectLst/>
-              <a:latin typeface="+mn-lt"/>
-              <a:ea typeface="+mn-ea"/>
-              <a:cs typeface="+mn-cs"/>
-            </a:endParaRPr>
-          </a:p>
-          <a:p>
-            <a:pPr marL="0" marR="0" lvl="0" indent="0" algn="l" defTabSz="914400" rtl="0" eaLnBrk="1" fontAlgn="auto" latinLnBrk="0" hangingPunct="1">
-              <a:lnSpc>
-                <a:spcPct val="100000"/>
-              </a:lnSpc>
-              <a:spcBef>
-                <a:spcPts val="0"/>
-              </a:spcBef>
-              <a:spcAft>
-                <a:spcPts val="0"/>
-              </a:spcAft>
-              <a:buClrTx/>
-              <a:buSzTx/>
-              <a:buFontTx/>
-              <a:buNone/>
-              <a:tabLst/>
-              <a:defRPr/>
-            </a:pPr>
+            <a:r>
+              <a:rPr lang="en-US" sz="1200" kern="1200" dirty="0" err="1">
+                <a:solidFill>
+                  <a:schemeClr val="tx1"/>
+                </a:solidFill>
+                <a:effectLst/>
+                <a:latin typeface="+mn-lt"/>
+                <a:ea typeface="+mn-ea"/>
+                <a:cs typeface="+mn-cs"/>
+              </a:rPr>
+              <a:t>Playstore</a:t>
+            </a:r>
             <a:r>
               <a:rPr lang="en-US" sz="1200" kern="1200" dirty="0">
                 <a:solidFill>
@@ -37854,7 +37589,7 @@
                 <a:ea typeface="+mn-ea"/>
                 <a:cs typeface="+mn-cs"/>
               </a:rPr>
-              <a:t>Network security policies need to be skeptical of these devices and quarantine what they can access, but this only addresses half the puzzle.  The rest comes back to training and awareness that </a:t>
+              <a:t> to the back office.  Yikes.  Network security policies need to be skeptical of these devices and quarantine what they can access, but this only addresses half the puzzle.  The rest comes back to training and awareness that </a:t>
             </a:r>
             <a:r>
               <a:rPr lang="en-US" sz="1200" i="1" kern="1200" dirty="0">
@@ -37902,70 +37637,8 @@
                 <a:ea typeface="+mn-ea"/>
                 <a:cs typeface="+mn-cs"/>
               </a:rPr>
-              <a:t> data do not mix.  </a:t>
+              <a:t> data do not mix.  Patch management plays a vital aspect in preventing malicious automation from attacking our devices.  There needs to be repeated guidance that team members apply patches promptly.  Despite the relative simplicity of weaponizing a patch, users do not understand the risks and see it as an inconvenience.  As in many related scenarios, when security competes with convenience, there is natural friction that requires additional attention.</a:t>
             </a:r>
-          </a:p>
-          <a:p>
-            <a:pPr marL="0" marR="0" lvl="0" indent="0" algn="l" defTabSz="914400" rtl="0" eaLnBrk="1" fontAlgn="auto" latinLnBrk="0" hangingPunct="1">
-              <a:lnSpc>
-                <a:spcPct val="100000"/>
-              </a:lnSpc>
-              <a:spcBef>
-                <a:spcPts val="0"/>
-              </a:spcBef>
-              <a:spcAft>
-                <a:spcPts val="0"/>
-              </a:spcAft>
-              <a:buClrTx/>
-              <a:buSzTx/>
-              <a:buFontTx/>
-              <a:buNone/>
-              <a:tabLst/>
-              <a:defRPr/>
-            </a:pPr>
-            <a:endParaRPr lang="en-US" sz="1200" kern="1200" dirty="0">
-              <a:solidFill>
-                <a:schemeClr val="tx1"/>
-              </a:solidFill>
-              <a:effectLst/>
-              <a:latin typeface="+mn-lt"/>
-              <a:ea typeface="+mn-ea"/>
-              <a:cs typeface="+mn-cs"/>
-            </a:endParaRPr>
-          </a:p>
-          <a:p>
-            <a:pPr marL="0" marR="0" lvl="0" indent="0" algn="l" defTabSz="914400" rtl="0" eaLnBrk="1" fontAlgn="auto" latinLnBrk="0" hangingPunct="1">
-              <a:lnSpc>
-                <a:spcPct val="100000"/>
-              </a:lnSpc>
-              <a:spcBef>
-                <a:spcPts val="0"/>
-              </a:spcBef>
-              <a:spcAft>
-                <a:spcPts val="0"/>
-              </a:spcAft>
-              <a:buClrTx/>
-              <a:buSzTx/>
-              <a:buFontTx/>
-              <a:buNone/>
-              <a:tabLst/>
-              <a:defRPr/>
-            </a:pPr>
-            <a:r>
-              <a:rPr lang="en-US" sz="1200" kern="1200" dirty="0">
-                <a:solidFill>
-                  <a:schemeClr val="tx1"/>
-                </a:solidFill>
-                <a:effectLst/>
-                <a:latin typeface="+mn-lt"/>
-                <a:ea typeface="+mn-ea"/>
-                <a:cs typeface="+mn-cs"/>
-              </a:rPr>
-              <a:t>Patch management plays a vital aspect in preventing malicious automation from attacking our devices.  There needs to be repeated guidance to apply patches promptly.  Despite the relative simplicity of weaponizing a patch, users do not understand the risks and see it as an inconvenience.  As in many related scenarios, when security competes with convenience, there is natural friction that requires additional attention.</a:t>
-            </a:r>
-          </a:p>
-          <a:p>
-            <a:endParaRPr lang="en-US" dirty="0"/>
           </a:p>
         </p:txBody>
       </p:sp>
@@ -38049,23 +37722,6 @@
           <a:bodyPr/>
           <a:lstStyle/>
           <a:p>
-            <a:pPr marL="0" marR="0" lvl="0" indent="0" algn="l" defTabSz="914400" rtl="0" eaLnBrk="1" fontAlgn="auto" latinLnBrk="0" hangingPunct="1">
-              <a:lnSpc>
-                <a:spcPct val="100000"/>
-              </a:lnSpc>
-              <a:spcBef>
-                <a:spcPts val="0"/>
-              </a:spcBef>
-              <a:spcAft>
-                <a:spcPts val="0"/>
-              </a:spcAft>
-              <a:buClrTx/>
-              <a:buSzTx/>
-              <a:buFontTx/>
-              <a:buNone/>
-              <a:tabLst/>
-              <a:defRPr/>
-            </a:pPr>
             <a:r>
               <a:rPr lang="en-US" sz="1200" kern="1200" dirty="0">
                 <a:solidFill>
@@ -38076,70 +37732,8 @@
                 <a:ea typeface="+mn-ea"/>
                 <a:cs typeface="+mn-cs"/>
               </a:rPr>
-              <a:t>Users interact with spoofed resources through cold-calling or name squatting scenarios, such as forged emails or netflix.com.evil.com.  Previous security messages tell the user to look for details, like misspellings, as evidence of being fake.  However, this implicitly implies that perfect grammar infers being real.  When users connect to websites, training has also told them to look for the security icon, but this only means the traffic is encrypted.  </a:t>
+              <a:t>Users interact with spoofed resources through cold-calling or name squatting scenarios, such as emails directing them to netflix.com.evil.com.  Previous security messages tell the user to look for details, like misspellings, as evidence of being fake (Proctor &amp; J, 2015).  However, this implicitly implies that perfect grammar infers being real.  When users connect to websites, training has also told them to look for the security icon, but this only means the traffic is encrypted (Hunt, 2019).  Without a consistent and reliable method to determine that a resource is genuine, the only alternative is skepticism.  For instance, when a banker calls for account information, hang up and call them back through the main switchboard.  If the call were real, there would be a note on the file, and another representative will assist.  Along those same lines, if netflix.com.evil.com, needs an update to your information, start at Bing and search for Netflix login, scrolling past the advertisements to the real site.  While none of these methods are fool-proof, they increase the odds of ending at the right location.</a:t>
             </a:r>
-          </a:p>
-          <a:p>
-            <a:pPr marL="0" marR="0" lvl="0" indent="0" algn="l" defTabSz="914400" rtl="0" eaLnBrk="1" fontAlgn="auto" latinLnBrk="0" hangingPunct="1">
-              <a:lnSpc>
-                <a:spcPct val="100000"/>
-              </a:lnSpc>
-              <a:spcBef>
-                <a:spcPts val="0"/>
-              </a:spcBef>
-              <a:spcAft>
-                <a:spcPts val="0"/>
-              </a:spcAft>
-              <a:buClrTx/>
-              <a:buSzTx/>
-              <a:buFontTx/>
-              <a:buNone/>
-              <a:tabLst/>
-              <a:defRPr/>
-            </a:pPr>
-            <a:endParaRPr lang="en-US" sz="1200" kern="1200" dirty="0">
-              <a:solidFill>
-                <a:schemeClr val="tx1"/>
-              </a:solidFill>
-              <a:effectLst/>
-              <a:latin typeface="+mn-lt"/>
-              <a:ea typeface="+mn-ea"/>
-              <a:cs typeface="+mn-cs"/>
-            </a:endParaRPr>
-          </a:p>
-          <a:p>
-            <a:pPr marL="0" marR="0" lvl="0" indent="0" algn="l" defTabSz="914400" rtl="0" eaLnBrk="1" fontAlgn="auto" latinLnBrk="0" hangingPunct="1">
-              <a:lnSpc>
-                <a:spcPct val="100000"/>
-              </a:lnSpc>
-              <a:spcBef>
-                <a:spcPts val="0"/>
-              </a:spcBef>
-              <a:spcAft>
-                <a:spcPts val="0"/>
-              </a:spcAft>
-              <a:buClrTx/>
-              <a:buSzTx/>
-              <a:buFontTx/>
-              <a:buNone/>
-              <a:tabLst/>
-              <a:defRPr/>
-            </a:pPr>
-            <a:r>
-              <a:rPr lang="en-US" sz="1200" kern="1200" dirty="0">
-                <a:solidFill>
-                  <a:schemeClr val="tx1"/>
-                </a:solidFill>
-                <a:effectLst/>
-                <a:latin typeface="+mn-lt"/>
-                <a:ea typeface="+mn-ea"/>
-                <a:cs typeface="+mn-cs"/>
-              </a:rPr>
-              <a:t>Without a consistent and reliable method to determine that a resource is genuine, the only alternative is skepticism.  For instance, when “your bank” calls to get account information, hang up and call them back through the main switchboard.  If the call were real, there would be a note on the file, and another representative will assist.  Along those same lines, if netflix.com.evil.com, needs an update to your information, start at Bing and search for Netflix login, and scroll past the advertisements to the real site.  While none of these methods are fool-proof, they increase the odds of ending at the right location.</a:t>
-            </a:r>
-          </a:p>
-          <a:p>
-            <a:endParaRPr lang="en-US" dirty="0"/>
           </a:p>
         </p:txBody>
       </p:sp>
@@ -38223,23 +37817,6 @@
           <a:bodyPr/>
           <a:lstStyle/>
           <a:p>
-            <a:pPr marL="0" marR="0" lvl="0" indent="0" algn="l" defTabSz="914400" rtl="0" eaLnBrk="1" fontAlgn="auto" latinLnBrk="0" hangingPunct="1">
-              <a:lnSpc>
-                <a:spcPct val="100000"/>
-              </a:lnSpc>
-              <a:spcBef>
-                <a:spcPts val="0"/>
-              </a:spcBef>
-              <a:spcAft>
-                <a:spcPts val="0"/>
-              </a:spcAft>
-              <a:buClrTx/>
-              <a:buSzTx/>
-              <a:buFontTx/>
-              <a:buNone/>
-              <a:tabLst/>
-              <a:defRPr/>
-            </a:pPr>
             <a:r>
               <a:rPr lang="en-US" sz="1200" kern="1200" dirty="0">
                 <a:solidFill>
@@ -38250,55 +37827,20 @@
                 <a:ea typeface="+mn-ea"/>
                 <a:cs typeface="+mn-cs"/>
               </a:rPr>
-              <a:t>Facebook and social media create significant risks to privacy and identity management.  Consider the requirements to recover a password to financial institutions; date of birth, grandparents’ names, city of birth, which school did you attend.  These facts are highly discoverable through social graphs.  Even if we do not directly share these details, our friends report metadata about themselves, and that tends to be highly correlated.  Public records also report big-ticket transactions, such as property deeds and marriage certifications, that detail other aspects of our lives.  While it can be tempting to think that my information is not essential, why would anyone target me?  </a:t>
+              <a:t>Facebook and social media create significant risks to privacy and identity management.  Consider the requirements to recover a password to financial institutions; date of birth, grandparents’ names, city of birth, which school did you attend (</a:t>
             </a:r>
-          </a:p>
-          <a:p>
-            <a:pPr marL="0" marR="0" lvl="0" indent="0" algn="l" defTabSz="914400" rtl="0" eaLnBrk="1" fontAlgn="auto" latinLnBrk="0" hangingPunct="1">
-              <a:lnSpc>
-                <a:spcPct val="100000"/>
-              </a:lnSpc>
-              <a:spcBef>
-                <a:spcPts val="0"/>
-              </a:spcBef>
-              <a:spcAft>
-                <a:spcPts val="0"/>
-              </a:spcAft>
-              <a:buClrTx/>
-              <a:buSzTx/>
-              <a:buFontTx/>
-              <a:buNone/>
-              <a:tabLst/>
-              <a:defRPr/>
-            </a:pPr>
-            <a:endParaRPr lang="en-US" sz="1200" kern="1200" dirty="0">
-              <a:solidFill>
-                <a:schemeClr val="tx1"/>
-              </a:solidFill>
-              <a:effectLst/>
-              <a:latin typeface="+mn-lt"/>
-              <a:ea typeface="+mn-ea"/>
-              <a:cs typeface="+mn-cs"/>
-            </a:endParaRPr>
-          </a:p>
-          <a:p>
-            <a:pPr marL="0" marR="0" lvl="0" indent="0" algn="l" defTabSz="914400" rtl="0" eaLnBrk="1" fontAlgn="auto" latinLnBrk="0" hangingPunct="1">
-              <a:lnSpc>
-                <a:spcPct val="100000"/>
-              </a:lnSpc>
-              <a:spcBef>
-                <a:spcPts val="0"/>
-              </a:spcBef>
-              <a:spcAft>
-                <a:spcPts val="0"/>
-              </a:spcAft>
-              <a:buClrTx/>
-              <a:buSzTx/>
-              <a:buFontTx/>
-              <a:buNone/>
-              <a:tabLst/>
-              <a:defRPr/>
-            </a:pPr>
+            <a:r>
+              <a:rPr lang="en-US" sz="1200" kern="1200" dirty="0" err="1">
+                <a:solidFill>
+                  <a:schemeClr val="tx1"/>
+                </a:solidFill>
+                <a:effectLst/>
+                <a:latin typeface="+mn-lt"/>
+                <a:ea typeface="+mn-ea"/>
+                <a:cs typeface="+mn-cs"/>
+              </a:rPr>
+              <a:t>Paller</a:t>
+            </a:r>
             <a:r>
               <a:rPr lang="en-US" sz="1200" kern="1200" dirty="0">
                 <a:solidFill>
@@ -38309,11 +37851,8 @@
                 <a:ea typeface="+mn-ea"/>
                 <a:cs typeface="+mn-cs"/>
               </a:rPr>
-              <a:t>This perception is inaccurate because automation allows third-parties to aggregate the information across a broad population.  From this vantage point, they can identify clusters of high-probability targets and go after all of them.  These attacks lead to personalized advertisements that have a higher click-through rate.  </a:t>
+              <a:t> et al., 2019).  These facts are highly discoverable through social graphs.  Even when we do not directly share these details, our friends report metadata about themselves that tends to be highly correlated.  Public records also report big-ticket transactions, such as property deeds and marriage certifications, that detail other aspects of our lives.  While it can be tempting to think that my information is not essential, why would anyone target me?  This perception is inaccurate because automation allows third-parties to aggregate the information across a broad population (Blythe &amp; Coventry, 2018).  From this vantage point, attackers can identify clusters of high-probability targets and go after all of them.  These attacks lead to personalized advertisements that have a higher click-through rate into annoying or malicious websites.</a:t>
             </a:r>
-          </a:p>
-          <a:p>
-            <a:endParaRPr lang="en-US" dirty="0"/>
           </a:p>
         </p:txBody>
       </p:sp>
@@ -38397,23 +37936,6 @@
           <a:bodyPr/>
           <a:lstStyle/>
           <a:p>
-            <a:pPr marL="0" marR="0" lvl="0" indent="0" algn="l" defTabSz="914400" rtl="0" eaLnBrk="1" fontAlgn="auto" latinLnBrk="0" hangingPunct="1">
-              <a:lnSpc>
-                <a:spcPct val="100000"/>
-              </a:lnSpc>
-              <a:spcBef>
-                <a:spcPts val="0"/>
-              </a:spcBef>
-              <a:spcAft>
-                <a:spcPts val="0"/>
-              </a:spcAft>
-              <a:buClrTx/>
-              <a:buSzTx/>
-              <a:buFontTx/>
-              <a:buNone/>
-              <a:tabLst/>
-              <a:defRPr/>
-            </a:pPr>
             <a:r>
               <a:rPr lang="en-US" sz="1200" kern="1200" dirty="0">
                 <a:solidFill>
@@ -38424,27 +37946,34 @@
                 <a:ea typeface="+mn-ea"/>
                 <a:cs typeface="+mn-cs"/>
               </a:rPr>
-              <a:t>A modern enterprise network has abstract borders, with users connecting from untrusted sites like coffee shops.  As the gateway to the Internet, these open hotspots are free to monitor and manipulate any unencrypted traffic that flows through them.  For instance, the provider could inject malicious JavaScript into the returned webpage, or steal credentials as they are uploaded.  Malicious hotspots can attack other protocols, such as Simple Mail Transport Protocol (SMTP) and Domain Name Services (DNS), to spy on private emails and influence routing to external sites.  These changes can be subtle and difficult to notice.  </a:t>
+              <a:t>A modern enterprise network has abstract borders, with users connecting from untrusted sites like coffee shops.  As the gateway to the Internet, these open hotspots are capable of monitoring and manipulating any unencrypted traffic that flows through them (</a:t>
+            </a:r>
+            <a:r>
+              <a:rPr lang="en-US" sz="1200" kern="1200" dirty="0" err="1">
+                <a:solidFill>
+                  <a:schemeClr val="tx1"/>
+                </a:solidFill>
+                <a:effectLst/>
+                <a:latin typeface="+mn-lt"/>
+                <a:ea typeface="+mn-ea"/>
+                <a:cs typeface="+mn-cs"/>
+              </a:rPr>
+              <a:t>Paller</a:t>
+            </a:r>
+            <a:r>
+              <a:rPr lang="en-US" sz="1200" kern="1200" dirty="0">
+                <a:solidFill>
+                  <a:schemeClr val="tx1"/>
+                </a:solidFill>
+                <a:effectLst/>
+                <a:latin typeface="+mn-lt"/>
+                <a:ea typeface="+mn-ea"/>
+                <a:cs typeface="+mn-cs"/>
+              </a:rPr>
+              <a:t> et al., 2019).  For instance, the provider could inject malicious JavaScript into the returned webpage, or steal credentials as they are uploaded.  Malicious hotspots can attack other protocols, such as Simple Mail Transport Protocol (SMTP) and Domain Name Services (DNS), to spy on private emails and influence routing to external sites.  These changes can be subtle and difficult to notice.</a:t>
             </a:r>
           </a:p>
           <a:p>
-            <a:pPr marL="0" marR="0" lvl="0" indent="0" algn="l" defTabSz="914400" rtl="0" eaLnBrk="1" fontAlgn="auto" latinLnBrk="0" hangingPunct="1">
-              <a:lnSpc>
-                <a:spcPct val="100000"/>
-              </a:lnSpc>
-              <a:spcBef>
-                <a:spcPts val="0"/>
-              </a:spcBef>
-              <a:spcAft>
-                <a:spcPts val="0"/>
-              </a:spcAft>
-              <a:buClrTx/>
-              <a:buSzTx/>
-              <a:buFontTx/>
-              <a:buNone/>
-              <a:tabLst/>
-              <a:defRPr/>
-            </a:pPr>
             <a:endParaRPr lang="en-US" sz="1200" kern="1200" dirty="0">
               <a:solidFill>
                 <a:schemeClr val="tx1"/>
@@ -38456,23 +37985,6 @@
             </a:endParaRPr>
           </a:p>
           <a:p>
-            <a:pPr marL="0" marR="0" lvl="0" indent="0" algn="l" defTabSz="914400" rtl="0" eaLnBrk="1" fontAlgn="auto" latinLnBrk="0" hangingPunct="1">
-              <a:lnSpc>
-                <a:spcPct val="100000"/>
-              </a:lnSpc>
-              <a:spcBef>
-                <a:spcPts val="0"/>
-              </a:spcBef>
-              <a:spcAft>
-                <a:spcPts val="0"/>
-              </a:spcAft>
-              <a:buClrTx/>
-              <a:buSzTx/>
-              <a:buFontTx/>
-              <a:buNone/>
-              <a:tabLst/>
-              <a:defRPr/>
-            </a:pPr>
             <a:r>
               <a:rPr lang="en-US" sz="1200" kern="1200" dirty="0">
                 <a:solidFill>
@@ -38483,90 +37995,8 @@
                 <a:ea typeface="+mn-ea"/>
                 <a:cs typeface="+mn-cs"/>
               </a:rPr>
-              <a:t>Alternatively, training needs to communicate the necessity for VPN technologies as a mechanism for creating an encrypted tunnel into a trusted service.  Untrusted networks are not limited to those that run on switches and routers, but also include public areas.  For example, if two employees are openly discussing trade secrets at the coffee shop, the next table over can hear them. Other scenarios might center around lost mobile devices in the real world.  </a:t>
+              <a:t>Alternatively, training needs to convey the necessity for VPN technologies as a mechanism for encrypted traffic tunneling across the hostile Internet to a trusted location.  Untrusted networks are not limited to those that run on switches and routers, but also include public areas.  For example, if two employees are openly discussing trade secrets at the coffee shop, the next table over can hear them.  Other scenarios might center around lost mobile devices in the real world.  If they are not encrypted, then any information on the device is lost into the public.  Through an awareness program, users need to understand these are information disclosures vulnerabilities.  It does not matter that the data leaks from the mouth and not the ethernet; there is an equal potential for damage.</a:t>
             </a:r>
-            <a:r>
-              <a:rPr lang="en-US" sz="1200" kern="1200">
-                <a:solidFill>
-                  <a:schemeClr val="tx1"/>
-                </a:solidFill>
-                <a:effectLst/>
-                <a:latin typeface="+mn-lt"/>
-                <a:ea typeface="+mn-ea"/>
-                <a:cs typeface="+mn-cs"/>
-              </a:rPr>
-              <a:t>If they are not encrypted, then any information on the device is lost into the public.</a:t>
-            </a:r>
-            <a:endParaRPr lang="en-US" sz="1200" kern="1200" dirty="0">
-              <a:solidFill>
-                <a:schemeClr val="tx1"/>
-              </a:solidFill>
-              <a:effectLst/>
-              <a:latin typeface="+mn-lt"/>
-              <a:ea typeface="+mn-ea"/>
-              <a:cs typeface="+mn-cs"/>
-            </a:endParaRPr>
-          </a:p>
-          <a:p>
-            <a:pPr marL="0" marR="0" lvl="0" indent="0" algn="l" defTabSz="914400" rtl="0" eaLnBrk="1" fontAlgn="auto" latinLnBrk="0" hangingPunct="1">
-              <a:lnSpc>
-                <a:spcPct val="100000"/>
-              </a:lnSpc>
-              <a:spcBef>
-                <a:spcPts val="0"/>
-              </a:spcBef>
-              <a:spcAft>
-                <a:spcPts val="0"/>
-              </a:spcAft>
-              <a:buClrTx/>
-              <a:buSzTx/>
-              <a:buFontTx/>
-              <a:buNone/>
-              <a:tabLst/>
-              <a:defRPr/>
-            </a:pPr>
-            <a:endParaRPr lang="en-US" sz="1200" kern="1200" dirty="0">
-              <a:solidFill>
-                <a:schemeClr val="tx1"/>
-              </a:solidFill>
-              <a:effectLst/>
-              <a:latin typeface="+mn-lt"/>
-              <a:ea typeface="+mn-ea"/>
-              <a:cs typeface="+mn-cs"/>
-            </a:endParaRPr>
-          </a:p>
-          <a:p>
-            <a:pPr marL="0" marR="0" lvl="0" indent="0" algn="l" defTabSz="914400" rtl="0" eaLnBrk="1" fontAlgn="auto" latinLnBrk="0" hangingPunct="1">
-              <a:lnSpc>
-                <a:spcPct val="100000"/>
-              </a:lnSpc>
-              <a:spcBef>
-                <a:spcPts val="0"/>
-              </a:spcBef>
-              <a:spcAft>
-                <a:spcPts val="0"/>
-              </a:spcAft>
-              <a:buClrTx/>
-              <a:buSzTx/>
-              <a:buFontTx/>
-              <a:buNone/>
-              <a:tabLst/>
-              <a:defRPr/>
-            </a:pPr>
-            <a:r>
-              <a:rPr lang="en-US" sz="1200" kern="1200" dirty="0">
-                <a:solidFill>
-                  <a:schemeClr val="tx1"/>
-                </a:solidFill>
-                <a:effectLst/>
-                <a:latin typeface="+mn-lt"/>
-                <a:ea typeface="+mn-ea"/>
-                <a:cs typeface="+mn-cs"/>
-              </a:rPr>
-              <a:t>Through an awareness program, users need to understand these are information disclosures vulnerabilities.  It does not matter that the data leaks from the mouth and not the ethernet; there is an equal potential for damage.</a:t>
-            </a:r>
-          </a:p>
-          <a:p>
             <a:endParaRPr lang="en-US" dirty="0"/>
           </a:p>
         </p:txBody>
@@ -38650,6 +38080,811 @@
         <p:txBody>
           <a:bodyPr/>
           <a:lstStyle/>
+          <a:p>
+            <a:pPr marL="0" marR="0" lvl="0" indent="0" algn="l" defTabSz="914400" rtl="0" eaLnBrk="1" fontAlgn="auto" latinLnBrk="0" hangingPunct="1">
+              <a:lnSpc>
+                <a:spcPct val="100000"/>
+              </a:lnSpc>
+              <a:spcBef>
+                <a:spcPts val="0"/>
+              </a:spcBef>
+              <a:spcAft>
+                <a:spcPts val="0"/>
+              </a:spcAft>
+              <a:buClrTx/>
+              <a:buSzTx/>
+              <a:buFontTx/>
+              <a:buNone/>
+              <a:tabLst/>
+              <a:defRPr/>
+            </a:pPr>
+            <a:r>
+              <a:rPr lang="en-US" sz="1200" kern="1200" dirty="0">
+                <a:solidFill>
+                  <a:schemeClr val="tx1"/>
+                </a:solidFill>
+                <a:effectLst/>
+                <a:latin typeface="+mn-lt"/>
+                <a:ea typeface="+mn-ea"/>
+                <a:cs typeface="+mn-cs"/>
+              </a:rPr>
+              <a:t>Traditional framing of a security message has focused on the notion that a lone hacker is out to get us.  This approach leads employees across the organization to question the accuracy of that message and the guidance associated with it.  A modern vantage point argues that security is a collection of processes that reduce and contain risk.  Security is only partially about stopping malicious actors; the rest is about stopping erroneous actions from legitimate sources, with both introducing challenges to business continuity.  Hardware fails, technicians will corrupt customer data, engineers will write defects, and administrators will misconfigure services.  If the business approaches these scenarios methodologically, then incident responses can fail-over traffic or perform necessary backup and recovery operations.  In many scenarios, manipulating humans is easier than attacking the machines.  Mitigating these risks requires a security-aware culture that understands the different attack vectors and is </a:t>
+            </a:r>
+            <a:r>
+              <a:rPr lang="en-US" sz="1200" kern="1200" dirty="0" err="1">
+                <a:solidFill>
+                  <a:schemeClr val="tx1"/>
+                </a:solidFill>
+                <a:effectLst/>
+                <a:latin typeface="+mn-lt"/>
+                <a:ea typeface="+mn-ea"/>
+                <a:cs typeface="+mn-cs"/>
+              </a:rPr>
+              <a:t>cognisant</a:t>
+            </a:r>
+            <a:r>
+              <a:rPr lang="en-US" sz="1200" kern="1200" dirty="0">
+                <a:solidFill>
+                  <a:schemeClr val="tx1"/>
+                </a:solidFill>
+                <a:effectLst/>
+                <a:latin typeface="+mn-lt"/>
+                <a:ea typeface="+mn-ea"/>
+                <a:cs typeface="+mn-cs"/>
+              </a:rPr>
+              <a:t> of those interactions.  While identifying risk in an abstract system is challenging, a methodical approach that enumerates communication flow across an environment can help to identify those threats.  Consider the coffee shop and the number of assumptions that exist in the payment and transaction protocols.  These threats are not unique to a café, and with minor tweaks apply to any other establishment.  Additional specific challenges exist, such as phishing, doxing, credential management, and utilizing untrusted networking that requires awareness.  Despite these ideas seeming foreign and complicated, having an understanding of the risks will reduce the attack surface and keep the employees safe.</a:t>
+            </a:r>
+          </a:p>
+          <a:p>
+            <a:endParaRPr lang="en-US" dirty="0"/>
+          </a:p>
+        </p:txBody>
+      </p:sp>
+      <p:sp>
+        <p:nvSpPr>
+          <p:cNvPr id="4" name="Slide Number Placeholder 3"/>
+          <p:cNvSpPr>
+            <a:spLocks noGrp="1"/>
+          </p:cNvSpPr>
+          <p:nvPr>
+            <p:ph type="sldNum" sz="quarter" idx="5"/>
+          </p:nvPr>
+        </p:nvSpPr>
+        <p:spPr/>
+        <p:txBody>
+          <a:bodyPr/>
+          <a:lstStyle/>
+          <a:p>
+            <a:fld id="{81A129D8-DD59-42DC-A2A2-B5C5A49C3CE1}" type="slidenum">
+              <a:rPr lang="en-US" smtClean="0"/>
+              <a:t>16</a:t>
+            </a:fld>
+            <a:endParaRPr lang="en-US"/>
+          </a:p>
+        </p:txBody>
+      </p:sp>
+    </p:spTree>
+    <p:extLst>
+      <p:ext uri="{BB962C8B-B14F-4D97-AF65-F5344CB8AC3E}">
+        <p14:creationId xmlns:p14="http://schemas.microsoft.com/office/powerpoint/2010/main" val="1984448095"/>
+      </p:ext>
+    </p:extLst>
+  </p:cSld>
+  <p:clrMapOvr>
+    <a:masterClrMapping/>
+  </p:clrMapOvr>
+</p:notes>
+</file>
+
+<file path=ppt/notesSlides/notesSlide16.xml><?xml version="1.0" encoding="utf-8"?>
+<p:notes xmlns:a="http://schemas.openxmlformats.org/drawingml/2006/main" xmlns:r="http://schemas.openxmlformats.org/officeDocument/2006/relationships" xmlns:p="http://schemas.openxmlformats.org/presentationml/2006/main">
+  <p:cSld>
+    <p:spTree>
+      <p:nvGrpSpPr>
+        <p:cNvPr id="1" name=""/>
+        <p:cNvGrpSpPr/>
+        <p:nvPr/>
+      </p:nvGrpSpPr>
+      <p:grpSpPr>
+        <a:xfrm>
+          <a:off x="0" y="0"/>
+          <a:ext cx="0" cy="0"/>
+          <a:chOff x="0" y="0"/>
+          <a:chExt cx="0" cy="0"/>
+        </a:xfrm>
+      </p:grpSpPr>
+      <p:sp>
+        <p:nvSpPr>
+          <p:cNvPr id="2" name="Slide Image Placeholder 1"/>
+          <p:cNvSpPr>
+            <a:spLocks noGrp="1" noRot="1" noChangeAspect="1"/>
+          </p:cNvSpPr>
+          <p:nvPr>
+            <p:ph type="sldImg"/>
+          </p:nvPr>
+        </p:nvSpPr>
+        <p:spPr/>
+      </p:sp>
+      <p:sp>
+        <p:nvSpPr>
+          <p:cNvPr id="3" name="Notes Placeholder 2"/>
+          <p:cNvSpPr>
+            <a:spLocks noGrp="1"/>
+          </p:cNvSpPr>
+          <p:nvPr>
+            <p:ph type="body" idx="1"/>
+          </p:nvPr>
+        </p:nvSpPr>
+        <p:spPr/>
+        <p:txBody>
+          <a:bodyPr/>
+          <a:lstStyle/>
+          <a:p>
+            <a:r>
+              <a:rPr lang="en-US" sz="1200" kern="1200" dirty="0">
+                <a:solidFill>
+                  <a:schemeClr val="tx1"/>
+                </a:solidFill>
+                <a:effectLst/>
+                <a:latin typeface="+mn-lt"/>
+                <a:ea typeface="+mn-ea"/>
+                <a:cs typeface="+mn-cs"/>
+              </a:rPr>
+              <a:t>Blythe, J., &amp; Coventry, L. (2018). Costly but effective: Comparing the factors that influence employee anti-malware behaviors. </a:t>
+            </a:r>
+            <a:r>
+              <a:rPr lang="en-US" sz="1200" i="1" kern="1200" dirty="0">
+                <a:solidFill>
+                  <a:schemeClr val="tx1"/>
+                </a:solidFill>
+                <a:effectLst/>
+                <a:latin typeface="+mn-lt"/>
+                <a:ea typeface="+mn-ea"/>
+                <a:cs typeface="+mn-cs"/>
+              </a:rPr>
+              <a:t>Computers in Human Behavior Volume 87, October</a:t>
+            </a:r>
+            <a:r>
+              <a:rPr lang="en-US" sz="1200" kern="1200" dirty="0">
+                <a:solidFill>
+                  <a:schemeClr val="tx1"/>
+                </a:solidFill>
+                <a:effectLst/>
+                <a:latin typeface="+mn-lt"/>
+                <a:ea typeface="+mn-ea"/>
+                <a:cs typeface="+mn-cs"/>
+              </a:rPr>
+              <a:t>, 87-97.</a:t>
+            </a:r>
+          </a:p>
+          <a:p>
+            <a:r>
+              <a:rPr lang="en-US" sz="1200" kern="1200" dirty="0">
+                <a:solidFill>
+                  <a:schemeClr val="tx1"/>
+                </a:solidFill>
+                <a:effectLst/>
+                <a:latin typeface="+mn-lt"/>
+                <a:ea typeface="+mn-ea"/>
+                <a:cs typeface="+mn-cs"/>
+              </a:rPr>
+              <a:t>Brown, T. (2015). A Primer on Data Security. </a:t>
+            </a:r>
+            <a:r>
+              <a:rPr lang="en-US" sz="1200" i="1" kern="1200" dirty="0">
+                <a:solidFill>
+                  <a:schemeClr val="tx1"/>
+                </a:solidFill>
+                <a:effectLst/>
+                <a:latin typeface="+mn-lt"/>
+                <a:ea typeface="+mn-ea"/>
+                <a:cs typeface="+mn-cs"/>
+              </a:rPr>
+              <a:t>CPA Journal May Volume 85, Issue 5</a:t>
+            </a:r>
+            <a:r>
+              <a:rPr lang="en-US" sz="1200" kern="1200" dirty="0">
+                <a:solidFill>
+                  <a:schemeClr val="tx1"/>
+                </a:solidFill>
+                <a:effectLst/>
+                <a:latin typeface="+mn-lt"/>
+                <a:ea typeface="+mn-ea"/>
+                <a:cs typeface="+mn-cs"/>
+              </a:rPr>
+              <a:t>, 58-62.</a:t>
+            </a:r>
+          </a:p>
+          <a:p>
+            <a:r>
+              <a:rPr lang="en-US" sz="1200" kern="1200" dirty="0">
+                <a:solidFill>
+                  <a:schemeClr val="tx1"/>
+                </a:solidFill>
+                <a:effectLst/>
+                <a:latin typeface="+mn-lt"/>
+                <a:ea typeface="+mn-ea"/>
+                <a:cs typeface="+mn-cs"/>
+              </a:rPr>
+              <a:t>Bruijn, H., &amp; Janssen, M. (2017). Building Cybersecurity Awareness: The need for evidence-based framing strategies. </a:t>
+            </a:r>
+            <a:r>
+              <a:rPr lang="en-US" sz="1200" i="1" kern="1200" dirty="0">
+                <a:solidFill>
+                  <a:schemeClr val="tx1"/>
+                </a:solidFill>
+                <a:effectLst/>
+                <a:latin typeface="+mn-lt"/>
+                <a:ea typeface="+mn-ea"/>
+                <a:cs typeface="+mn-cs"/>
+              </a:rPr>
+              <a:t>Government Information Quarterly Volume 34, Issue 1, January</a:t>
+            </a:r>
+            <a:r>
+              <a:rPr lang="en-US" sz="1200" kern="1200" dirty="0">
+                <a:solidFill>
+                  <a:schemeClr val="tx1"/>
+                </a:solidFill>
+                <a:effectLst/>
+                <a:latin typeface="+mn-lt"/>
+                <a:ea typeface="+mn-ea"/>
+                <a:cs typeface="+mn-cs"/>
+              </a:rPr>
+              <a:t> 1-7.</a:t>
+            </a:r>
+          </a:p>
+          <a:p>
+            <a:r>
+              <a:rPr lang="en-US" sz="1200" kern="1200" dirty="0">
+                <a:solidFill>
+                  <a:schemeClr val="tx1"/>
+                </a:solidFill>
+                <a:effectLst/>
+                <a:latin typeface="+mn-lt"/>
+                <a:ea typeface="+mn-ea"/>
+                <a:cs typeface="+mn-cs"/>
+              </a:rPr>
+              <a:t>Dai </a:t>
+            </a:r>
+            <a:r>
+              <a:rPr lang="en-US" sz="1200" kern="1200" dirty="0" err="1">
+                <a:solidFill>
+                  <a:schemeClr val="tx1"/>
+                </a:solidFill>
+                <a:effectLst/>
+                <a:latin typeface="+mn-lt"/>
+                <a:ea typeface="+mn-ea"/>
+                <a:cs typeface="+mn-cs"/>
+              </a:rPr>
+              <a:t>Zovi</a:t>
+            </a:r>
+            <a:r>
+              <a:rPr lang="en-US" sz="1200" kern="1200" dirty="0">
+                <a:solidFill>
+                  <a:schemeClr val="tx1"/>
+                </a:solidFill>
+                <a:effectLst/>
+                <a:latin typeface="+mn-lt"/>
+                <a:ea typeface="+mn-ea"/>
+                <a:cs typeface="+mn-cs"/>
+              </a:rPr>
+              <a:t>, D. (2019). Every Security Team is a Software Team Now. </a:t>
+            </a:r>
+            <a:r>
+              <a:rPr lang="en-US" sz="1200" i="1" kern="1200" dirty="0">
+                <a:solidFill>
+                  <a:schemeClr val="tx1"/>
+                </a:solidFill>
+                <a:effectLst/>
+                <a:latin typeface="+mn-lt"/>
+                <a:ea typeface="+mn-ea"/>
+                <a:cs typeface="+mn-cs"/>
+              </a:rPr>
+              <a:t>Blackhat USA 2019.</a:t>
+            </a:r>
+            <a:r>
+              <a:rPr lang="en-US" sz="1200" kern="1200" dirty="0">
+                <a:solidFill>
+                  <a:schemeClr val="tx1"/>
+                </a:solidFill>
+                <a:effectLst/>
+                <a:latin typeface="+mn-lt"/>
+                <a:ea typeface="+mn-ea"/>
+                <a:cs typeface="+mn-cs"/>
+              </a:rPr>
+              <a:t> </a:t>
+            </a:r>
+          </a:p>
+          <a:p>
+            <a:r>
+              <a:rPr lang="en-US" sz="1200" kern="1200" dirty="0" err="1">
+                <a:solidFill>
+                  <a:schemeClr val="tx1"/>
+                </a:solidFill>
+                <a:effectLst/>
+                <a:latin typeface="+mn-lt"/>
+                <a:ea typeface="+mn-ea"/>
+                <a:cs typeface="+mn-cs"/>
+              </a:rPr>
+              <a:t>Elifoglu</a:t>
+            </a:r>
+            <a:r>
+              <a:rPr lang="en-US" sz="1200" kern="1200" dirty="0">
+                <a:solidFill>
+                  <a:schemeClr val="tx1"/>
+                </a:solidFill>
+                <a:effectLst/>
+                <a:latin typeface="+mn-lt"/>
+                <a:ea typeface="+mn-ea"/>
+                <a:cs typeface="+mn-cs"/>
+              </a:rPr>
+              <a:t>, H., Abel, I., &amp; </a:t>
+            </a:r>
+            <a:r>
+              <a:rPr lang="en-US" sz="1200" kern="1200" dirty="0" err="1">
+                <a:solidFill>
+                  <a:schemeClr val="tx1"/>
+                </a:solidFill>
+                <a:effectLst/>
+                <a:latin typeface="+mn-lt"/>
+                <a:ea typeface="+mn-ea"/>
+                <a:cs typeface="+mn-cs"/>
+              </a:rPr>
+              <a:t>Tasseven</a:t>
+            </a:r>
+            <a:r>
+              <a:rPr lang="en-US" sz="1200" kern="1200" dirty="0">
+                <a:solidFill>
+                  <a:schemeClr val="tx1"/>
+                </a:solidFill>
+                <a:effectLst/>
+                <a:latin typeface="+mn-lt"/>
+                <a:ea typeface="+mn-ea"/>
+                <a:cs typeface="+mn-cs"/>
+              </a:rPr>
+              <a:t>, O. (2018). Minimizing Insider Threat Risk with Behavioral Monitoring. </a:t>
+            </a:r>
+            <a:r>
+              <a:rPr lang="en-US" sz="1200" i="1" kern="1200" dirty="0">
+                <a:solidFill>
+                  <a:schemeClr val="tx1"/>
+                </a:solidFill>
+                <a:effectLst/>
+                <a:latin typeface="+mn-lt"/>
+                <a:ea typeface="+mn-ea"/>
+                <a:cs typeface="+mn-cs"/>
+              </a:rPr>
+              <a:t>Review of Business. Vol. 38, Issue 2</a:t>
+            </a:r>
+            <a:r>
+              <a:rPr lang="en-US" sz="1200" kern="1200" dirty="0">
+                <a:solidFill>
+                  <a:schemeClr val="tx1"/>
+                </a:solidFill>
+                <a:effectLst/>
+                <a:latin typeface="+mn-lt"/>
+                <a:ea typeface="+mn-ea"/>
+                <a:cs typeface="+mn-cs"/>
+              </a:rPr>
+              <a:t>, 61-73.</a:t>
+            </a:r>
+          </a:p>
+          <a:p>
+            <a:r>
+              <a:rPr lang="en-US" sz="1200" kern="1200" dirty="0">
+                <a:solidFill>
+                  <a:schemeClr val="tx1"/>
+                </a:solidFill>
+                <a:effectLst/>
+                <a:latin typeface="+mn-lt"/>
+                <a:ea typeface="+mn-ea"/>
+                <a:cs typeface="+mn-cs"/>
+              </a:rPr>
+              <a:t>Hennig, N. (2018). Privacy and Security Online: Best Practices for Cybersecurity. </a:t>
+            </a:r>
+            <a:r>
+              <a:rPr lang="en-US" sz="1200" i="1" kern="1200" dirty="0">
+                <a:solidFill>
+                  <a:schemeClr val="tx1"/>
+                </a:solidFill>
+                <a:effectLst/>
+                <a:latin typeface="+mn-lt"/>
+                <a:ea typeface="+mn-ea"/>
+                <a:cs typeface="+mn-cs"/>
+              </a:rPr>
+              <a:t>Library Technology Reports. April, Vol. 54, Issue 3</a:t>
+            </a:r>
+            <a:r>
+              <a:rPr lang="en-US" sz="1200" kern="1200" dirty="0">
+                <a:solidFill>
+                  <a:schemeClr val="tx1"/>
+                </a:solidFill>
+                <a:effectLst/>
+                <a:latin typeface="+mn-lt"/>
+                <a:ea typeface="+mn-ea"/>
+                <a:cs typeface="+mn-cs"/>
+              </a:rPr>
+              <a:t>, 1-37.</a:t>
+            </a:r>
+          </a:p>
+          <a:p>
+            <a:r>
+              <a:rPr lang="en-US" sz="1200" kern="1200" dirty="0">
+                <a:solidFill>
+                  <a:schemeClr val="tx1"/>
+                </a:solidFill>
+                <a:effectLst/>
+                <a:latin typeface="+mn-lt"/>
+                <a:ea typeface="+mn-ea"/>
+                <a:cs typeface="+mn-cs"/>
+              </a:rPr>
+              <a:t>Hunt, T. (2019, May 20th). </a:t>
+            </a:r>
+            <a:r>
+              <a:rPr lang="en-US" sz="1200" i="1" kern="1200" dirty="0">
+                <a:solidFill>
+                  <a:schemeClr val="tx1"/>
+                </a:solidFill>
+                <a:effectLst/>
+                <a:latin typeface="+mn-lt"/>
+                <a:ea typeface="+mn-ea"/>
+                <a:cs typeface="+mn-cs"/>
+              </a:rPr>
+              <a:t>Keynote: Hack to the Future</a:t>
+            </a:r>
+            <a:r>
+              <a:rPr lang="en-US" sz="1200" kern="1200" dirty="0">
+                <a:solidFill>
+                  <a:schemeClr val="tx1"/>
+                </a:solidFill>
+                <a:effectLst/>
+                <a:latin typeface="+mn-lt"/>
+                <a:ea typeface="+mn-ea"/>
+                <a:cs typeface="+mn-cs"/>
+              </a:rPr>
+              <a:t>. Retrieved from YouTube: https://www.youtube.com/watch?v=qCOefMiakps</a:t>
+            </a:r>
+          </a:p>
+          <a:p>
+            <a:r>
+              <a:rPr lang="en-US" sz="1200" kern="1200" dirty="0">
+                <a:solidFill>
+                  <a:schemeClr val="tx1"/>
+                </a:solidFill>
+                <a:effectLst/>
+                <a:latin typeface="+mn-lt"/>
+                <a:ea typeface="+mn-ea"/>
+                <a:cs typeface="+mn-cs"/>
+              </a:rPr>
+              <a:t>Jonathan et al. (2017). Security system with three-dimensional face recognition using the PCA method and neural networks algorithm. </a:t>
+            </a:r>
+            <a:r>
+              <a:rPr lang="en-US" sz="1200" i="1" kern="1200" dirty="0">
+                <a:solidFill>
+                  <a:schemeClr val="tx1"/>
+                </a:solidFill>
+                <a:effectLst/>
+                <a:latin typeface="+mn-lt"/>
+                <a:ea typeface="+mn-ea"/>
+                <a:cs typeface="+mn-cs"/>
+              </a:rPr>
+              <a:t>4th International Conference on New Media Studies, Yogyakarta, Indonesia, 8-10 Nov</a:t>
+            </a:r>
+            <a:r>
+              <a:rPr lang="en-US" sz="1200" kern="1200" dirty="0">
+                <a:solidFill>
+                  <a:schemeClr val="tx1"/>
+                </a:solidFill>
+                <a:effectLst/>
+                <a:latin typeface="+mn-lt"/>
+                <a:ea typeface="+mn-ea"/>
+                <a:cs typeface="+mn-cs"/>
+              </a:rPr>
+              <a:t>.</a:t>
+            </a:r>
+          </a:p>
+          <a:p>
+            <a:r>
+              <a:rPr lang="en-US" sz="1200" kern="1200" dirty="0" err="1">
+                <a:solidFill>
+                  <a:schemeClr val="tx1"/>
+                </a:solidFill>
+                <a:effectLst/>
+                <a:latin typeface="+mn-lt"/>
+                <a:ea typeface="+mn-ea"/>
+                <a:cs typeface="+mn-cs"/>
+              </a:rPr>
+              <a:t>Kohnfelder</a:t>
+            </a:r>
+            <a:r>
+              <a:rPr lang="en-US" sz="1200" kern="1200" dirty="0">
+                <a:solidFill>
+                  <a:schemeClr val="tx1"/>
+                </a:solidFill>
+                <a:effectLst/>
+                <a:latin typeface="+mn-lt"/>
+                <a:ea typeface="+mn-ea"/>
+                <a:cs typeface="+mn-cs"/>
+              </a:rPr>
+              <a:t>, L., &amp; Garg, P. (1999, April 1st). </a:t>
+            </a:r>
+            <a:r>
+              <a:rPr lang="en-US" sz="1200" i="1" kern="1200" dirty="0">
+                <a:solidFill>
+                  <a:schemeClr val="tx1"/>
+                </a:solidFill>
+                <a:effectLst/>
+                <a:latin typeface="+mn-lt"/>
+                <a:ea typeface="+mn-ea"/>
+                <a:cs typeface="+mn-cs"/>
+              </a:rPr>
+              <a:t>The threats to our products</a:t>
+            </a:r>
+            <a:r>
+              <a:rPr lang="en-US" sz="1200" kern="1200" dirty="0">
+                <a:solidFill>
+                  <a:schemeClr val="tx1"/>
+                </a:solidFill>
+                <a:effectLst/>
+                <a:latin typeface="+mn-lt"/>
+                <a:ea typeface="+mn-ea"/>
+                <a:cs typeface="+mn-cs"/>
+              </a:rPr>
+              <a:t>. Retrieved from Microsoft Security Blog: https://www.microsoft.com/security/blog/2009/08/27/the-threats-to-our-products/</a:t>
+            </a:r>
+          </a:p>
+          <a:p>
+            <a:r>
+              <a:rPr lang="en-US" sz="1200" kern="1200" dirty="0">
+                <a:solidFill>
+                  <a:schemeClr val="tx1"/>
+                </a:solidFill>
+                <a:effectLst/>
+                <a:latin typeface="+mn-lt"/>
+                <a:ea typeface="+mn-ea"/>
+                <a:cs typeface="+mn-cs"/>
+              </a:rPr>
+              <a:t>Mickens. (2018, August 16th). </a:t>
+            </a:r>
+            <a:r>
+              <a:rPr lang="en-US" sz="1200" i="1" kern="1200" dirty="0">
+                <a:solidFill>
+                  <a:schemeClr val="tx1"/>
+                </a:solidFill>
+                <a:effectLst/>
+                <a:latin typeface="+mn-lt"/>
+                <a:ea typeface="+mn-ea"/>
+                <a:cs typeface="+mn-cs"/>
+              </a:rPr>
+              <a:t>Why Do Keynote Speakers Keep Suggesting That Improving Security Is Possible?</a:t>
+            </a:r>
+            <a:r>
+              <a:rPr lang="en-US" sz="1200" kern="1200" dirty="0">
+                <a:solidFill>
+                  <a:schemeClr val="tx1"/>
+                </a:solidFill>
+                <a:effectLst/>
+                <a:latin typeface="+mn-lt"/>
+                <a:ea typeface="+mn-ea"/>
+                <a:cs typeface="+mn-cs"/>
+              </a:rPr>
+              <a:t> Retrieved from YouTube: https://www.youtube.com/watch?v=ajGX7odA87k</a:t>
+            </a:r>
+          </a:p>
+          <a:p>
+            <a:r>
+              <a:rPr lang="en-US" sz="1200" kern="1200" dirty="0">
+                <a:solidFill>
+                  <a:schemeClr val="tx1"/>
+                </a:solidFill>
+                <a:effectLst/>
+                <a:latin typeface="+mn-lt"/>
+                <a:ea typeface="+mn-ea"/>
+                <a:cs typeface="+mn-cs"/>
+              </a:rPr>
+              <a:t>Mickens, J. (2015, September 9th). </a:t>
+            </a:r>
+            <a:r>
+              <a:rPr lang="en-US" sz="1200" i="1" kern="1200" dirty="0">
+                <a:solidFill>
+                  <a:schemeClr val="tx1"/>
+                </a:solidFill>
+                <a:effectLst/>
+                <a:latin typeface="+mn-lt"/>
+                <a:ea typeface="+mn-ea"/>
+                <a:cs typeface="+mn-cs"/>
+              </a:rPr>
+              <a:t>Not Even Close, The State of Computer Security with Slides</a:t>
+            </a:r>
+            <a:r>
+              <a:rPr lang="en-US" sz="1200" kern="1200" dirty="0">
+                <a:solidFill>
+                  <a:schemeClr val="tx1"/>
+                </a:solidFill>
+                <a:effectLst/>
+                <a:latin typeface="+mn-lt"/>
+                <a:ea typeface="+mn-ea"/>
+                <a:cs typeface="+mn-cs"/>
+              </a:rPr>
+              <a:t>. Retrieved from YouTube: https://youtu.be/tF24WHumvIc</a:t>
+            </a:r>
+          </a:p>
+          <a:p>
+            <a:r>
+              <a:rPr lang="en-US" sz="1200" kern="1200" dirty="0" err="1">
+                <a:solidFill>
+                  <a:schemeClr val="tx1"/>
+                </a:solidFill>
+                <a:effectLst/>
+                <a:latin typeface="+mn-lt"/>
+                <a:ea typeface="+mn-ea"/>
+                <a:cs typeface="+mn-cs"/>
+              </a:rPr>
+              <a:t>Paller</a:t>
+            </a:r>
+            <a:r>
+              <a:rPr lang="en-US" sz="1200" kern="1200" dirty="0">
+                <a:solidFill>
+                  <a:schemeClr val="tx1"/>
+                </a:solidFill>
+                <a:effectLst/>
+                <a:latin typeface="+mn-lt"/>
+                <a:ea typeface="+mn-ea"/>
+                <a:cs typeface="+mn-cs"/>
+              </a:rPr>
+              <a:t> et al. (2019, March 7th). The Five Most Dangerous New Attack Techniques and How to Counter Them. </a:t>
+            </a:r>
+            <a:r>
+              <a:rPr lang="en-US" sz="1200" i="1" kern="1200" dirty="0">
+                <a:solidFill>
+                  <a:schemeClr val="tx1"/>
+                </a:solidFill>
+                <a:effectLst/>
+                <a:latin typeface="+mn-lt"/>
+                <a:ea typeface="+mn-ea"/>
+                <a:cs typeface="+mn-cs"/>
+              </a:rPr>
+              <a:t>RSA Conference.</a:t>
+            </a:r>
+            <a:r>
+              <a:rPr lang="en-US" sz="1200" kern="1200" dirty="0">
+                <a:solidFill>
+                  <a:schemeClr val="tx1"/>
+                </a:solidFill>
+                <a:effectLst/>
+                <a:latin typeface="+mn-lt"/>
+                <a:ea typeface="+mn-ea"/>
+                <a:cs typeface="+mn-cs"/>
+              </a:rPr>
+              <a:t> Retrieved from YouTube.</a:t>
+            </a:r>
+          </a:p>
+          <a:p>
+            <a:r>
+              <a:rPr lang="en-US" sz="1200" kern="1200" dirty="0">
+                <a:solidFill>
+                  <a:schemeClr val="tx1"/>
+                </a:solidFill>
+                <a:effectLst/>
+                <a:latin typeface="+mn-lt"/>
+                <a:ea typeface="+mn-ea"/>
+                <a:cs typeface="+mn-cs"/>
+              </a:rPr>
+              <a:t>Proctor, R., &amp; J, C. (2015). The Role of Human Factors/Ergonomics in the Science of Security: Decision Making and Action Selection in Cyberspace. </a:t>
+            </a:r>
+            <a:r>
+              <a:rPr lang="en-US" sz="1200" i="1" kern="1200" dirty="0">
+                <a:solidFill>
+                  <a:schemeClr val="tx1"/>
+                </a:solidFill>
+                <a:effectLst/>
+                <a:latin typeface="+mn-lt"/>
+                <a:ea typeface="+mn-ea"/>
+                <a:cs typeface="+mn-cs"/>
+              </a:rPr>
+              <a:t>Human Factors Aug; Vol. 57 (5)</a:t>
+            </a:r>
+            <a:r>
+              <a:rPr lang="en-US" sz="1200" kern="1200" dirty="0">
+                <a:solidFill>
+                  <a:schemeClr val="tx1"/>
+                </a:solidFill>
+                <a:effectLst/>
+                <a:latin typeface="+mn-lt"/>
+                <a:ea typeface="+mn-ea"/>
+                <a:cs typeface="+mn-cs"/>
+              </a:rPr>
+              <a:t>, 721-727.</a:t>
+            </a:r>
+          </a:p>
+          <a:p>
+            <a:r>
+              <a:rPr lang="en-US" sz="1200" kern="1200" dirty="0" err="1">
+                <a:solidFill>
+                  <a:schemeClr val="tx1"/>
+                </a:solidFill>
+                <a:effectLst/>
+                <a:latin typeface="+mn-lt"/>
+                <a:ea typeface="+mn-ea"/>
+                <a:cs typeface="+mn-cs"/>
+              </a:rPr>
+              <a:t>Valiente</a:t>
+            </a:r>
+            <a:r>
+              <a:rPr lang="en-US" sz="1200" kern="1200" dirty="0">
+                <a:solidFill>
+                  <a:schemeClr val="tx1"/>
+                </a:solidFill>
+                <a:effectLst/>
+                <a:latin typeface="+mn-lt"/>
+                <a:ea typeface="+mn-ea"/>
+                <a:cs typeface="+mn-cs"/>
+              </a:rPr>
+              <a:t>, C. (2017). Addressing Malware WITH Cybersecurity Awareness. </a:t>
+            </a:r>
+            <a:r>
+              <a:rPr lang="en-US" sz="1200" i="1" kern="1200" dirty="0">
+                <a:solidFill>
+                  <a:schemeClr val="tx1"/>
+                </a:solidFill>
+                <a:effectLst/>
+                <a:latin typeface="+mn-lt"/>
+                <a:ea typeface="+mn-ea"/>
+                <a:cs typeface="+mn-cs"/>
+              </a:rPr>
+              <a:t>ISSA Journal. Oct, Vol. 15, Issue 10</a:t>
+            </a:r>
+            <a:r>
+              <a:rPr lang="en-US" sz="1200" kern="1200" dirty="0">
+                <a:solidFill>
+                  <a:schemeClr val="tx1"/>
+                </a:solidFill>
+                <a:effectLst/>
+                <a:latin typeface="+mn-lt"/>
+                <a:ea typeface="+mn-ea"/>
+                <a:cs typeface="+mn-cs"/>
+              </a:rPr>
+              <a:t>, 16-22.</a:t>
+            </a:r>
+          </a:p>
+          <a:p>
+            <a:r>
+              <a:rPr lang="en-US" sz="1200" kern="1200" dirty="0">
+                <a:solidFill>
+                  <a:schemeClr val="tx1"/>
+                </a:solidFill>
+                <a:effectLst/>
+                <a:latin typeface="+mn-lt"/>
+                <a:ea typeface="+mn-ea"/>
+                <a:cs typeface="+mn-cs"/>
+              </a:rPr>
+              <a:t>Whitty et al. (2015). Individual differences in cybersecurity behaviors: an examination of who is sharing passwords. </a:t>
+            </a:r>
+            <a:r>
+              <a:rPr lang="en-US" sz="1200" i="1" kern="1200" dirty="0">
+                <a:solidFill>
+                  <a:schemeClr val="tx1"/>
+                </a:solidFill>
+                <a:effectLst/>
+                <a:latin typeface="+mn-lt"/>
+                <a:ea typeface="+mn-ea"/>
+                <a:cs typeface="+mn-cs"/>
+              </a:rPr>
+              <a:t>Cyberpsychology, Behavior And Social Networking Jan; Vol. 18 (1)</a:t>
+            </a:r>
+            <a:r>
+              <a:rPr lang="en-US" sz="1200" kern="1200" dirty="0">
+                <a:solidFill>
+                  <a:schemeClr val="tx1"/>
+                </a:solidFill>
+                <a:effectLst/>
+                <a:latin typeface="+mn-lt"/>
+                <a:ea typeface="+mn-ea"/>
+                <a:cs typeface="+mn-cs"/>
+              </a:rPr>
+              <a:t>, 3-7.</a:t>
+            </a:r>
+          </a:p>
           <a:p>
             <a:endParaRPr lang="en-US" dirty="0"/>
           </a:p>
@@ -38735,23 +38970,18 @@
           <a:bodyPr/>
           <a:lstStyle/>
           <a:p>
-            <a:pPr marL="0" marR="0" lvl="0" indent="0" algn="l" defTabSz="914400" rtl="0" eaLnBrk="1" fontAlgn="auto" latinLnBrk="0" hangingPunct="1">
-              <a:lnSpc>
-                <a:spcPct val="100000"/>
-              </a:lnSpc>
-              <a:spcBef>
-                <a:spcPts val="0"/>
-              </a:spcBef>
-              <a:spcAft>
-                <a:spcPts val="0"/>
-              </a:spcAft>
-              <a:buClrTx/>
-              <a:buSzTx/>
-              <a:buFontTx/>
-              <a:buNone/>
-              <a:tabLst/>
-              <a:defRPr/>
-            </a:pPr>
+            <a:r>
+              <a:rPr lang="en-US" sz="1200" kern="1200" dirty="0" err="1">
+                <a:solidFill>
+                  <a:schemeClr val="tx1"/>
+                </a:solidFill>
+                <a:effectLst/>
+                <a:latin typeface="+mn-lt"/>
+                <a:ea typeface="+mn-ea"/>
+                <a:cs typeface="+mn-cs"/>
+              </a:rPr>
+              <a:t>CyberSecurity</a:t>
+            </a:r>
             <a:r>
               <a:rPr lang="en-US" sz="1200" kern="1200" dirty="0">
                 <a:solidFill>
@@ -38762,129 +38992,8 @@
                 <a:ea typeface="+mn-ea"/>
                 <a:cs typeface="+mn-cs"/>
               </a:rPr>
-              <a:t>Cybersecurity refers to a collection of mechanisms and processes that constrain risk to business processes by ensuring they are meet performance and consistency expectations, even under erroneous conditions.  These erroneous conditions arise due to both malicious or negligent scenarios.  </a:t>
+              <a:t> refers to a collection of mechanisms and processes that constrain risk to business processes by ensuring they are meet performance and consistency expectations, even under erroneous conditions (Mickens, 2018).  These erroneous conditions arise due to both malicious or negligent scenarios.  For instance, when two services are communicating across a private network, numerous risks to their continuity exist, such as the switch could become faulty and lossy.  Security protections, like Transport Layer Security (TLS), can detect the hardware failure through checksums that are visible at the application layer.  A second product defect might cause a surge of traffic, and without traffic-shaping technologies results in overloading the downstream services.  A third defect might incorrectly combine data with commands, such as a single quote that triggers a SQL injection and crashing the application.  From the perspective of the end-user, it does not matter if our services fail because of hardware, configuration, weak quota management, or incorrect application code.  They care that the system works.  These scenarios hurt the reputation of the service operators and weaken the competitive position of the business.</a:t>
             </a:r>
-          </a:p>
-          <a:p>
-            <a:pPr marL="0" marR="0" lvl="0" indent="0" algn="l" defTabSz="914400" rtl="0" eaLnBrk="1" fontAlgn="auto" latinLnBrk="0" hangingPunct="1">
-              <a:lnSpc>
-                <a:spcPct val="100000"/>
-              </a:lnSpc>
-              <a:spcBef>
-                <a:spcPts val="0"/>
-              </a:spcBef>
-              <a:spcAft>
-                <a:spcPts val="0"/>
-              </a:spcAft>
-              <a:buClrTx/>
-              <a:buSzTx/>
-              <a:buFontTx/>
-              <a:buNone/>
-              <a:tabLst/>
-              <a:defRPr/>
-            </a:pPr>
-            <a:endParaRPr lang="en-US" sz="1200" kern="1200" dirty="0">
-              <a:solidFill>
-                <a:schemeClr val="tx1"/>
-              </a:solidFill>
-              <a:effectLst/>
-              <a:latin typeface="+mn-lt"/>
-              <a:ea typeface="+mn-ea"/>
-              <a:cs typeface="+mn-cs"/>
-            </a:endParaRPr>
-          </a:p>
-          <a:p>
-            <a:pPr marL="0" marR="0" lvl="0" indent="0" algn="l" defTabSz="914400" rtl="0" eaLnBrk="1" fontAlgn="auto" latinLnBrk="0" hangingPunct="1">
-              <a:lnSpc>
-                <a:spcPct val="100000"/>
-              </a:lnSpc>
-              <a:spcBef>
-                <a:spcPts val="0"/>
-              </a:spcBef>
-              <a:spcAft>
-                <a:spcPts val="0"/>
-              </a:spcAft>
-              <a:buClrTx/>
-              <a:buSzTx/>
-              <a:buFontTx/>
-              <a:buNone/>
-              <a:tabLst/>
-              <a:defRPr/>
-            </a:pPr>
-            <a:r>
-              <a:rPr lang="en-US" sz="1200" kern="1200" dirty="0">
-                <a:solidFill>
-                  <a:schemeClr val="tx1"/>
-                </a:solidFill>
-                <a:effectLst/>
-                <a:latin typeface="+mn-lt"/>
-                <a:ea typeface="+mn-ea"/>
-                <a:cs typeface="+mn-cs"/>
-              </a:rPr>
-              <a:t>For instance, when two services are communicating across a private network, numerous risks to their continuity exist, such as the switch could become faulty or lossy.  Security protections, like Transport Layer Security (TLS), can detect the hardware failure through checksums that are visible at the application layer.  A product defect might cause a surge of traffic, and without traffic-shaping technologies result in overloading the downstream services.  Another defect might incorrectly combine data with commands, such as a single quote that triggers a SQL injection and crashing the application.  </a:t>
-            </a:r>
-          </a:p>
-          <a:p>
-            <a:pPr marL="0" marR="0" lvl="0" indent="0" algn="l" defTabSz="914400" rtl="0" eaLnBrk="1" fontAlgn="auto" latinLnBrk="0" hangingPunct="1">
-              <a:lnSpc>
-                <a:spcPct val="100000"/>
-              </a:lnSpc>
-              <a:spcBef>
-                <a:spcPts val="0"/>
-              </a:spcBef>
-              <a:spcAft>
-                <a:spcPts val="0"/>
-              </a:spcAft>
-              <a:buClrTx/>
-              <a:buSzTx/>
-              <a:buFontTx/>
-              <a:buNone/>
-              <a:tabLst/>
-              <a:defRPr/>
-            </a:pPr>
-            <a:endParaRPr lang="en-US" sz="1200" kern="1200" dirty="0">
-              <a:solidFill>
-                <a:schemeClr val="tx1"/>
-              </a:solidFill>
-              <a:effectLst/>
-              <a:latin typeface="+mn-lt"/>
-              <a:ea typeface="+mn-ea"/>
-              <a:cs typeface="+mn-cs"/>
-            </a:endParaRPr>
-          </a:p>
-          <a:p>
-            <a:pPr marL="0" marR="0" lvl="0" indent="0" algn="l" defTabSz="914400" rtl="0" eaLnBrk="1" fontAlgn="auto" latinLnBrk="0" hangingPunct="1">
-              <a:lnSpc>
-                <a:spcPct val="100000"/>
-              </a:lnSpc>
-              <a:spcBef>
-                <a:spcPts val="0"/>
-              </a:spcBef>
-              <a:spcAft>
-                <a:spcPts val="0"/>
-              </a:spcAft>
-              <a:buClrTx/>
-              <a:buSzTx/>
-              <a:buFontTx/>
-              <a:buNone/>
-              <a:tabLst/>
-              <a:defRPr/>
-            </a:pPr>
-            <a:r>
-              <a:rPr lang="en-US" sz="1200" kern="1200" dirty="0">
-                <a:solidFill>
-                  <a:schemeClr val="tx1"/>
-                </a:solidFill>
-                <a:effectLst/>
-                <a:latin typeface="+mn-lt"/>
-                <a:ea typeface="+mn-ea"/>
-                <a:cs typeface="+mn-cs"/>
-              </a:rPr>
-              <a:t>From the perspective of the end-user, it does not matter if our services fail because of hardware, configuration, weak quota management, or incorrect application code.  They care that the system works.  These scenarios hurt the reputation of the service operators and weaken the competitive position of the organization.</a:t>
-            </a:r>
-          </a:p>
-          <a:p>
-            <a:endParaRPr lang="en-US" dirty="0"/>
           </a:p>
         </p:txBody>
       </p:sp>
@@ -38968,23 +39077,6 @@
           <a:bodyPr/>
           <a:lstStyle/>
           <a:p>
-            <a:pPr marL="0" marR="0" lvl="0" indent="0" algn="l" defTabSz="914400" rtl="0" eaLnBrk="1" fontAlgn="auto" latinLnBrk="0" hangingPunct="1">
-              <a:lnSpc>
-                <a:spcPct val="100000"/>
-              </a:lnSpc>
-              <a:spcBef>
-                <a:spcPts val="0"/>
-              </a:spcBef>
-              <a:spcAft>
-                <a:spcPts val="0"/>
-              </a:spcAft>
-              <a:buClrTx/>
-              <a:buSzTx/>
-              <a:buFontTx/>
-              <a:buNone/>
-              <a:tabLst/>
-              <a:defRPr/>
-            </a:pPr>
             <a:r>
               <a:rPr lang="en-US" sz="1200" kern="1200" dirty="0">
                 <a:solidFill>
@@ -38995,55 +39087,20 @@
                 <a:ea typeface="+mn-ea"/>
                 <a:cs typeface="+mn-cs"/>
               </a:rPr>
-              <a:t>The attack surface of an organization has drastically evolved over the last twenty years, from a focus on attackers and technology to centering around people and processes.  Previous, the administrators could sleep comfortably, knowing that only a few people with physical access could interact with their networked topologies.  Over time the needs of these topologies grew to support complex communication systems that interact with employees, contractors, and anonymous guests.  </a:t>
+              <a:t>The attack surface of an organization has drastically evolved over the last twenty years, from a focus on attackers and technology to centering around people and processes.  Previously, the administrators could sleep comfortably, knowing that only a few people with physical access could interact with their networked topologies (Hunt, 2019).  Over time the needs of these topologies grew to support complex communication systems that interact with employees, contractors, and also anonymous guests.  Attacks from these anonymous guests is another evolving area.  Where former hackers would carry out manual attacks, those with botnets could use automation to increase their leverage.  However, in the modern world, the ubiquitous availability of cloud and high-speed networking removes these artificial constraints.  Now, anyone with a few dollars and an open-source vulnerability scanner can programmatically cluster targets and attack the signature as a whole  (Dai </a:t>
             </a:r>
-          </a:p>
-          <a:p>
-            <a:pPr marL="0" marR="0" lvl="0" indent="0" algn="l" defTabSz="914400" rtl="0" eaLnBrk="1" fontAlgn="auto" latinLnBrk="0" hangingPunct="1">
-              <a:lnSpc>
-                <a:spcPct val="100000"/>
-              </a:lnSpc>
-              <a:spcBef>
-                <a:spcPts val="0"/>
-              </a:spcBef>
-              <a:spcAft>
-                <a:spcPts val="0"/>
-              </a:spcAft>
-              <a:buClrTx/>
-              <a:buSzTx/>
-              <a:buFontTx/>
-              <a:buNone/>
-              <a:tabLst/>
-              <a:defRPr/>
-            </a:pPr>
-            <a:endParaRPr lang="en-US" sz="1200" kern="1200" dirty="0">
-              <a:solidFill>
-                <a:schemeClr val="tx1"/>
-              </a:solidFill>
-              <a:effectLst/>
-              <a:latin typeface="+mn-lt"/>
-              <a:ea typeface="+mn-ea"/>
-              <a:cs typeface="+mn-cs"/>
-            </a:endParaRPr>
-          </a:p>
-          <a:p>
-            <a:pPr marL="0" marR="0" lvl="0" indent="0" algn="l" defTabSz="914400" rtl="0" eaLnBrk="1" fontAlgn="auto" latinLnBrk="0" hangingPunct="1">
-              <a:lnSpc>
-                <a:spcPct val="100000"/>
-              </a:lnSpc>
-              <a:spcBef>
-                <a:spcPts val="0"/>
-              </a:spcBef>
-              <a:spcAft>
-                <a:spcPts val="0"/>
-              </a:spcAft>
-              <a:buClrTx/>
-              <a:buSzTx/>
-              <a:buFontTx/>
-              <a:buNone/>
-              <a:tabLst/>
-              <a:defRPr/>
-            </a:pPr>
+            <a:r>
+              <a:rPr lang="en-US" sz="1200" kern="1200" dirty="0" err="1">
+                <a:solidFill>
+                  <a:schemeClr val="tx1"/>
+                </a:solidFill>
+                <a:effectLst/>
+                <a:latin typeface="+mn-lt"/>
+                <a:ea typeface="+mn-ea"/>
+                <a:cs typeface="+mn-cs"/>
+              </a:rPr>
+              <a:t>Zovi</a:t>
+            </a:r>
             <a:r>
               <a:rPr lang="en-US" sz="1200" kern="1200" dirty="0">
                 <a:solidFill>
@@ -39054,55 +39111,20 @@
                 <a:ea typeface="+mn-ea"/>
                 <a:cs typeface="+mn-cs"/>
               </a:rPr>
-              <a:t>Some of these anonymous guests want to attack the corporate network, though this is another evolving area.  Where former hackers would carry out manual attacks, those with botnets could use automation to increase their leverage.  However, in the modern world, the ubiquitous availability of cloud and high-speed networking removes these artificial constraints.  Now, anyone with a few dollars and an open-source vulnerability scanner can programmatically attack multiple network segments.  </a:t>
+              <a:t>, 2019).  Substantial effort goes into protecting these platforms, but little attention considers the other side of the equation—all of these people (Blythe &amp; Coventry, 2018).  Modern enterprise networks have hundreds of users that are authorized to perform tasks. When those users fail, it can be very challenging to detect, mitigate, or even control the blast radius  (</a:t>
             </a:r>
-          </a:p>
-          <a:p>
-            <a:pPr marL="0" marR="0" lvl="0" indent="0" algn="l" defTabSz="914400" rtl="0" eaLnBrk="1" fontAlgn="auto" latinLnBrk="0" hangingPunct="1">
-              <a:lnSpc>
-                <a:spcPct val="100000"/>
-              </a:lnSpc>
-              <a:spcBef>
-                <a:spcPts val="0"/>
-              </a:spcBef>
-              <a:spcAft>
-                <a:spcPts val="0"/>
-              </a:spcAft>
-              <a:buClrTx/>
-              <a:buSzTx/>
-              <a:buFontTx/>
-              <a:buNone/>
-              <a:tabLst/>
-              <a:defRPr/>
-            </a:pPr>
-            <a:endParaRPr lang="en-US" sz="1200" kern="1200" dirty="0">
-              <a:solidFill>
-                <a:schemeClr val="tx1"/>
-              </a:solidFill>
-              <a:effectLst/>
-              <a:latin typeface="+mn-lt"/>
-              <a:ea typeface="+mn-ea"/>
-              <a:cs typeface="+mn-cs"/>
-            </a:endParaRPr>
-          </a:p>
-          <a:p>
-            <a:pPr marL="0" marR="0" lvl="0" indent="0" algn="l" defTabSz="914400" rtl="0" eaLnBrk="1" fontAlgn="auto" latinLnBrk="0" hangingPunct="1">
-              <a:lnSpc>
-                <a:spcPct val="100000"/>
-              </a:lnSpc>
-              <a:spcBef>
-                <a:spcPts val="0"/>
-              </a:spcBef>
-              <a:spcAft>
-                <a:spcPts val="0"/>
-              </a:spcAft>
-              <a:buClrTx/>
-              <a:buSzTx/>
-              <a:buFontTx/>
-              <a:buNone/>
-              <a:tabLst/>
-              <a:defRPr/>
-            </a:pPr>
+            <a:r>
+              <a:rPr lang="en-US" sz="1200" kern="1200" dirty="0" err="1">
+                <a:solidFill>
+                  <a:schemeClr val="tx1"/>
+                </a:solidFill>
+                <a:effectLst/>
+                <a:latin typeface="+mn-lt"/>
+                <a:ea typeface="+mn-ea"/>
+                <a:cs typeface="+mn-cs"/>
+              </a:rPr>
+              <a:t>Elifoglu</a:t>
+            </a:r>
             <a:r>
               <a:rPr lang="en-US" sz="1200" kern="1200" dirty="0">
                 <a:solidFill>
@@ -39113,11 +39135,32 @@
                 <a:ea typeface="+mn-ea"/>
                 <a:cs typeface="+mn-cs"/>
               </a:rPr>
-              <a:t>Substantial effort goes into protecting these platforms, but little attention has considered on the other side of the equation—all these people.  Modern enterprise networks have hundreds of users that are authorized to perform tasks.  When those users fail, it can be very challenging to detect, mitigate, or even control the blast radius.  This realization creates the need for security engineers to design programs that center around awareness and skepticism.</a:t>
+              <a:t>, Abel, &amp; </a:t>
             </a:r>
-          </a:p>
-          <a:p>
-            <a:endParaRPr lang="en-US" dirty="0"/>
+            <a:r>
+              <a:rPr lang="en-US" sz="1200" kern="1200" dirty="0" err="1">
+                <a:solidFill>
+                  <a:schemeClr val="tx1"/>
+                </a:solidFill>
+                <a:effectLst/>
+                <a:latin typeface="+mn-lt"/>
+                <a:ea typeface="+mn-ea"/>
+                <a:cs typeface="+mn-cs"/>
+              </a:rPr>
+              <a:t>Tasseven</a:t>
+            </a:r>
+            <a:r>
+              <a:rPr lang="en-US" sz="1200" kern="1200" dirty="0">
+                <a:solidFill>
+                  <a:schemeClr val="tx1"/>
+                </a:solidFill>
+                <a:effectLst/>
+                <a:latin typeface="+mn-lt"/>
+                <a:ea typeface="+mn-ea"/>
+                <a:cs typeface="+mn-cs"/>
+              </a:rPr>
+              <a:t>, 2018).  This realization creates the need for security engineers to design programs that center around awareness and skepticism.</a:t>
+            </a:r>
           </a:p>
         </p:txBody>
       </p:sp>
@@ -39211,21 +39254,20 @@
                 <a:ea typeface="+mn-ea"/>
                 <a:cs typeface="+mn-cs"/>
               </a:rPr>
-              <a:t>When we step back and look at the numbers, half of the attacks target technology assets explicitly, such as probing for cross-site scripting bugs in our websites. The next quarter comes from humans interacting with hostile automation, e.g., phishing attacks and malicious mobile apps, and the final quarter from erroneous behaviors.  </a:t>
+              <a:t>When we step back and look at the numbers, half of the attacks target technology assets explicitly, such as probing for cross-site scripting bugs in our websites. The next quarter comes from humans interacting with hostile automation, e.g., phishing attacks and malicious mobile apps, and the final quarter from erroneous behaviors.  These figures suggest that creating a more security-aware culture could remove nearly half of the attack surface and strengthen business continuity (</a:t>
             </a:r>
-          </a:p>
-          <a:p>
-            <a:endParaRPr lang="en-US" sz="1200" kern="1200" dirty="0">
-              <a:solidFill>
-                <a:schemeClr val="tx1"/>
-              </a:solidFill>
-              <a:effectLst/>
-              <a:latin typeface="+mn-lt"/>
-              <a:ea typeface="+mn-ea"/>
-              <a:cs typeface="+mn-cs"/>
-            </a:endParaRPr>
-          </a:p>
-          <a:p>
+            <a:r>
+              <a:rPr lang="en-US" sz="1200" kern="1200" dirty="0" err="1">
+                <a:solidFill>
+                  <a:schemeClr val="tx1"/>
+                </a:solidFill>
+                <a:effectLst/>
+                <a:latin typeface="+mn-lt"/>
+                <a:ea typeface="+mn-ea"/>
+                <a:cs typeface="+mn-cs"/>
+              </a:rPr>
+              <a:t>Valiente</a:t>
+            </a:r>
             <a:r>
               <a:rPr lang="en-US" sz="1200" kern="1200" dirty="0">
                 <a:solidFill>
@@ -39236,23 +39278,8 @@
                 <a:ea typeface="+mn-ea"/>
                 <a:cs typeface="+mn-cs"/>
               </a:rPr>
-              <a:t>These figures suggest that creating a more security-aware culture can remove nearly half of the attack surface and strengthen business continuity.  For instance, when network engineers understand risk management, they create features that consider scalability and availability during the design versus after the solution has failed.  </a:t>
+              <a:t>, 2017).  For instance, when network engineers understand risk management, they create features that consider scalability and availability during the design versus after the solution has failed (Mickens J. , 2015).  It is too late to discuss service redundancies and fail-over technologies after the service is offline, or least privileges after a support technician accidentally corrupts customer data.  These challenges will continue to occur until there is sufficient awareness, and team members understand the damage that follows their actions.  If we can at least stop the good guys doing bad stuff, the organization would be in a much better position.</a:t>
             </a:r>
-          </a:p>
-          <a:p>
-            <a:r>
-              <a:rPr lang="en-US" sz="1200" kern="1200" dirty="0">
-                <a:solidFill>
-                  <a:schemeClr val="tx1"/>
-                </a:solidFill>
-                <a:effectLst/>
-                <a:latin typeface="+mn-lt"/>
-                <a:ea typeface="+mn-ea"/>
-                <a:cs typeface="+mn-cs"/>
-              </a:rPr>
-              <a:t>It is too late to discuss service redundancies and fail-over technologies after the service is offline.  Similarly, it is too late to discuss the least privileges after a support technician accidentally corrupts customer data.</a:t>
-            </a:r>
-            <a:endParaRPr lang="en-US" dirty="0"/>
           </a:p>
         </p:txBody>
       </p:sp>
@@ -39346,21 +39373,20 @@
                 <a:ea typeface="+mn-ea"/>
                 <a:cs typeface="+mn-cs"/>
               </a:rPr>
-              <a:t>Before the Internet, the attack surface was limited to criminals breaking down the front door and stealing the safe.  Now businesses are highly connected through always-on technologies that interact with the outside world.  Critical infrastructure, like DNS and LDAP, also resides outside of the corporate firewall creating a more abstract notion of where the network ends.</a:t>
+              <a:t>Before the Internet, a more limited attack surface could focus on more traditional criminals threats, like someone breaking down the front door and stealing the safe.  Now businesses are highly connected through always-on technologies that interact with the outside world.  The network boundary is now abstract with critical infrastructures, resides outside of the corporate firewall  (</a:t>
             </a:r>
-          </a:p>
-          <a:p>
-            <a:endParaRPr lang="en-US" sz="1200" kern="1200" dirty="0">
-              <a:solidFill>
-                <a:schemeClr val="tx1"/>
-              </a:solidFill>
-              <a:effectLst/>
-              <a:latin typeface="+mn-lt"/>
-              <a:ea typeface="+mn-ea"/>
-              <a:cs typeface="+mn-cs"/>
-            </a:endParaRPr>
-          </a:p>
-          <a:p>
+            <a:r>
+              <a:rPr lang="en-US" sz="1200" kern="1200" dirty="0" err="1">
+                <a:solidFill>
+                  <a:schemeClr val="tx1"/>
+                </a:solidFill>
+                <a:effectLst/>
+                <a:latin typeface="+mn-lt"/>
+                <a:ea typeface="+mn-ea"/>
+                <a:cs typeface="+mn-cs"/>
+              </a:rPr>
+              <a:t>Paller</a:t>
+            </a:r>
             <a:r>
               <a:rPr lang="en-US" sz="1200" kern="1200" dirty="0">
                 <a:solidFill>
@@ -39371,36 +39397,8 @@
                 <a:ea typeface="+mn-ea"/>
                 <a:cs typeface="+mn-cs"/>
               </a:rPr>
-              <a:t>Networks need to consider the impact of heterogeneous devices, that are not entirely under the control of the administrators.  How many employees use VPN and communication services from their phones?  How many work laptops also surf the public Internet?  Each of these devices is only weakly protected but allowed direct access to sensitive resources.  </a:t>
+              <a:t> et al., 2019).  Many enterprises outsource systems like such as Domain Name Services (DNS) and Lightweight Directory Access Protocol (LDAP) instead of self-hosting.  With the notion of connectivity spanning multiple contexts, network operators need to consider the interactions from heterogeneous devices, that are not entirely under the control of the administrators.  How many employees use Virtual Private Networking (VPN) and other communication services from their phones?  How many work laptops also surf the public Internet?  Each of these devices is only weakly protected but allowed direct access to sensitive resources.  Outsiders can also communicate with employees through emails, snail mails, voice calls, and video chats.  Each of these mediums invites unique attack vectors where scammers can attempt to insert unauthenticated messages.  If an attacker can manipulate support staff with a 55 cent stamp and one-page letter, then why bother with a more complex assault?</a:t>
             </a:r>
-          </a:p>
-          <a:p>
-            <a:endParaRPr lang="en-US" sz="1200" kern="1200" dirty="0">
-              <a:solidFill>
-                <a:schemeClr val="tx1"/>
-              </a:solidFill>
-              <a:effectLst/>
-              <a:latin typeface="+mn-lt"/>
-              <a:ea typeface="+mn-ea"/>
-              <a:cs typeface="+mn-cs"/>
-            </a:endParaRPr>
-          </a:p>
-          <a:p>
-            <a:r>
-              <a:rPr lang="en-US" sz="1200" kern="1200" dirty="0">
-                <a:solidFill>
-                  <a:schemeClr val="tx1"/>
-                </a:solidFill>
-                <a:effectLst/>
-                <a:latin typeface="+mn-lt"/>
-                <a:ea typeface="+mn-ea"/>
-                <a:cs typeface="+mn-cs"/>
-              </a:rPr>
-              <a:t>Though these are not the only mechanisms to interact with the employees, they also receive emails, snail mails, voice calls, and video chats.  Each of these mediums invites attack vectors where scammers can attempt to slip unauthenticated messages.  If an attacker can manipulate support staff with a 55-cent stamp and one-page letter, then why bother with a more complex assault?</a:t>
-            </a:r>
-          </a:p>
-          <a:p>
-            <a:endParaRPr lang="en-US" dirty="0"/>
           </a:p>
         </p:txBody>
       </p:sp>
@@ -39494,7 +39492,31 @@
                 <a:ea typeface="+mn-ea"/>
                 <a:cs typeface="+mn-cs"/>
               </a:rPr>
-              <a:t>Demystifying security begins with a framework of categorizing different attack vectors.  STRIDE enumerates these vectors as spoofing, tampering, repudiation, information disclosure, denial of service, and elevation of privileges.  While countless examples result in these scenarios, having an awareness of their existence, causes humans to look for them.</a:t>
+              <a:t>Demystifying security begins with a framework to categorize different attack vectors.  STRIDE enumerates these vectors as spoofing, tampering, repudiation, information disclosure, denial of service, and elevation of privileges (</a:t>
+            </a:r>
+            <a:r>
+              <a:rPr lang="en-US" sz="1200" kern="1200" dirty="0" err="1">
+                <a:solidFill>
+                  <a:schemeClr val="tx1"/>
+                </a:solidFill>
+                <a:effectLst/>
+                <a:latin typeface="+mn-lt"/>
+                <a:ea typeface="+mn-ea"/>
+                <a:cs typeface="+mn-cs"/>
+              </a:rPr>
+              <a:t>Kohnfelder</a:t>
+            </a:r>
+            <a:r>
+              <a:rPr lang="en-US" sz="1200" kern="1200" dirty="0">
+                <a:solidFill>
+                  <a:schemeClr val="tx1"/>
+                </a:solidFill>
+                <a:effectLst/>
+                <a:latin typeface="+mn-lt"/>
+                <a:ea typeface="+mn-ea"/>
+                <a:cs typeface="+mn-cs"/>
+              </a:rPr>
+              <a:t> &amp; Garg, 1999).  While countless examples result in these scenarios, having an awareness of their existence provides a basis for people even to consider them.</a:t>
             </a:r>
           </a:p>
           <a:p>
@@ -39942,23 +39964,6 @@
           <a:bodyPr/>
           <a:lstStyle/>
           <a:p>
-            <a:pPr marL="0" marR="0" lvl="0" indent="0" algn="l" defTabSz="914400" rtl="0" eaLnBrk="1" fontAlgn="auto" latinLnBrk="0" hangingPunct="1">
-              <a:lnSpc>
-                <a:spcPct val="100000"/>
-              </a:lnSpc>
-              <a:spcBef>
-                <a:spcPts val="0"/>
-              </a:spcBef>
-              <a:spcAft>
-                <a:spcPts val="0"/>
-              </a:spcAft>
-              <a:buClrTx/>
-              <a:buSzTx/>
-              <a:buFontTx/>
-              <a:buNone/>
-              <a:tabLst/>
-              <a:defRPr/>
-            </a:pPr>
             <a:r>
               <a:rPr lang="en-US" sz="1200" kern="1200" dirty="0">
                 <a:solidFill>
@@ -39969,247 +39974,8 @@
                 <a:ea typeface="+mn-ea"/>
                 <a:cs typeface="+mn-cs"/>
               </a:rPr>
-              <a:t>It can be challenging to enumerate the threats against an abstract system of interactions, and this creates the need for a more methodical approach.  This process could begin with first enumerating the different entities and resources within the system.  For instance, the coffee shop has staff, managers, point of sale systems, and coffee machines.  </a:t>
+              <a:t>It can be challenging to enumerate the threats against an abstract system of interactions, and this creates the need for a more methodical approach.  This process could begin with first identifying the different entities and resources within the environment.  For instance, the coffee shop has staff, managers, point of sale systems, and coffee machines.  Next, consider the different endpoints that exist to communicate with these systems.  Customers can talk with the brewers, provide loyalty reward cards, escalate to management, and use different payment technologies.  There are implicit and explicit trust boundaries between the customers, staff, and management that allows communication to flow in various contexts.  As customers buy coffee, there is an unspoken protocol that begins at the register, followed by waiting in line and receiving a cup shortly afterward.  The venue has various security systems such as locks on office doors, cameras, and personal watching the customers.</a:t>
             </a:r>
-          </a:p>
-          <a:p>
-            <a:pPr marL="0" marR="0" lvl="0" indent="0" algn="l" defTabSz="914400" rtl="0" eaLnBrk="1" fontAlgn="auto" latinLnBrk="0" hangingPunct="1">
-              <a:lnSpc>
-                <a:spcPct val="100000"/>
-              </a:lnSpc>
-              <a:spcBef>
-                <a:spcPts val="0"/>
-              </a:spcBef>
-              <a:spcAft>
-                <a:spcPts val="0"/>
-              </a:spcAft>
-              <a:buClrTx/>
-              <a:buSzTx/>
-              <a:buFontTx/>
-              <a:buNone/>
-              <a:tabLst/>
-              <a:defRPr/>
-            </a:pPr>
-            <a:endParaRPr lang="en-US" sz="1200" kern="1200" dirty="0">
-              <a:solidFill>
-                <a:schemeClr val="tx1"/>
-              </a:solidFill>
-              <a:effectLst/>
-              <a:latin typeface="+mn-lt"/>
-              <a:ea typeface="+mn-ea"/>
-              <a:cs typeface="+mn-cs"/>
-            </a:endParaRPr>
-          </a:p>
-          <a:p>
-            <a:pPr marL="0" marR="0" lvl="0" indent="0" algn="l" defTabSz="914400" rtl="0" eaLnBrk="1" fontAlgn="auto" latinLnBrk="0" hangingPunct="1">
-              <a:lnSpc>
-                <a:spcPct val="100000"/>
-              </a:lnSpc>
-              <a:spcBef>
-                <a:spcPts val="0"/>
-              </a:spcBef>
-              <a:spcAft>
-                <a:spcPts val="0"/>
-              </a:spcAft>
-              <a:buClrTx/>
-              <a:buSzTx/>
-              <a:buFontTx/>
-              <a:buNone/>
-              <a:tabLst/>
-              <a:defRPr/>
-            </a:pPr>
-            <a:r>
-              <a:rPr lang="en-US" sz="1200" kern="1200" dirty="0">
-                <a:solidFill>
-                  <a:schemeClr val="tx1"/>
-                </a:solidFill>
-                <a:effectLst/>
-                <a:latin typeface="+mn-lt"/>
-                <a:ea typeface="+mn-ea"/>
-                <a:cs typeface="+mn-cs"/>
-              </a:rPr>
-              <a:t>Next, consider the different endpoints that exist to communicate with these systems.  Customers can talk with the staff, provide loyalty reward cards, escalate to management, and use different payment technologies.  </a:t>
-            </a:r>
-          </a:p>
-          <a:p>
-            <a:pPr marL="0" marR="0" lvl="0" indent="0" algn="l" defTabSz="914400" rtl="0" eaLnBrk="1" fontAlgn="auto" latinLnBrk="0" hangingPunct="1">
-              <a:lnSpc>
-                <a:spcPct val="100000"/>
-              </a:lnSpc>
-              <a:spcBef>
-                <a:spcPts val="0"/>
-              </a:spcBef>
-              <a:spcAft>
-                <a:spcPts val="0"/>
-              </a:spcAft>
-              <a:buClrTx/>
-              <a:buSzTx/>
-              <a:buFontTx/>
-              <a:buNone/>
-              <a:tabLst/>
-              <a:defRPr/>
-            </a:pPr>
-            <a:endParaRPr lang="en-US" sz="1200" kern="1200" dirty="0">
-              <a:solidFill>
-                <a:schemeClr val="tx1"/>
-              </a:solidFill>
-              <a:effectLst/>
-              <a:latin typeface="+mn-lt"/>
-              <a:ea typeface="+mn-ea"/>
-              <a:cs typeface="+mn-cs"/>
-            </a:endParaRPr>
-          </a:p>
-          <a:p>
-            <a:pPr marL="0" marR="0" lvl="0" indent="0" algn="l" defTabSz="914400" rtl="0" eaLnBrk="1" fontAlgn="auto" latinLnBrk="0" hangingPunct="1">
-              <a:lnSpc>
-                <a:spcPct val="100000"/>
-              </a:lnSpc>
-              <a:spcBef>
-                <a:spcPts val="0"/>
-              </a:spcBef>
-              <a:spcAft>
-                <a:spcPts val="0"/>
-              </a:spcAft>
-              <a:buClrTx/>
-              <a:buSzTx/>
-              <a:buFontTx/>
-              <a:buNone/>
-              <a:tabLst/>
-              <a:defRPr/>
-            </a:pPr>
-            <a:r>
-              <a:rPr lang="en-US" sz="1200" kern="1200" dirty="0">
-                <a:solidFill>
-                  <a:schemeClr val="tx1"/>
-                </a:solidFill>
-                <a:effectLst/>
-                <a:latin typeface="+mn-lt"/>
-                <a:ea typeface="+mn-ea"/>
-                <a:cs typeface="+mn-cs"/>
-              </a:rPr>
-              <a:t>There are implicit and explicit trust boundaries between the customers, staff, and management that allows communication to flow in various contexts.  </a:t>
-            </a:r>
-          </a:p>
-          <a:p>
-            <a:pPr marL="0" marR="0" lvl="0" indent="0" algn="l" defTabSz="914400" rtl="0" eaLnBrk="1" fontAlgn="auto" latinLnBrk="0" hangingPunct="1">
-              <a:lnSpc>
-                <a:spcPct val="100000"/>
-              </a:lnSpc>
-              <a:spcBef>
-                <a:spcPts val="0"/>
-              </a:spcBef>
-              <a:spcAft>
-                <a:spcPts val="0"/>
-              </a:spcAft>
-              <a:buClrTx/>
-              <a:buSzTx/>
-              <a:buFontTx/>
-              <a:buNone/>
-              <a:tabLst/>
-              <a:defRPr/>
-            </a:pPr>
-            <a:endParaRPr lang="en-US" sz="1200" kern="1200" dirty="0">
-              <a:solidFill>
-                <a:schemeClr val="tx1"/>
-              </a:solidFill>
-              <a:effectLst/>
-              <a:latin typeface="+mn-lt"/>
-              <a:ea typeface="+mn-ea"/>
-              <a:cs typeface="+mn-cs"/>
-            </a:endParaRPr>
-          </a:p>
-          <a:p>
-            <a:pPr marL="0" marR="0" lvl="0" indent="0" algn="l" defTabSz="914400" rtl="0" eaLnBrk="1" fontAlgn="auto" latinLnBrk="0" hangingPunct="1">
-              <a:lnSpc>
-                <a:spcPct val="100000"/>
-              </a:lnSpc>
-              <a:spcBef>
-                <a:spcPts val="0"/>
-              </a:spcBef>
-              <a:spcAft>
-                <a:spcPts val="0"/>
-              </a:spcAft>
-              <a:buClrTx/>
-              <a:buSzTx/>
-              <a:buFontTx/>
-              <a:buNone/>
-              <a:tabLst/>
-              <a:defRPr/>
-            </a:pPr>
-            <a:r>
-              <a:rPr lang="en-US" sz="1200" kern="1200" dirty="0">
-                <a:solidFill>
-                  <a:schemeClr val="tx1"/>
-                </a:solidFill>
-                <a:effectLst/>
-                <a:latin typeface="+mn-lt"/>
-                <a:ea typeface="+mn-ea"/>
-                <a:cs typeface="+mn-cs"/>
-              </a:rPr>
-              <a:t>As customers buy coffee, there is an unspoken protocol that begins at the register, waits in line, then gets the cup a few minutes later.  </a:t>
-            </a:r>
-          </a:p>
-          <a:p>
-            <a:pPr marL="0" marR="0" lvl="0" indent="0" algn="l" defTabSz="914400" rtl="0" eaLnBrk="1" fontAlgn="auto" latinLnBrk="0" hangingPunct="1">
-              <a:lnSpc>
-                <a:spcPct val="100000"/>
-              </a:lnSpc>
-              <a:spcBef>
-                <a:spcPts val="0"/>
-              </a:spcBef>
-              <a:spcAft>
-                <a:spcPts val="0"/>
-              </a:spcAft>
-              <a:buClrTx/>
-              <a:buSzTx/>
-              <a:buFontTx/>
-              <a:buNone/>
-              <a:tabLst/>
-              <a:defRPr/>
-            </a:pPr>
-            <a:endParaRPr lang="en-US" sz="1200" kern="1200" dirty="0">
-              <a:solidFill>
-                <a:schemeClr val="tx1"/>
-              </a:solidFill>
-              <a:effectLst/>
-              <a:latin typeface="+mn-lt"/>
-              <a:ea typeface="+mn-ea"/>
-              <a:cs typeface="+mn-cs"/>
-            </a:endParaRPr>
-          </a:p>
-          <a:p>
-            <a:pPr marL="0" marR="0" lvl="0" indent="0" algn="l" defTabSz="914400" rtl="0" eaLnBrk="1" fontAlgn="auto" latinLnBrk="0" hangingPunct="1">
-              <a:lnSpc>
-                <a:spcPct val="100000"/>
-              </a:lnSpc>
-              <a:spcBef>
-                <a:spcPts val="0"/>
-              </a:spcBef>
-              <a:spcAft>
-                <a:spcPts val="0"/>
-              </a:spcAft>
-              <a:buClrTx/>
-              <a:buSzTx/>
-              <a:buFontTx/>
-              <a:buNone/>
-              <a:tabLst/>
-              <a:defRPr/>
-            </a:pPr>
-            <a:r>
-              <a:rPr lang="en-US" sz="1200" kern="1200" dirty="0">
-                <a:solidFill>
-                  <a:schemeClr val="tx1"/>
-                </a:solidFill>
-                <a:effectLst/>
-                <a:latin typeface="+mn-lt"/>
-                <a:ea typeface="+mn-ea"/>
-                <a:cs typeface="+mn-cs"/>
-              </a:rPr>
-              <a:t>The venue has various security systems such as locks on office doors, cameras, and personal watching the customers.</a:t>
-            </a:r>
-          </a:p>
-          <a:p>
-            <a:endParaRPr lang="en-US" dirty="0"/>
           </a:p>
         </p:txBody>
       </p:sp>
@@ -40303,21 +40069,20 @@
                 <a:ea typeface="+mn-ea"/>
                 <a:cs typeface="+mn-cs"/>
               </a:rPr>
-              <a:t>After listing the different resources and interactions, some of the threats against the coffee shop become clearer.  Consider the purchasing protocol and ask what enforces the sequence of events?   A customer could skip the cashier and insist their order was lost or reuse their receipt to get a second cup.  Many loyalty programs use punch cards to track the tenth cup is free and run the risk of tampering.  Perhaps the chain offers free coffee to employees, and a customer claims they are a new hire from a different branch.  Some establishments allow customers to get free refills but do not authenticate they purchase the first cup.  How about complaining to management about the service, and demanding a free cup?  </a:t>
+              <a:t>After listing the different resources and interactions, some of the threats against the coffee shop become more clear.  Consider the purchasing protocol and ask what enforces the sequence of events?   A customer could skip the cashier and insist their order was lost, or reuse their receipt to get a second cup.  Many loyalty programs use punch cards to track the tenth cup is free, and run the risk of tampering.  Perhaps the chain offers free coffee to employees, and a customer claims they are a new hire from a different branch.  Some establishments allow customers to get free refills but do not confirm the first cup was purchased.  Maybe, complaining to management about the service results in free Joe.  Are these attacks specific to coffee shops?  No, these low-tech attacks are reliable across many human-interactions due to a lack of skepticism (Mickens, 2018).  Why would the customer try to scam me? That is something that happens to other people, not me (</a:t>
             </a:r>
-          </a:p>
-          <a:p>
-            <a:endParaRPr lang="en-US" sz="1200" kern="1200" dirty="0">
-              <a:solidFill>
-                <a:schemeClr val="tx1"/>
-              </a:solidFill>
-              <a:effectLst/>
-              <a:latin typeface="+mn-lt"/>
-              <a:ea typeface="+mn-ea"/>
-              <a:cs typeface="+mn-cs"/>
-            </a:endParaRPr>
-          </a:p>
-          <a:p>
+            <a:r>
+              <a:rPr lang="en-US" sz="1200" kern="1200" dirty="0" err="1">
+                <a:solidFill>
+                  <a:schemeClr val="tx1"/>
+                </a:solidFill>
+                <a:effectLst/>
+                <a:latin typeface="+mn-lt"/>
+                <a:ea typeface="+mn-ea"/>
+                <a:cs typeface="+mn-cs"/>
+              </a:rPr>
+              <a:t>Valiente</a:t>
+            </a:r>
             <a:r>
               <a:rPr lang="en-US" sz="1200" kern="1200" dirty="0">
                 <a:solidFill>
@@ -40328,11 +40093,8 @@
                 <a:ea typeface="+mn-ea"/>
                 <a:cs typeface="+mn-cs"/>
               </a:rPr>
-              <a:t>Are these attacks specific to coffee shops?  No, these low-tech attacks are reliable across many human-interactions due to a lack of skepticism.  Why would the customer try to scam me? That is something that happens to other people, not me. </a:t>
+              <a:t>, 2017).  Given the permutations of these scenarios, it is not possible to explicitly training employees, and there needs to be a high-level consciousness of business risks.  This transformation requires a complete culture shift toward security awareness.</a:t>
             </a:r>
-          </a:p>
-          <a:p>
-            <a:endParaRPr lang="en-US" dirty="0"/>
           </a:p>
         </p:txBody>
       </p:sp>
@@ -40416,23 +40178,6 @@
           <a:bodyPr/>
           <a:lstStyle/>
           <a:p>
-            <a:pPr marL="0" marR="0" lvl="0" indent="0" algn="l" defTabSz="914400" rtl="0" eaLnBrk="1" fontAlgn="auto" latinLnBrk="0" hangingPunct="1">
-              <a:lnSpc>
-                <a:spcPct val="100000"/>
-              </a:lnSpc>
-              <a:spcBef>
-                <a:spcPts val="0"/>
-              </a:spcBef>
-              <a:spcAft>
-                <a:spcPts val="0"/>
-              </a:spcAft>
-              <a:buClrTx/>
-              <a:buSzTx/>
-              <a:buFontTx/>
-              <a:buNone/>
-              <a:tabLst/>
-              <a:defRPr/>
-            </a:pPr>
             <a:r>
               <a:rPr lang="en-US" sz="1200" kern="1200" dirty="0">
                 <a:solidFill>
@@ -40443,129 +40188,8 @@
                 <a:ea typeface="+mn-ea"/>
                 <a:cs typeface="+mn-cs"/>
               </a:rPr>
-              <a:t>When an organization makes security a core pillar of their design methodology, it reduces risks and provides more reliable services.  Integrating this mindset requires a culture shift where the employees are skeptical and ask questions about “how they will ensure meeting specific performance and reliability metrics.”  For instance, how are parameters validated and authenticated?  What mechanism is authorizing the specific action?  How will we record the action that took place?  These questions are not limited to technical systems and apply to interpersonal interactions.  </a:t>
+              <a:t>When an organization makes security a core pillar of their design methodology, it reduces risks and provides more reliable services.  Integrating this mindset requires a culture shift where the employees are skeptical and ask how implementation and execution will ensure specific performance and reliability metrics.  For instance, how are request parameters validated and authenticated?  What mechanism is authorizing the specific action?  How will we record the action that took place?  These questions are not limited to technical systems, and also apply to interpersonal interactions.  For example, when an email comes into the accounting department and requests updates to the payment information, what confirms the message is not spoofed?  Does the secretary have the authorization to make the filing change, or does it require management approval?  How will an external auditor trace this change, legitimate or not?  Perhaps even 9 out of 10 times, the message is genuine, but consider the impact of a typographical error on either side.  Now, payments are going to the wrong place, and the organization needs to follow complex banking policies to get their money back.  “To err is human,” negligence is all around us, so we need to remain skeptical and confirm the accuracy of all information.</a:t>
             </a:r>
-          </a:p>
-          <a:p>
-            <a:pPr marL="0" marR="0" lvl="0" indent="0" algn="l" defTabSz="914400" rtl="0" eaLnBrk="1" fontAlgn="auto" latinLnBrk="0" hangingPunct="1">
-              <a:lnSpc>
-                <a:spcPct val="100000"/>
-              </a:lnSpc>
-              <a:spcBef>
-                <a:spcPts val="0"/>
-              </a:spcBef>
-              <a:spcAft>
-                <a:spcPts val="0"/>
-              </a:spcAft>
-              <a:buClrTx/>
-              <a:buSzTx/>
-              <a:buFontTx/>
-              <a:buNone/>
-              <a:tabLst/>
-              <a:defRPr/>
-            </a:pPr>
-            <a:endParaRPr lang="en-US" sz="1200" kern="1200" dirty="0">
-              <a:solidFill>
-                <a:schemeClr val="tx1"/>
-              </a:solidFill>
-              <a:effectLst/>
-              <a:latin typeface="+mn-lt"/>
-              <a:ea typeface="+mn-ea"/>
-              <a:cs typeface="+mn-cs"/>
-            </a:endParaRPr>
-          </a:p>
-          <a:p>
-            <a:pPr marL="0" marR="0" lvl="0" indent="0" algn="l" defTabSz="914400" rtl="0" eaLnBrk="1" fontAlgn="auto" latinLnBrk="0" hangingPunct="1">
-              <a:lnSpc>
-                <a:spcPct val="100000"/>
-              </a:lnSpc>
-              <a:spcBef>
-                <a:spcPts val="0"/>
-              </a:spcBef>
-              <a:spcAft>
-                <a:spcPts val="0"/>
-              </a:spcAft>
-              <a:buClrTx/>
-              <a:buSzTx/>
-              <a:buFontTx/>
-              <a:buNone/>
-              <a:tabLst/>
-              <a:defRPr/>
-            </a:pPr>
-            <a:r>
-              <a:rPr lang="en-US" sz="1200" kern="1200" dirty="0">
-                <a:solidFill>
-                  <a:schemeClr val="tx1"/>
-                </a:solidFill>
-                <a:effectLst/>
-                <a:latin typeface="+mn-lt"/>
-                <a:ea typeface="+mn-ea"/>
-                <a:cs typeface="+mn-cs"/>
-              </a:rPr>
-              <a:t>For example, when an email comes into the accounting department and requests updates to the payment information, what confirms the message is not spoofed?  Does the secretary have the authorization to make the filing change, or does it require management approval?  How will an external auditor trace this change, legitimate or not?  Perhaps even 9 out of 10 times, the message is genuine, but consider the impact of a typographical error on their side.  Now, payments are going to the wrong place, and the business needs to work with the bank to get their money back.  </a:t>
-            </a:r>
-          </a:p>
-          <a:p>
-            <a:pPr marL="0" marR="0" lvl="0" indent="0" algn="l" defTabSz="914400" rtl="0" eaLnBrk="1" fontAlgn="auto" latinLnBrk="0" hangingPunct="1">
-              <a:lnSpc>
-                <a:spcPct val="100000"/>
-              </a:lnSpc>
-              <a:spcBef>
-                <a:spcPts val="0"/>
-              </a:spcBef>
-              <a:spcAft>
-                <a:spcPts val="0"/>
-              </a:spcAft>
-              <a:buClrTx/>
-              <a:buSzTx/>
-              <a:buFontTx/>
-              <a:buNone/>
-              <a:tabLst/>
-              <a:defRPr/>
-            </a:pPr>
-            <a:endParaRPr lang="en-US" sz="1200" kern="1200" dirty="0">
-              <a:solidFill>
-                <a:schemeClr val="tx1"/>
-              </a:solidFill>
-              <a:effectLst/>
-              <a:latin typeface="+mn-lt"/>
-              <a:ea typeface="+mn-ea"/>
-              <a:cs typeface="+mn-cs"/>
-            </a:endParaRPr>
-          </a:p>
-          <a:p>
-            <a:pPr marL="0" marR="0" lvl="0" indent="0" algn="l" defTabSz="914400" rtl="0" eaLnBrk="1" fontAlgn="auto" latinLnBrk="0" hangingPunct="1">
-              <a:lnSpc>
-                <a:spcPct val="100000"/>
-              </a:lnSpc>
-              <a:spcBef>
-                <a:spcPts val="0"/>
-              </a:spcBef>
-              <a:spcAft>
-                <a:spcPts val="0"/>
-              </a:spcAft>
-              <a:buClrTx/>
-              <a:buSzTx/>
-              <a:buFontTx/>
-              <a:buNone/>
-              <a:tabLst/>
-              <a:defRPr/>
-            </a:pPr>
-            <a:r>
-              <a:rPr lang="en-US" sz="1200" kern="1200" dirty="0">
-                <a:solidFill>
-                  <a:schemeClr val="tx1"/>
-                </a:solidFill>
-                <a:effectLst/>
-                <a:latin typeface="+mn-lt"/>
-                <a:ea typeface="+mn-ea"/>
-                <a:cs typeface="+mn-cs"/>
-              </a:rPr>
-              <a:t>“To err is human,” negligence is all around us, so we need to remain skeptical and confirm the accuracy of all information.</a:t>
-            </a:r>
-          </a:p>
-          <a:p>
-            <a:endParaRPr lang="en-US" dirty="0"/>
           </a:p>
         </p:txBody>
       </p:sp>
@@ -49018,6 +48642,14 @@
 <file path=ppt/slides/slide16.xml><?xml version="1.0" encoding="utf-8"?>
 <p:sld xmlns:a="http://schemas.openxmlformats.org/drawingml/2006/main" xmlns:r="http://schemas.openxmlformats.org/officeDocument/2006/relationships" xmlns:p="http://schemas.openxmlformats.org/presentationml/2006/main">
   <p:cSld>
+    <p:bg>
+      <p:bgPr>
+        <a:solidFill>
+          <a:schemeClr val="bg1"/>
+        </a:solidFill>
+        <a:effectLst/>
+      </p:bgPr>
+    </p:bg>
     <p:spTree>
       <p:nvGrpSpPr>
         <p:cNvPr id="1" name=""/>
@@ -49032,6 +48664,126 @@
           <a:chExt cx="0" cy="0"/>
         </a:xfrm>
       </p:grpSpPr>
+      <p:sp useBgFill="1">
+        <p:nvSpPr>
+          <p:cNvPr id="8" name="Rectangle 7">
+            <a:extLst>
+              <a:ext uri="{FF2B5EF4-FFF2-40B4-BE49-F238E27FC236}">
+                <a16:creationId xmlns:a16="http://schemas.microsoft.com/office/drawing/2014/main" id="{56B051A4-96A7-4A11-9DAD-063A9C577F83}"/>
+              </a:ext>
+              <a:ext uri="{C183D7F6-B498-43B3-948B-1728B52AA6E4}">
+                <adec:decorative xmlns:adec="http://schemas.microsoft.com/office/drawing/2017/decorative" val="1"/>
+              </a:ext>
+            </a:extLst>
+          </p:cNvPr>
+          <p:cNvSpPr>
+            <a:spLocks noGrp="1" noRot="1" noChangeAspect="1" noMove="1" noResize="1" noEditPoints="1" noAdjustHandles="1" noChangeArrowheads="1" noChangeShapeType="1" noTextEdit="1"/>
+          </p:cNvSpPr>
+          <p:nvPr>
+            <p:extLst>
+              <p:ext uri="{386F3935-93C4-4BCD-93E2-E3B085C9AB24}">
+                <p16:designElem xmlns:p16="http://schemas.microsoft.com/office/powerpoint/2015/main" val="1"/>
+              </p:ext>
+            </p:extLst>
+          </p:nvPr>
+        </p:nvSpPr>
+        <p:spPr>
+          <a:xfrm>
+            <a:off x="0" y="0"/>
+            <a:ext cx="12192000" cy="6858000"/>
+          </a:xfrm>
+          <a:prstGeom prst="rect">
+            <a:avLst/>
+          </a:prstGeom>
+          <a:ln>
+            <a:noFill/>
+          </a:ln>
+        </p:spPr>
+        <p:style>
+          <a:lnRef idx="2">
+            <a:schemeClr val="accent1">
+              <a:shade val="50000"/>
+            </a:schemeClr>
+          </a:lnRef>
+          <a:fillRef idx="1">
+            <a:schemeClr val="accent1"/>
+          </a:fillRef>
+          <a:effectRef idx="0">
+            <a:schemeClr val="accent1"/>
+          </a:effectRef>
+          <a:fontRef idx="minor">
+            <a:schemeClr val="lt1"/>
+          </a:fontRef>
+        </p:style>
+        <p:txBody>
+          <a:bodyPr rtlCol="0" anchor="ctr"/>
+          <a:lstStyle/>
+          <a:p>
+            <a:pPr algn="ctr"/>
+            <a:endParaRPr lang="en-US"/>
+          </a:p>
+        </p:txBody>
+      </p:sp>
+      <p:sp>
+        <p:nvSpPr>
+          <p:cNvPr id="10" name="Rectangle 9">
+            <a:extLst>
+              <a:ext uri="{FF2B5EF4-FFF2-40B4-BE49-F238E27FC236}">
+                <a16:creationId xmlns:a16="http://schemas.microsoft.com/office/drawing/2014/main" id="{45B67B9C-9B45-4084-9BB5-187071EE9A61}"/>
+              </a:ext>
+              <a:ext uri="{C183D7F6-B498-43B3-948B-1728B52AA6E4}">
+                <adec:decorative xmlns:adec="http://schemas.microsoft.com/office/drawing/2017/decorative" val="1"/>
+              </a:ext>
+            </a:extLst>
+          </p:cNvPr>
+          <p:cNvSpPr>
+            <a:spLocks noGrp="1" noRot="1" noChangeAspect="1" noMove="1" noResize="1" noEditPoints="1" noAdjustHandles="1" noChangeArrowheads="1" noChangeShapeType="1" noTextEdit="1"/>
+          </p:cNvSpPr>
+          <p:nvPr>
+            <p:extLst>
+              <p:ext uri="{386F3935-93C4-4BCD-93E2-E3B085C9AB24}">
+                <p16:designElem xmlns:p16="http://schemas.microsoft.com/office/powerpoint/2015/main" val="1"/>
+              </p:ext>
+            </p:extLst>
+          </p:nvPr>
+        </p:nvSpPr>
+        <p:spPr>
+          <a:xfrm>
+            <a:off x="0" y="0"/>
+            <a:ext cx="12192000" cy="2565918"/>
+          </a:xfrm>
+          <a:prstGeom prst="rect">
+            <a:avLst/>
+          </a:prstGeom>
+          <a:ln>
+            <a:noFill/>
+          </a:ln>
+        </p:spPr>
+        <p:style>
+          <a:lnRef idx="2">
+            <a:schemeClr val="accent1">
+              <a:shade val="50000"/>
+            </a:schemeClr>
+          </a:lnRef>
+          <a:fillRef idx="1003">
+            <a:schemeClr val="dk2"/>
+          </a:fillRef>
+          <a:effectRef idx="0">
+            <a:schemeClr val="accent1"/>
+          </a:effectRef>
+          <a:fontRef idx="minor">
+            <a:schemeClr val="lt1"/>
+          </a:fontRef>
+        </p:style>
+        <p:txBody>
+          <a:bodyPr rtlCol="0" anchor="ctr"/>
+          <a:lstStyle/>
+          <a:p>
+            <a:pPr algn="ctr"/>
+            <a:endParaRPr lang="en-US"/>
+          </a:p>
+        </p:txBody>
+      </p:sp>
       <p:sp>
         <p:nvSpPr>
           <p:cNvPr id="2" name="Title 1">
@@ -49048,13 +48800,24 @@
             <p:ph type="title"/>
           </p:nvPr>
         </p:nvSpPr>
-        <p:spPr/>
+        <p:spPr>
+          <a:xfrm>
+            <a:off x="913794" y="741515"/>
+            <a:ext cx="10353761" cy="1633340"/>
+          </a:xfrm>
+        </p:spPr>
         <p:txBody>
-          <a:bodyPr/>
+          <a:bodyPr>
+            <a:normAutofit/>
+          </a:bodyPr>
           <a:lstStyle/>
           <a:p>
             <a:r>
-              <a:rPr lang="en-US" dirty="0"/>
+              <a:rPr lang="en-US" sz="4800">
+                <a:solidFill>
+                  <a:srgbClr val="FFFFFF"/>
+                </a:solidFill>
+              </a:rPr>
               <a:t>Conclusion</a:t>
             </a:r>
           </a:p>
@@ -49062,7 +48825,7 @@
       </p:sp>
       <p:sp>
         <p:nvSpPr>
-          <p:cNvPr id="3" name="Content Placeholder 2">
+          <p:cNvPr id="22" name="Content Placeholder 2">
             <a:extLst>
               <a:ext uri="{FF2B5EF4-FFF2-40B4-BE49-F238E27FC236}">
                 <a16:creationId xmlns:a16="http://schemas.microsoft.com/office/drawing/2014/main" id="{2DBA1A22-D61D-4277-8E5D-D4A7DA4B059B}"/>
@@ -49076,12 +48839,105 @@
             <p:ph idx="1"/>
           </p:nvPr>
         </p:nvSpPr>
-        <p:spPr/>
+        <p:spPr>
+          <a:xfrm>
+            <a:off x="913795" y="3070927"/>
+            <a:ext cx="10353762" cy="3045558"/>
+          </a:xfrm>
+          <a:effectLst/>
+        </p:spPr>
         <p:txBody>
-          <a:bodyPr/>
+          <a:bodyPr anchor="ctr">
+            <a:normAutofit/>
+          </a:bodyPr>
           <a:lstStyle/>
           <a:p>
-            <a:endParaRPr lang="en-US"/>
+            <a:pPr>
+              <a:lnSpc>
+                <a:spcPct val="90000"/>
+              </a:lnSpc>
+            </a:pPr>
+            <a:r>
+              <a:rPr lang="en-US" sz="1500"/>
+              <a:t>Frame a security message around risk management, not fear mongering</a:t>
+            </a:r>
+          </a:p>
+          <a:p>
+            <a:pPr lvl="1">
+              <a:lnSpc>
+                <a:spcPct val="90000"/>
+              </a:lnSpc>
+            </a:pPr>
+            <a:r>
+              <a:rPr lang="en-US" sz="1500"/>
+              <a:t>Organization risks comes from</a:t>
+            </a:r>
+          </a:p>
+          <a:p>
+            <a:pPr lvl="2">
+              <a:lnSpc>
+                <a:spcPct val="90000"/>
+              </a:lnSpc>
+            </a:pPr>
+            <a:r>
+              <a:rPr lang="en-US" sz="1500"/>
+              <a:t>50% Criminals</a:t>
+            </a:r>
+          </a:p>
+          <a:p>
+            <a:pPr lvl="2">
+              <a:lnSpc>
+                <a:spcPct val="90000"/>
+              </a:lnSpc>
+            </a:pPr>
+            <a:r>
+              <a:rPr lang="en-US" sz="1500"/>
+              <a:t>25% System Glitches</a:t>
+            </a:r>
+          </a:p>
+          <a:p>
+            <a:pPr lvl="2">
+              <a:lnSpc>
+                <a:spcPct val="90000"/>
+              </a:lnSpc>
+            </a:pPr>
+            <a:r>
+              <a:rPr lang="en-US" sz="1500"/>
+              <a:t>25% Human Errors</a:t>
+            </a:r>
+          </a:p>
+          <a:p>
+            <a:pPr>
+              <a:lnSpc>
+                <a:spcPct val="90000"/>
+              </a:lnSpc>
+            </a:pPr>
+            <a:r>
+              <a:rPr lang="en-US" sz="1500"/>
+              <a:t>Rally a culture that is aware of security, and incorporates it</a:t>
+            </a:r>
+          </a:p>
+          <a:p>
+            <a:pPr>
+              <a:lnSpc>
+                <a:spcPct val="90000"/>
+              </a:lnSpc>
+            </a:pPr>
+            <a:r>
+              <a:rPr lang="en-US" sz="1500"/>
+              <a:t>Embrace failure and be cognizant of solutions to minimize it</a:t>
+            </a:r>
+          </a:p>
+          <a:p>
+            <a:pPr>
+              <a:lnSpc>
+                <a:spcPct val="90000"/>
+              </a:lnSpc>
+            </a:pPr>
+            <a:r>
+              <a:rPr lang="en-US" sz="1500"/>
+              <a:t>Remain skeptical and alert to potential problems</a:t>
+            </a:r>
           </a:p>
         </p:txBody>
       </p:sp>
@@ -49093,7 +48949,7 @@
     </p:extLst>
   </p:cSld>
   <p:clrMapOvr>
-    <a:masterClrMapping/>
+    <a:overrideClrMapping bg1="lt1" tx1="dk1" bg2="lt2" tx2="dk2" accent1="accent1" accent2="accent2" accent3="accent3" accent4="accent4" accent5="accent5" accent6="accent6" hlink="hlink" folHlink="folHlink"/>
   </p:clrMapOvr>
 </p:sld>
 </file>
@@ -49145,26 +49001,1552 @@
       </p:sp>
       <p:sp>
         <p:nvSpPr>
-          <p:cNvPr id="3" name="Content Placeholder 2">
+          <p:cNvPr id="4" name="Rectangle 1">
             <a:extLst>
               <a:ext uri="{FF2B5EF4-FFF2-40B4-BE49-F238E27FC236}">
-                <a16:creationId xmlns:a16="http://schemas.microsoft.com/office/drawing/2014/main" id="{4D507179-6CD5-45E5-A669-0247D2872532}"/>
+                <a16:creationId xmlns:a16="http://schemas.microsoft.com/office/drawing/2014/main" id="{F0FB7C7B-7E7D-4DE1-82EA-B883A8427945}"/>
               </a:ext>
             </a:extLst>
           </p:cNvPr>
           <p:cNvSpPr>
-            <a:spLocks noGrp="1"/>
+            <a:spLocks noGrp="1" noChangeArrowheads="1"/>
           </p:cNvSpPr>
           <p:nvPr>
             <p:ph idx="1"/>
           </p:nvPr>
         </p:nvSpPr>
-        <p:spPr/>
+        <p:spPr bwMode="auto">
+          <a:xfrm>
+            <a:off x="913795" y="1717833"/>
+            <a:ext cx="9707273" cy="4431983"/>
+          </a:xfrm>
+          <a:prstGeom prst="rect">
+            <a:avLst/>
+          </a:prstGeom>
+          <a:noFill/>
+          <a:ln>
+            <a:noFill/>
+          </a:ln>
+          <a:effectLst/>
+          <a:extLst>
+            <a:ext uri="{909E8E84-426E-40DD-AFC4-6F175D3DCCD1}">
+              <a14:hiddenFill xmlns:a14="http://schemas.microsoft.com/office/drawing/2010/main">
+                <a:solidFill>
+                  <a:schemeClr val="accent1"/>
+                </a:solidFill>
+              </a14:hiddenFill>
+            </a:ext>
+            <a:ext uri="{91240B29-F687-4F45-9708-019B960494DF}">
+              <a14:hiddenLine xmlns:a14="http://schemas.microsoft.com/office/drawing/2010/main" w="9525">
+                <a:solidFill>
+                  <a:schemeClr val="tx1"/>
+                </a:solidFill>
+                <a:miter lim="800000"/>
+                <a:headEnd/>
+                <a:tailEnd/>
+              </a14:hiddenLine>
+            </a:ext>
+            <a:ext uri="{AF507438-7753-43E0-B8FC-AC1667EBCBE1}">
+              <a14:hiddenEffects xmlns:a14="http://schemas.microsoft.com/office/drawing/2010/main">
+                <a:effectLst>
+                  <a:outerShdw dist="35921" dir="2700000" algn="ctr" rotWithShape="0">
+                    <a:schemeClr val="bg2"/>
+                  </a:outerShdw>
+                </a:effectLst>
+              </a14:hiddenEffects>
+            </a:ext>
+          </a:extLst>
+        </p:spPr>
         <p:txBody>
-          <a:bodyPr/>
-          <a:lstStyle/>
+          <a:bodyPr vert="horz" wrap="none" lIns="91440" tIns="45720" rIns="91440" bIns="45720" numCol="1" anchor="ctr" anchorCtr="0" compatLnSpc="1">
+            <a:prstTxWarp prst="textNoShape">
+              <a:avLst/>
+            </a:prstTxWarp>
+            <a:spAutoFit/>
+          </a:bodyPr>
+          <a:lstStyle>
+            <a:lvl1pPr eaLnBrk="0" fontAlgn="base" hangingPunct="0">
+              <a:spcBef>
+                <a:spcPct val="0"/>
+              </a:spcBef>
+              <a:spcAft>
+                <a:spcPct val="0"/>
+              </a:spcAft>
+              <a:defRPr>
+                <a:solidFill>
+                  <a:schemeClr val="tx1"/>
+                </a:solidFill>
+                <a:latin typeface="Arial" panose="020B0604020202020204" pitchFamily="34" charset="0"/>
+              </a:defRPr>
+            </a:lvl1pPr>
+            <a:lvl2pPr eaLnBrk="0" fontAlgn="base" hangingPunct="0">
+              <a:spcBef>
+                <a:spcPct val="0"/>
+              </a:spcBef>
+              <a:spcAft>
+                <a:spcPct val="0"/>
+              </a:spcAft>
+              <a:defRPr>
+                <a:solidFill>
+                  <a:schemeClr val="tx1"/>
+                </a:solidFill>
+                <a:latin typeface="Arial" panose="020B0604020202020204" pitchFamily="34" charset="0"/>
+              </a:defRPr>
+            </a:lvl2pPr>
+            <a:lvl3pPr eaLnBrk="0" fontAlgn="base" hangingPunct="0">
+              <a:spcBef>
+                <a:spcPct val="0"/>
+              </a:spcBef>
+              <a:spcAft>
+                <a:spcPct val="0"/>
+              </a:spcAft>
+              <a:defRPr>
+                <a:solidFill>
+                  <a:schemeClr val="tx1"/>
+                </a:solidFill>
+                <a:latin typeface="Arial" panose="020B0604020202020204" pitchFamily="34" charset="0"/>
+              </a:defRPr>
+            </a:lvl3pPr>
+            <a:lvl4pPr eaLnBrk="0" fontAlgn="base" hangingPunct="0">
+              <a:spcBef>
+                <a:spcPct val="0"/>
+              </a:spcBef>
+              <a:spcAft>
+                <a:spcPct val="0"/>
+              </a:spcAft>
+              <a:defRPr>
+                <a:solidFill>
+                  <a:schemeClr val="tx1"/>
+                </a:solidFill>
+                <a:latin typeface="Arial" panose="020B0604020202020204" pitchFamily="34" charset="0"/>
+              </a:defRPr>
+            </a:lvl4pPr>
+            <a:lvl5pPr eaLnBrk="0" fontAlgn="base" hangingPunct="0">
+              <a:spcBef>
+                <a:spcPct val="0"/>
+              </a:spcBef>
+              <a:spcAft>
+                <a:spcPct val="0"/>
+              </a:spcAft>
+              <a:defRPr>
+                <a:solidFill>
+                  <a:schemeClr val="tx1"/>
+                </a:solidFill>
+                <a:latin typeface="Arial" panose="020B0604020202020204" pitchFamily="34" charset="0"/>
+              </a:defRPr>
+            </a:lvl5pPr>
+            <a:lvl6pPr eaLnBrk="0" fontAlgn="base" hangingPunct="0">
+              <a:spcBef>
+                <a:spcPct val="0"/>
+              </a:spcBef>
+              <a:spcAft>
+                <a:spcPct val="0"/>
+              </a:spcAft>
+              <a:defRPr>
+                <a:solidFill>
+                  <a:schemeClr val="tx1"/>
+                </a:solidFill>
+                <a:latin typeface="Arial" panose="020B0604020202020204" pitchFamily="34" charset="0"/>
+              </a:defRPr>
+            </a:lvl6pPr>
+            <a:lvl7pPr eaLnBrk="0" fontAlgn="base" hangingPunct="0">
+              <a:spcBef>
+                <a:spcPct val="0"/>
+              </a:spcBef>
+              <a:spcAft>
+                <a:spcPct val="0"/>
+              </a:spcAft>
+              <a:defRPr>
+                <a:solidFill>
+                  <a:schemeClr val="tx1"/>
+                </a:solidFill>
+                <a:latin typeface="Arial" panose="020B0604020202020204" pitchFamily="34" charset="0"/>
+              </a:defRPr>
+            </a:lvl7pPr>
+            <a:lvl8pPr eaLnBrk="0" fontAlgn="base" hangingPunct="0">
+              <a:spcBef>
+                <a:spcPct val="0"/>
+              </a:spcBef>
+              <a:spcAft>
+                <a:spcPct val="0"/>
+              </a:spcAft>
+              <a:defRPr>
+                <a:solidFill>
+                  <a:schemeClr val="tx1"/>
+                </a:solidFill>
+                <a:latin typeface="Arial" panose="020B0604020202020204" pitchFamily="34" charset="0"/>
+              </a:defRPr>
+            </a:lvl8pPr>
+            <a:lvl9pPr eaLnBrk="0" fontAlgn="base" hangingPunct="0">
+              <a:spcBef>
+                <a:spcPct val="0"/>
+              </a:spcBef>
+              <a:spcAft>
+                <a:spcPct val="0"/>
+              </a:spcAft>
+              <a:defRPr>
+                <a:solidFill>
+                  <a:schemeClr val="tx1"/>
+                </a:solidFill>
+                <a:latin typeface="Arial" panose="020B0604020202020204" pitchFamily="34" charset="0"/>
+              </a:defRPr>
+            </a:lvl9pPr>
+          </a:lstStyle>
           <a:p>
-            <a:endParaRPr lang="en-US"/>
+            <a:pPr marL="0" marR="0" lvl="0" indent="0" algn="l" defTabSz="914400" rtl="0" eaLnBrk="0" fontAlgn="base" latinLnBrk="0" hangingPunct="0">
+              <a:lnSpc>
+                <a:spcPct val="100000"/>
+              </a:lnSpc>
+              <a:spcBef>
+                <a:spcPct val="0"/>
+              </a:spcBef>
+              <a:spcAft>
+                <a:spcPct val="0"/>
+              </a:spcAft>
+              <a:buClrTx/>
+              <a:buSzTx/>
+              <a:buFontTx/>
+              <a:buNone/>
+              <a:tabLst/>
+            </a:pPr>
+            <a:r>
+              <a:rPr kumimoji="0" lang="en-US" altLang="en-US" sz="1200" b="0" i="0" u="none" strike="noStrike" cap="none" normalizeH="0" baseline="0" dirty="0">
+                <a:ln>
+                  <a:noFill/>
+                </a:ln>
+                <a:solidFill>
+                  <a:schemeClr val="tx1"/>
+                </a:solidFill>
+                <a:effectLst/>
+                <a:latin typeface="Times New Roman" panose="02020603050405020304" pitchFamily="18" charset="0"/>
+                <a:ea typeface="Calibri" panose="020F0502020204030204" pitchFamily="34" charset="0"/>
+                <a:cs typeface="Times New Roman" panose="02020603050405020304" pitchFamily="18" charset="0"/>
+              </a:rPr>
+              <a:t>Blythe, J., &amp; Coventry, L. (2018). Costly but effective: Comparing the factors that influence employee anti-malware behaviors. </a:t>
+            </a:r>
+            <a:br>
+              <a:rPr kumimoji="0" lang="en-US" altLang="en-US" sz="1200" b="0" i="0" u="none" strike="noStrike" cap="none" normalizeH="0" baseline="0" dirty="0">
+                <a:ln>
+                  <a:noFill/>
+                </a:ln>
+                <a:solidFill>
+                  <a:schemeClr val="tx1"/>
+                </a:solidFill>
+                <a:effectLst/>
+                <a:latin typeface="Times New Roman" panose="02020603050405020304" pitchFamily="18" charset="0"/>
+                <a:ea typeface="Calibri" panose="020F0502020204030204" pitchFamily="34" charset="0"/>
+                <a:cs typeface="Times New Roman" panose="02020603050405020304" pitchFamily="18" charset="0"/>
+              </a:rPr>
+            </a:br>
+            <a:r>
+              <a:rPr kumimoji="0" lang="en-US" altLang="en-US" sz="1200" b="0" i="1" u="none" strike="noStrike" cap="none" normalizeH="0" baseline="0" dirty="0">
+                <a:ln>
+                  <a:noFill/>
+                </a:ln>
+                <a:solidFill>
+                  <a:schemeClr val="tx1"/>
+                </a:solidFill>
+                <a:effectLst/>
+                <a:latin typeface="Times New Roman" panose="02020603050405020304" pitchFamily="18" charset="0"/>
+                <a:ea typeface="Calibri" panose="020F0502020204030204" pitchFamily="34" charset="0"/>
+                <a:cs typeface="Times New Roman" panose="02020603050405020304" pitchFamily="18" charset="0"/>
+              </a:rPr>
+              <a:t>Computers in Human Behavior Volume 87, October</a:t>
+            </a:r>
+            <a:r>
+              <a:rPr kumimoji="0" lang="en-US" altLang="en-US" sz="1200" b="0" i="0" u="none" strike="noStrike" cap="none" normalizeH="0" baseline="0" dirty="0">
+                <a:ln>
+                  <a:noFill/>
+                </a:ln>
+                <a:solidFill>
+                  <a:schemeClr val="tx1"/>
+                </a:solidFill>
+                <a:effectLst/>
+                <a:latin typeface="Times New Roman" panose="02020603050405020304" pitchFamily="18" charset="0"/>
+                <a:ea typeface="Calibri" panose="020F0502020204030204" pitchFamily="34" charset="0"/>
+                <a:cs typeface="Times New Roman" panose="02020603050405020304" pitchFamily="18" charset="0"/>
+              </a:rPr>
+              <a:t>, 87-97.</a:t>
+            </a:r>
+            <a:endParaRPr kumimoji="0" lang="en-US" altLang="en-US" sz="800" b="0" i="0" u="none" strike="noStrike" cap="none" normalizeH="0" baseline="0" dirty="0">
+              <a:ln>
+                <a:noFill/>
+              </a:ln>
+              <a:solidFill>
+                <a:schemeClr val="tx1"/>
+              </a:solidFill>
+              <a:effectLst/>
+            </a:endParaRPr>
+          </a:p>
+          <a:p>
+            <a:pPr marL="0" marR="0" lvl="0" indent="0" algn="l" defTabSz="914400" rtl="0" eaLnBrk="0" fontAlgn="base" latinLnBrk="0" hangingPunct="0">
+              <a:lnSpc>
+                <a:spcPct val="100000"/>
+              </a:lnSpc>
+              <a:spcBef>
+                <a:spcPct val="0"/>
+              </a:spcBef>
+              <a:spcAft>
+                <a:spcPct val="0"/>
+              </a:spcAft>
+              <a:buClrTx/>
+              <a:buSzTx/>
+              <a:buFontTx/>
+              <a:buNone/>
+              <a:tabLst/>
+            </a:pPr>
+            <a:r>
+              <a:rPr kumimoji="0" lang="en-US" altLang="en-US" sz="1200" b="0" i="0" u="none" strike="noStrike" cap="none" normalizeH="0" baseline="0" dirty="0">
+                <a:ln>
+                  <a:noFill/>
+                </a:ln>
+                <a:solidFill>
+                  <a:schemeClr val="tx1"/>
+                </a:solidFill>
+                <a:effectLst/>
+                <a:latin typeface="Times New Roman" panose="02020603050405020304" pitchFamily="18" charset="0"/>
+                <a:ea typeface="Calibri" panose="020F0502020204030204" pitchFamily="34" charset="0"/>
+                <a:cs typeface="Times New Roman" panose="02020603050405020304" pitchFamily="18" charset="0"/>
+              </a:rPr>
+              <a:t>Brown, T. (2015). A Primer on Data Security. </a:t>
+            </a:r>
+            <a:r>
+              <a:rPr kumimoji="0" lang="en-US" altLang="en-US" sz="1200" b="0" i="1" u="none" strike="noStrike" cap="none" normalizeH="0" baseline="0" dirty="0">
+                <a:ln>
+                  <a:noFill/>
+                </a:ln>
+                <a:solidFill>
+                  <a:schemeClr val="tx1"/>
+                </a:solidFill>
+                <a:effectLst/>
+                <a:latin typeface="Times New Roman" panose="02020603050405020304" pitchFamily="18" charset="0"/>
+                <a:ea typeface="Calibri" panose="020F0502020204030204" pitchFamily="34" charset="0"/>
+                <a:cs typeface="Times New Roman" panose="02020603050405020304" pitchFamily="18" charset="0"/>
+              </a:rPr>
+              <a:t>CPA Journal May Volume 85, Issue 5</a:t>
+            </a:r>
+            <a:r>
+              <a:rPr kumimoji="0" lang="en-US" altLang="en-US" sz="1200" b="0" i="0" u="none" strike="noStrike" cap="none" normalizeH="0" baseline="0" dirty="0">
+                <a:ln>
+                  <a:noFill/>
+                </a:ln>
+                <a:solidFill>
+                  <a:schemeClr val="tx1"/>
+                </a:solidFill>
+                <a:effectLst/>
+                <a:latin typeface="Times New Roman" panose="02020603050405020304" pitchFamily="18" charset="0"/>
+                <a:ea typeface="Calibri" panose="020F0502020204030204" pitchFamily="34" charset="0"/>
+                <a:cs typeface="Times New Roman" panose="02020603050405020304" pitchFamily="18" charset="0"/>
+              </a:rPr>
+              <a:t>, 58-62.</a:t>
+            </a:r>
+            <a:endParaRPr kumimoji="0" lang="en-US" altLang="en-US" sz="800" b="0" i="0" u="none" strike="noStrike" cap="none" normalizeH="0" baseline="0" dirty="0">
+              <a:ln>
+                <a:noFill/>
+              </a:ln>
+              <a:solidFill>
+                <a:schemeClr val="tx1"/>
+              </a:solidFill>
+              <a:effectLst/>
+            </a:endParaRPr>
+          </a:p>
+          <a:p>
+            <a:pPr marL="0" marR="0" lvl="0" indent="0" algn="l" defTabSz="914400" rtl="0" eaLnBrk="0" fontAlgn="base" latinLnBrk="0" hangingPunct="0">
+              <a:lnSpc>
+                <a:spcPct val="100000"/>
+              </a:lnSpc>
+              <a:spcBef>
+                <a:spcPct val="0"/>
+              </a:spcBef>
+              <a:spcAft>
+                <a:spcPct val="0"/>
+              </a:spcAft>
+              <a:buClrTx/>
+              <a:buSzTx/>
+              <a:buFontTx/>
+              <a:buNone/>
+              <a:tabLst/>
+            </a:pPr>
+            <a:r>
+              <a:rPr kumimoji="0" lang="en-US" altLang="en-US" sz="1200" b="0" i="0" u="none" strike="noStrike" cap="none" normalizeH="0" baseline="0" dirty="0">
+                <a:ln>
+                  <a:noFill/>
+                </a:ln>
+                <a:solidFill>
+                  <a:schemeClr val="tx1"/>
+                </a:solidFill>
+                <a:effectLst/>
+                <a:latin typeface="Times New Roman" panose="02020603050405020304" pitchFamily="18" charset="0"/>
+                <a:ea typeface="Calibri" panose="020F0502020204030204" pitchFamily="34" charset="0"/>
+                <a:cs typeface="Times New Roman" panose="02020603050405020304" pitchFamily="18" charset="0"/>
+              </a:rPr>
+              <a:t>Bruijn, H., &amp; Janssen, M. (2017). Building Cybersecurity Awareness: The need for evidence-based framing strategies. </a:t>
+            </a:r>
+            <a:br>
+              <a:rPr kumimoji="0" lang="en-US" altLang="en-US" sz="1200" b="0" i="0" u="none" strike="noStrike" cap="none" normalizeH="0" baseline="0" dirty="0">
+                <a:ln>
+                  <a:noFill/>
+                </a:ln>
+                <a:solidFill>
+                  <a:schemeClr val="tx1"/>
+                </a:solidFill>
+                <a:effectLst/>
+                <a:latin typeface="Times New Roman" panose="02020603050405020304" pitchFamily="18" charset="0"/>
+                <a:ea typeface="Calibri" panose="020F0502020204030204" pitchFamily="34" charset="0"/>
+                <a:cs typeface="Times New Roman" panose="02020603050405020304" pitchFamily="18" charset="0"/>
+              </a:rPr>
+            </a:br>
+            <a:r>
+              <a:rPr kumimoji="0" lang="en-US" altLang="en-US" sz="1200" b="0" i="1" u="none" strike="noStrike" cap="none" normalizeH="0" baseline="0" dirty="0">
+                <a:ln>
+                  <a:noFill/>
+                </a:ln>
+                <a:solidFill>
+                  <a:schemeClr val="tx1"/>
+                </a:solidFill>
+                <a:effectLst/>
+                <a:latin typeface="Times New Roman" panose="02020603050405020304" pitchFamily="18" charset="0"/>
+                <a:ea typeface="Calibri" panose="020F0502020204030204" pitchFamily="34" charset="0"/>
+                <a:cs typeface="Times New Roman" panose="02020603050405020304" pitchFamily="18" charset="0"/>
+              </a:rPr>
+              <a:t>Government Information Quarterly Volume 34, Issue 1, January</a:t>
+            </a:r>
+            <a:r>
+              <a:rPr kumimoji="0" lang="en-US" altLang="en-US" sz="1200" b="0" i="0" u="none" strike="noStrike" cap="none" normalizeH="0" baseline="0" dirty="0">
+                <a:ln>
+                  <a:noFill/>
+                </a:ln>
+                <a:solidFill>
+                  <a:schemeClr val="tx1"/>
+                </a:solidFill>
+                <a:effectLst/>
+                <a:latin typeface="Times New Roman" panose="02020603050405020304" pitchFamily="18" charset="0"/>
+                <a:ea typeface="Calibri" panose="020F0502020204030204" pitchFamily="34" charset="0"/>
+                <a:cs typeface="Times New Roman" panose="02020603050405020304" pitchFamily="18" charset="0"/>
+              </a:rPr>
+              <a:t> 1-7.</a:t>
+            </a:r>
+            <a:endParaRPr kumimoji="0" lang="en-US" altLang="en-US" sz="800" b="0" i="0" u="none" strike="noStrike" cap="none" normalizeH="0" baseline="0" dirty="0">
+              <a:ln>
+                <a:noFill/>
+              </a:ln>
+              <a:solidFill>
+                <a:schemeClr val="tx1"/>
+              </a:solidFill>
+              <a:effectLst/>
+            </a:endParaRPr>
+          </a:p>
+          <a:p>
+            <a:pPr marL="0" marR="0" lvl="0" indent="0" algn="l" defTabSz="914400" rtl="0" eaLnBrk="0" fontAlgn="base" latinLnBrk="0" hangingPunct="0">
+              <a:lnSpc>
+                <a:spcPct val="100000"/>
+              </a:lnSpc>
+              <a:spcBef>
+                <a:spcPct val="0"/>
+              </a:spcBef>
+              <a:spcAft>
+                <a:spcPct val="0"/>
+              </a:spcAft>
+              <a:buClrTx/>
+              <a:buSzTx/>
+              <a:buFontTx/>
+              <a:buNone/>
+              <a:tabLst/>
+            </a:pPr>
+            <a:r>
+              <a:rPr kumimoji="0" lang="en-US" altLang="en-US" sz="1200" b="0" i="0" u="none" strike="noStrike" cap="none" normalizeH="0" baseline="0" dirty="0">
+                <a:ln>
+                  <a:noFill/>
+                </a:ln>
+                <a:solidFill>
+                  <a:schemeClr val="tx1"/>
+                </a:solidFill>
+                <a:effectLst/>
+                <a:latin typeface="Times New Roman" panose="02020603050405020304" pitchFamily="18" charset="0"/>
+                <a:ea typeface="Calibri" panose="020F0502020204030204" pitchFamily="34" charset="0"/>
+                <a:cs typeface="Times New Roman" panose="02020603050405020304" pitchFamily="18" charset="0"/>
+              </a:rPr>
+              <a:t>Dai </a:t>
+            </a:r>
+            <a:r>
+              <a:rPr kumimoji="0" lang="en-US" altLang="en-US" sz="1200" b="0" i="0" u="none" strike="noStrike" cap="none" normalizeH="0" baseline="0" dirty="0" err="1">
+                <a:ln>
+                  <a:noFill/>
+                </a:ln>
+                <a:solidFill>
+                  <a:schemeClr val="tx1"/>
+                </a:solidFill>
+                <a:effectLst/>
+                <a:latin typeface="Times New Roman" panose="02020603050405020304" pitchFamily="18" charset="0"/>
+                <a:ea typeface="Calibri" panose="020F0502020204030204" pitchFamily="34" charset="0"/>
+                <a:cs typeface="Times New Roman" panose="02020603050405020304" pitchFamily="18" charset="0"/>
+              </a:rPr>
+              <a:t>Zovi</a:t>
+            </a:r>
+            <a:r>
+              <a:rPr kumimoji="0" lang="en-US" altLang="en-US" sz="1200" b="0" i="0" u="none" strike="noStrike" cap="none" normalizeH="0" baseline="0" dirty="0">
+                <a:ln>
+                  <a:noFill/>
+                </a:ln>
+                <a:solidFill>
+                  <a:schemeClr val="tx1"/>
+                </a:solidFill>
+                <a:effectLst/>
+                <a:latin typeface="Times New Roman" panose="02020603050405020304" pitchFamily="18" charset="0"/>
+                <a:ea typeface="Calibri" panose="020F0502020204030204" pitchFamily="34" charset="0"/>
+                <a:cs typeface="Times New Roman" panose="02020603050405020304" pitchFamily="18" charset="0"/>
+              </a:rPr>
+              <a:t>, D. (2019). Every Security Team is a Software Team Now. </a:t>
+            </a:r>
+            <a:r>
+              <a:rPr kumimoji="0" lang="en-US" altLang="en-US" sz="1200" b="0" i="1" u="none" strike="noStrike" cap="none" normalizeH="0" baseline="0" dirty="0">
+                <a:ln>
+                  <a:noFill/>
+                </a:ln>
+                <a:solidFill>
+                  <a:schemeClr val="tx1"/>
+                </a:solidFill>
+                <a:effectLst/>
+                <a:latin typeface="Times New Roman" panose="02020603050405020304" pitchFamily="18" charset="0"/>
+                <a:ea typeface="Calibri" panose="020F0502020204030204" pitchFamily="34" charset="0"/>
+                <a:cs typeface="Times New Roman" panose="02020603050405020304" pitchFamily="18" charset="0"/>
+              </a:rPr>
+              <a:t>Blackhat USA 2019.</a:t>
+            </a:r>
+            <a:r>
+              <a:rPr kumimoji="0" lang="en-US" altLang="en-US" sz="1200" b="0" i="0" u="none" strike="noStrike" cap="none" normalizeH="0" baseline="0" dirty="0">
+                <a:ln>
+                  <a:noFill/>
+                </a:ln>
+                <a:solidFill>
+                  <a:schemeClr val="tx1"/>
+                </a:solidFill>
+                <a:effectLst/>
+                <a:latin typeface="Times New Roman" panose="02020603050405020304" pitchFamily="18" charset="0"/>
+                <a:ea typeface="Calibri" panose="020F0502020204030204" pitchFamily="34" charset="0"/>
+                <a:cs typeface="Times New Roman" panose="02020603050405020304" pitchFamily="18" charset="0"/>
+              </a:rPr>
+              <a:t> </a:t>
+            </a:r>
+            <a:endParaRPr kumimoji="0" lang="en-US" altLang="en-US" sz="800" b="0" i="0" u="none" strike="noStrike" cap="none" normalizeH="0" baseline="0" dirty="0">
+              <a:ln>
+                <a:noFill/>
+              </a:ln>
+              <a:solidFill>
+                <a:schemeClr val="tx1"/>
+              </a:solidFill>
+              <a:effectLst/>
+            </a:endParaRPr>
+          </a:p>
+          <a:p>
+            <a:pPr marL="0" marR="0" lvl="0" indent="0" algn="l" defTabSz="914400" rtl="0" eaLnBrk="0" fontAlgn="base" latinLnBrk="0" hangingPunct="0">
+              <a:lnSpc>
+                <a:spcPct val="100000"/>
+              </a:lnSpc>
+              <a:spcBef>
+                <a:spcPct val="0"/>
+              </a:spcBef>
+              <a:spcAft>
+                <a:spcPct val="0"/>
+              </a:spcAft>
+              <a:buClrTx/>
+              <a:buSzTx/>
+              <a:buFontTx/>
+              <a:buNone/>
+              <a:tabLst/>
+            </a:pPr>
+            <a:r>
+              <a:rPr kumimoji="0" lang="en-US" altLang="en-US" sz="1200" b="0" i="0" u="none" strike="noStrike" cap="none" normalizeH="0" baseline="0" dirty="0" err="1">
+                <a:ln>
+                  <a:noFill/>
+                </a:ln>
+                <a:solidFill>
+                  <a:schemeClr val="tx1"/>
+                </a:solidFill>
+                <a:effectLst/>
+                <a:latin typeface="Times New Roman" panose="02020603050405020304" pitchFamily="18" charset="0"/>
+                <a:ea typeface="Calibri" panose="020F0502020204030204" pitchFamily="34" charset="0"/>
+                <a:cs typeface="Times New Roman" panose="02020603050405020304" pitchFamily="18" charset="0"/>
+              </a:rPr>
+              <a:t>Elifoglu</a:t>
+            </a:r>
+            <a:r>
+              <a:rPr kumimoji="0" lang="en-US" altLang="en-US" sz="1200" b="0" i="0" u="none" strike="noStrike" cap="none" normalizeH="0" baseline="0" dirty="0">
+                <a:ln>
+                  <a:noFill/>
+                </a:ln>
+                <a:solidFill>
+                  <a:schemeClr val="tx1"/>
+                </a:solidFill>
+                <a:effectLst/>
+                <a:latin typeface="Times New Roman" panose="02020603050405020304" pitchFamily="18" charset="0"/>
+                <a:ea typeface="Calibri" panose="020F0502020204030204" pitchFamily="34" charset="0"/>
+                <a:cs typeface="Times New Roman" panose="02020603050405020304" pitchFamily="18" charset="0"/>
+              </a:rPr>
+              <a:t>, H., Abel, I., &amp; </a:t>
+            </a:r>
+            <a:r>
+              <a:rPr kumimoji="0" lang="en-US" altLang="en-US" sz="1200" b="0" i="0" u="none" strike="noStrike" cap="none" normalizeH="0" baseline="0" dirty="0" err="1">
+                <a:ln>
+                  <a:noFill/>
+                </a:ln>
+                <a:solidFill>
+                  <a:schemeClr val="tx1"/>
+                </a:solidFill>
+                <a:effectLst/>
+                <a:latin typeface="Times New Roman" panose="02020603050405020304" pitchFamily="18" charset="0"/>
+                <a:ea typeface="Calibri" panose="020F0502020204030204" pitchFamily="34" charset="0"/>
+                <a:cs typeface="Times New Roman" panose="02020603050405020304" pitchFamily="18" charset="0"/>
+              </a:rPr>
+              <a:t>Tasseven</a:t>
+            </a:r>
+            <a:r>
+              <a:rPr kumimoji="0" lang="en-US" altLang="en-US" sz="1200" b="0" i="0" u="none" strike="noStrike" cap="none" normalizeH="0" baseline="0" dirty="0">
+                <a:ln>
+                  <a:noFill/>
+                </a:ln>
+                <a:solidFill>
+                  <a:schemeClr val="tx1"/>
+                </a:solidFill>
+                <a:effectLst/>
+                <a:latin typeface="Times New Roman" panose="02020603050405020304" pitchFamily="18" charset="0"/>
+                <a:ea typeface="Calibri" panose="020F0502020204030204" pitchFamily="34" charset="0"/>
+                <a:cs typeface="Times New Roman" panose="02020603050405020304" pitchFamily="18" charset="0"/>
+              </a:rPr>
+              <a:t>, O. (2018). Minimizing Insider Threat Risk with Behavioral Monitoring. </a:t>
+            </a:r>
+            <a:r>
+              <a:rPr kumimoji="0" lang="en-US" altLang="en-US" sz="1200" b="0" i="1" u="none" strike="noStrike" cap="none" normalizeH="0" baseline="0" dirty="0">
+                <a:ln>
+                  <a:noFill/>
+                </a:ln>
+                <a:solidFill>
+                  <a:schemeClr val="tx1"/>
+                </a:solidFill>
+                <a:effectLst/>
+                <a:latin typeface="Times New Roman" panose="02020603050405020304" pitchFamily="18" charset="0"/>
+                <a:ea typeface="Calibri" panose="020F0502020204030204" pitchFamily="34" charset="0"/>
+                <a:cs typeface="Times New Roman" panose="02020603050405020304" pitchFamily="18" charset="0"/>
+              </a:rPr>
+              <a:t>Review of Business. Vol. 38, Issue 2</a:t>
+            </a:r>
+            <a:r>
+              <a:rPr kumimoji="0" lang="en-US" altLang="en-US" sz="1200" b="0" i="0" u="none" strike="noStrike" cap="none" normalizeH="0" baseline="0" dirty="0">
+                <a:ln>
+                  <a:noFill/>
+                </a:ln>
+                <a:solidFill>
+                  <a:schemeClr val="tx1"/>
+                </a:solidFill>
+                <a:effectLst/>
+                <a:latin typeface="Times New Roman" panose="02020603050405020304" pitchFamily="18" charset="0"/>
+                <a:ea typeface="Calibri" panose="020F0502020204030204" pitchFamily="34" charset="0"/>
+                <a:cs typeface="Times New Roman" panose="02020603050405020304" pitchFamily="18" charset="0"/>
+              </a:rPr>
+              <a:t>, 61-73.</a:t>
+            </a:r>
+            <a:endParaRPr kumimoji="0" lang="en-US" altLang="en-US" sz="800" b="0" i="0" u="none" strike="noStrike" cap="none" normalizeH="0" baseline="0" dirty="0">
+              <a:ln>
+                <a:noFill/>
+              </a:ln>
+              <a:solidFill>
+                <a:schemeClr val="tx1"/>
+              </a:solidFill>
+              <a:effectLst/>
+            </a:endParaRPr>
+          </a:p>
+          <a:p>
+            <a:pPr marL="0" marR="0" lvl="0" indent="0" algn="l" defTabSz="914400" rtl="0" eaLnBrk="0" fontAlgn="base" latinLnBrk="0" hangingPunct="0">
+              <a:lnSpc>
+                <a:spcPct val="100000"/>
+              </a:lnSpc>
+              <a:spcBef>
+                <a:spcPct val="0"/>
+              </a:spcBef>
+              <a:spcAft>
+                <a:spcPct val="0"/>
+              </a:spcAft>
+              <a:buClrTx/>
+              <a:buSzTx/>
+              <a:buFontTx/>
+              <a:buNone/>
+              <a:tabLst/>
+            </a:pPr>
+            <a:r>
+              <a:rPr kumimoji="0" lang="en-US" altLang="en-US" sz="1200" b="0" i="0" u="none" strike="noStrike" cap="none" normalizeH="0" baseline="0" dirty="0">
+                <a:ln>
+                  <a:noFill/>
+                </a:ln>
+                <a:solidFill>
+                  <a:schemeClr val="tx1"/>
+                </a:solidFill>
+                <a:effectLst/>
+                <a:latin typeface="Times New Roman" panose="02020603050405020304" pitchFamily="18" charset="0"/>
+                <a:ea typeface="Calibri" panose="020F0502020204030204" pitchFamily="34" charset="0"/>
+                <a:cs typeface="Times New Roman" panose="02020603050405020304" pitchFamily="18" charset="0"/>
+              </a:rPr>
+              <a:t>Hennig, N. (2018). Privacy and Security Online: Best Practices for Cybersecurity. </a:t>
+            </a:r>
+            <a:r>
+              <a:rPr kumimoji="0" lang="en-US" altLang="en-US" sz="1200" b="0" i="1" u="none" strike="noStrike" cap="none" normalizeH="0" baseline="0" dirty="0">
+                <a:ln>
+                  <a:noFill/>
+                </a:ln>
+                <a:solidFill>
+                  <a:schemeClr val="tx1"/>
+                </a:solidFill>
+                <a:effectLst/>
+                <a:latin typeface="Times New Roman" panose="02020603050405020304" pitchFamily="18" charset="0"/>
+                <a:ea typeface="Calibri" panose="020F0502020204030204" pitchFamily="34" charset="0"/>
+                <a:cs typeface="Times New Roman" panose="02020603050405020304" pitchFamily="18" charset="0"/>
+              </a:rPr>
+              <a:t>Library Technology Reports. April, Vol. 54, Issue 3</a:t>
+            </a:r>
+            <a:r>
+              <a:rPr kumimoji="0" lang="en-US" altLang="en-US" sz="1200" b="0" i="0" u="none" strike="noStrike" cap="none" normalizeH="0" baseline="0" dirty="0">
+                <a:ln>
+                  <a:noFill/>
+                </a:ln>
+                <a:solidFill>
+                  <a:schemeClr val="tx1"/>
+                </a:solidFill>
+                <a:effectLst/>
+                <a:latin typeface="Times New Roman" panose="02020603050405020304" pitchFamily="18" charset="0"/>
+                <a:ea typeface="Calibri" panose="020F0502020204030204" pitchFamily="34" charset="0"/>
+                <a:cs typeface="Times New Roman" panose="02020603050405020304" pitchFamily="18" charset="0"/>
+              </a:rPr>
+              <a:t>, 1-37.</a:t>
+            </a:r>
+            <a:endParaRPr kumimoji="0" lang="en-US" altLang="en-US" sz="800" b="0" i="0" u="none" strike="noStrike" cap="none" normalizeH="0" baseline="0" dirty="0">
+              <a:ln>
+                <a:noFill/>
+              </a:ln>
+              <a:solidFill>
+                <a:schemeClr val="tx1"/>
+              </a:solidFill>
+              <a:effectLst/>
+            </a:endParaRPr>
+          </a:p>
+          <a:p>
+            <a:pPr marL="0" marR="0" lvl="0" indent="0" algn="l" defTabSz="914400" rtl="0" eaLnBrk="0" fontAlgn="base" latinLnBrk="0" hangingPunct="0">
+              <a:lnSpc>
+                <a:spcPct val="100000"/>
+              </a:lnSpc>
+              <a:spcBef>
+                <a:spcPct val="0"/>
+              </a:spcBef>
+              <a:spcAft>
+                <a:spcPct val="0"/>
+              </a:spcAft>
+              <a:buClrTx/>
+              <a:buSzTx/>
+              <a:buFontTx/>
+              <a:buNone/>
+              <a:tabLst/>
+            </a:pPr>
+            <a:r>
+              <a:rPr kumimoji="0" lang="en-US" altLang="en-US" sz="1200" b="0" i="0" u="none" strike="noStrike" cap="none" normalizeH="0" baseline="0" dirty="0">
+                <a:ln>
+                  <a:noFill/>
+                </a:ln>
+                <a:solidFill>
+                  <a:schemeClr val="tx1"/>
+                </a:solidFill>
+                <a:effectLst/>
+                <a:latin typeface="Times New Roman" panose="02020603050405020304" pitchFamily="18" charset="0"/>
+                <a:ea typeface="Calibri" panose="020F0502020204030204" pitchFamily="34" charset="0"/>
+                <a:cs typeface="Times New Roman" panose="02020603050405020304" pitchFamily="18" charset="0"/>
+              </a:rPr>
+              <a:t>Hunt, T. (2019, May 20th). </a:t>
+            </a:r>
+            <a:r>
+              <a:rPr kumimoji="0" lang="en-US" altLang="en-US" sz="1200" b="0" i="1" u="none" strike="noStrike" cap="none" normalizeH="0" baseline="0" dirty="0">
+                <a:ln>
+                  <a:noFill/>
+                </a:ln>
+                <a:solidFill>
+                  <a:schemeClr val="tx1"/>
+                </a:solidFill>
+                <a:effectLst/>
+                <a:latin typeface="Times New Roman" panose="02020603050405020304" pitchFamily="18" charset="0"/>
+                <a:ea typeface="Calibri" panose="020F0502020204030204" pitchFamily="34" charset="0"/>
+                <a:cs typeface="Times New Roman" panose="02020603050405020304" pitchFamily="18" charset="0"/>
+              </a:rPr>
+              <a:t>Keynote: Hack to the Future</a:t>
+            </a:r>
+            <a:r>
+              <a:rPr kumimoji="0" lang="en-US" altLang="en-US" sz="1200" b="0" i="0" u="none" strike="noStrike" cap="none" normalizeH="0" baseline="0" dirty="0">
+                <a:ln>
+                  <a:noFill/>
+                </a:ln>
+                <a:solidFill>
+                  <a:schemeClr val="tx1"/>
+                </a:solidFill>
+                <a:effectLst/>
+                <a:latin typeface="Times New Roman" panose="02020603050405020304" pitchFamily="18" charset="0"/>
+                <a:ea typeface="Calibri" panose="020F0502020204030204" pitchFamily="34" charset="0"/>
+                <a:cs typeface="Times New Roman" panose="02020603050405020304" pitchFamily="18" charset="0"/>
+              </a:rPr>
+              <a:t>. Retrieved from YouTube: https://www.youtube.com/watch?v=qCOefMiakps</a:t>
+            </a:r>
+            <a:endParaRPr kumimoji="0" lang="en-US" altLang="en-US" sz="800" b="0" i="0" u="none" strike="noStrike" cap="none" normalizeH="0" baseline="0" dirty="0">
+              <a:ln>
+                <a:noFill/>
+              </a:ln>
+              <a:solidFill>
+                <a:schemeClr val="tx1"/>
+              </a:solidFill>
+              <a:effectLst/>
+            </a:endParaRPr>
+          </a:p>
+          <a:p>
+            <a:pPr marL="0" marR="0" lvl="0" indent="0" algn="l" defTabSz="914400" rtl="0" eaLnBrk="0" fontAlgn="base" latinLnBrk="0" hangingPunct="0">
+              <a:lnSpc>
+                <a:spcPct val="100000"/>
+              </a:lnSpc>
+              <a:spcBef>
+                <a:spcPct val="0"/>
+              </a:spcBef>
+              <a:spcAft>
+                <a:spcPct val="0"/>
+              </a:spcAft>
+              <a:buClrTx/>
+              <a:buSzTx/>
+              <a:buFontTx/>
+              <a:buNone/>
+              <a:tabLst/>
+            </a:pPr>
+            <a:r>
+              <a:rPr kumimoji="0" lang="en-US" altLang="en-US" sz="1200" b="0" i="0" u="none" strike="noStrike" cap="none" normalizeH="0" baseline="0" dirty="0">
+                <a:ln>
+                  <a:noFill/>
+                </a:ln>
+                <a:solidFill>
+                  <a:schemeClr val="tx1"/>
+                </a:solidFill>
+                <a:effectLst/>
+                <a:latin typeface="Times New Roman" panose="02020603050405020304" pitchFamily="18" charset="0"/>
+                <a:ea typeface="Calibri" panose="020F0502020204030204" pitchFamily="34" charset="0"/>
+                <a:cs typeface="Times New Roman" panose="02020603050405020304" pitchFamily="18" charset="0"/>
+              </a:rPr>
+              <a:t>Jonathan et al. (2017). Security system with three-dimensional face recognition using the PCA method and neural networks algorithm. </a:t>
+            </a:r>
+            <a:br>
+              <a:rPr kumimoji="0" lang="en-US" altLang="en-US" sz="1200" b="0" i="0" u="none" strike="noStrike" cap="none" normalizeH="0" baseline="0" dirty="0">
+                <a:ln>
+                  <a:noFill/>
+                </a:ln>
+                <a:solidFill>
+                  <a:schemeClr val="tx1"/>
+                </a:solidFill>
+                <a:effectLst/>
+                <a:latin typeface="Times New Roman" panose="02020603050405020304" pitchFamily="18" charset="0"/>
+                <a:ea typeface="Calibri" panose="020F0502020204030204" pitchFamily="34" charset="0"/>
+                <a:cs typeface="Times New Roman" panose="02020603050405020304" pitchFamily="18" charset="0"/>
+              </a:rPr>
+            </a:br>
+            <a:r>
+              <a:rPr kumimoji="0" lang="en-US" altLang="en-US" sz="1200" b="0" i="1" u="none" strike="noStrike" cap="none" normalizeH="0" baseline="0" dirty="0">
+                <a:ln>
+                  <a:noFill/>
+                </a:ln>
+                <a:solidFill>
+                  <a:schemeClr val="tx1"/>
+                </a:solidFill>
+                <a:effectLst/>
+                <a:latin typeface="Times New Roman" panose="02020603050405020304" pitchFamily="18" charset="0"/>
+                <a:ea typeface="Calibri" panose="020F0502020204030204" pitchFamily="34" charset="0"/>
+                <a:cs typeface="Times New Roman" panose="02020603050405020304" pitchFamily="18" charset="0"/>
+              </a:rPr>
+              <a:t>4th International Conference on New Media Studies, Yogyakarta, Indonesia, 8-10 Nov</a:t>
+            </a:r>
+            <a:r>
+              <a:rPr kumimoji="0" lang="en-US" altLang="en-US" sz="1200" b="0" i="0" u="none" strike="noStrike" cap="none" normalizeH="0" baseline="0" dirty="0">
+                <a:ln>
+                  <a:noFill/>
+                </a:ln>
+                <a:solidFill>
+                  <a:schemeClr val="tx1"/>
+                </a:solidFill>
+                <a:effectLst/>
+                <a:latin typeface="Times New Roman" panose="02020603050405020304" pitchFamily="18" charset="0"/>
+                <a:ea typeface="Calibri" panose="020F0502020204030204" pitchFamily="34" charset="0"/>
+                <a:cs typeface="Times New Roman" panose="02020603050405020304" pitchFamily="18" charset="0"/>
+              </a:rPr>
+              <a:t>.</a:t>
+            </a:r>
+            <a:endParaRPr kumimoji="0" lang="en-US" altLang="en-US" sz="800" b="0" i="0" u="none" strike="noStrike" cap="none" normalizeH="0" baseline="0" dirty="0">
+              <a:ln>
+                <a:noFill/>
+              </a:ln>
+              <a:solidFill>
+                <a:schemeClr val="tx1"/>
+              </a:solidFill>
+              <a:effectLst/>
+            </a:endParaRPr>
+          </a:p>
+          <a:p>
+            <a:pPr marL="0" marR="0" lvl="0" indent="0" algn="l" defTabSz="914400" rtl="0" eaLnBrk="0" fontAlgn="base" latinLnBrk="0" hangingPunct="0">
+              <a:lnSpc>
+                <a:spcPct val="100000"/>
+              </a:lnSpc>
+              <a:spcBef>
+                <a:spcPct val="0"/>
+              </a:spcBef>
+              <a:spcAft>
+                <a:spcPct val="0"/>
+              </a:spcAft>
+              <a:buClrTx/>
+              <a:buSzTx/>
+              <a:buFontTx/>
+              <a:buNone/>
+              <a:tabLst/>
+            </a:pPr>
+            <a:r>
+              <a:rPr kumimoji="0" lang="en-US" altLang="en-US" sz="1200" b="0" i="0" u="none" strike="noStrike" cap="none" normalizeH="0" baseline="0" dirty="0" err="1">
+                <a:ln>
+                  <a:noFill/>
+                </a:ln>
+                <a:solidFill>
+                  <a:schemeClr val="tx1"/>
+                </a:solidFill>
+                <a:effectLst/>
+                <a:latin typeface="Times New Roman" panose="02020603050405020304" pitchFamily="18" charset="0"/>
+                <a:ea typeface="Calibri" panose="020F0502020204030204" pitchFamily="34" charset="0"/>
+                <a:cs typeface="Times New Roman" panose="02020603050405020304" pitchFamily="18" charset="0"/>
+              </a:rPr>
+              <a:t>Kohnfelder</a:t>
+            </a:r>
+            <a:r>
+              <a:rPr kumimoji="0" lang="en-US" altLang="en-US" sz="1200" b="0" i="0" u="none" strike="noStrike" cap="none" normalizeH="0" baseline="0" dirty="0">
+                <a:ln>
+                  <a:noFill/>
+                </a:ln>
+                <a:solidFill>
+                  <a:schemeClr val="tx1"/>
+                </a:solidFill>
+                <a:effectLst/>
+                <a:latin typeface="Times New Roman" panose="02020603050405020304" pitchFamily="18" charset="0"/>
+                <a:ea typeface="Calibri" panose="020F0502020204030204" pitchFamily="34" charset="0"/>
+                <a:cs typeface="Times New Roman" panose="02020603050405020304" pitchFamily="18" charset="0"/>
+              </a:rPr>
+              <a:t>, L., &amp; Garg, P. (1999, April 1st). </a:t>
+            </a:r>
+            <a:r>
+              <a:rPr kumimoji="0" lang="en-US" altLang="en-US" sz="1200" b="0" i="1" u="none" strike="noStrike" cap="none" normalizeH="0" baseline="0" dirty="0">
+                <a:ln>
+                  <a:noFill/>
+                </a:ln>
+                <a:solidFill>
+                  <a:schemeClr val="tx1"/>
+                </a:solidFill>
+                <a:effectLst/>
+                <a:latin typeface="Times New Roman" panose="02020603050405020304" pitchFamily="18" charset="0"/>
+                <a:ea typeface="Calibri" panose="020F0502020204030204" pitchFamily="34" charset="0"/>
+                <a:cs typeface="Times New Roman" panose="02020603050405020304" pitchFamily="18" charset="0"/>
+              </a:rPr>
+              <a:t>The threats to our products</a:t>
+            </a:r>
+            <a:r>
+              <a:rPr kumimoji="0" lang="en-US" altLang="en-US" sz="1200" b="0" i="0" u="none" strike="noStrike" cap="none" normalizeH="0" baseline="0" dirty="0">
+                <a:ln>
+                  <a:noFill/>
+                </a:ln>
+                <a:solidFill>
+                  <a:schemeClr val="tx1"/>
+                </a:solidFill>
+                <a:effectLst/>
+                <a:latin typeface="Times New Roman" panose="02020603050405020304" pitchFamily="18" charset="0"/>
+                <a:ea typeface="Calibri" panose="020F0502020204030204" pitchFamily="34" charset="0"/>
+                <a:cs typeface="Times New Roman" panose="02020603050405020304" pitchFamily="18" charset="0"/>
+              </a:rPr>
+              <a:t>. </a:t>
+            </a:r>
+            <a:br>
+              <a:rPr kumimoji="0" lang="en-US" altLang="en-US" sz="1200" b="0" i="0" u="none" strike="noStrike" cap="none" normalizeH="0" baseline="0" dirty="0">
+                <a:ln>
+                  <a:noFill/>
+                </a:ln>
+                <a:solidFill>
+                  <a:schemeClr val="tx1"/>
+                </a:solidFill>
+                <a:effectLst/>
+                <a:latin typeface="Times New Roman" panose="02020603050405020304" pitchFamily="18" charset="0"/>
+                <a:ea typeface="Calibri" panose="020F0502020204030204" pitchFamily="34" charset="0"/>
+                <a:cs typeface="Times New Roman" panose="02020603050405020304" pitchFamily="18" charset="0"/>
+              </a:rPr>
+            </a:br>
+            <a:r>
+              <a:rPr kumimoji="0" lang="en-US" altLang="en-US" sz="1200" b="0" i="0" u="none" strike="noStrike" cap="none" normalizeH="0" baseline="0" dirty="0">
+                <a:ln>
+                  <a:noFill/>
+                </a:ln>
+                <a:solidFill>
+                  <a:schemeClr val="tx1"/>
+                </a:solidFill>
+                <a:effectLst/>
+                <a:latin typeface="Times New Roman" panose="02020603050405020304" pitchFamily="18" charset="0"/>
+                <a:ea typeface="Calibri" panose="020F0502020204030204" pitchFamily="34" charset="0"/>
+                <a:cs typeface="Times New Roman" panose="02020603050405020304" pitchFamily="18" charset="0"/>
+              </a:rPr>
+              <a:t>Retrieved from Microsoft Security Blog: https://www.microsoft.com/security/blog/2009/08/27/the-threats-to-our-products/</a:t>
+            </a:r>
+            <a:endParaRPr kumimoji="0" lang="en-US" altLang="en-US" sz="800" b="0" i="0" u="none" strike="noStrike" cap="none" normalizeH="0" baseline="0" dirty="0">
+              <a:ln>
+                <a:noFill/>
+              </a:ln>
+              <a:solidFill>
+                <a:schemeClr val="tx1"/>
+              </a:solidFill>
+              <a:effectLst/>
+            </a:endParaRPr>
+          </a:p>
+          <a:p>
+            <a:pPr marL="0" marR="0" lvl="0" indent="0" algn="l" defTabSz="914400" rtl="0" eaLnBrk="0" fontAlgn="base" latinLnBrk="0" hangingPunct="0">
+              <a:lnSpc>
+                <a:spcPct val="100000"/>
+              </a:lnSpc>
+              <a:spcBef>
+                <a:spcPct val="0"/>
+              </a:spcBef>
+              <a:spcAft>
+                <a:spcPct val="0"/>
+              </a:spcAft>
+              <a:buClrTx/>
+              <a:buSzTx/>
+              <a:buFontTx/>
+              <a:buNone/>
+              <a:tabLst/>
+            </a:pPr>
+            <a:r>
+              <a:rPr kumimoji="0" lang="en-US" altLang="en-US" sz="1200" b="0" i="0" u="none" strike="noStrike" cap="none" normalizeH="0" baseline="0" dirty="0">
+                <a:ln>
+                  <a:noFill/>
+                </a:ln>
+                <a:solidFill>
+                  <a:schemeClr val="tx1"/>
+                </a:solidFill>
+                <a:effectLst/>
+                <a:latin typeface="Times New Roman" panose="02020603050405020304" pitchFamily="18" charset="0"/>
+                <a:ea typeface="Calibri" panose="020F0502020204030204" pitchFamily="34" charset="0"/>
+                <a:cs typeface="Times New Roman" panose="02020603050405020304" pitchFamily="18" charset="0"/>
+              </a:rPr>
+              <a:t>Mickens. (2018, August 16th). </a:t>
+            </a:r>
+            <a:r>
+              <a:rPr kumimoji="0" lang="en-US" altLang="en-US" sz="1200" b="0" i="1" u="none" strike="noStrike" cap="none" normalizeH="0" baseline="0" dirty="0">
+                <a:ln>
+                  <a:noFill/>
+                </a:ln>
+                <a:solidFill>
+                  <a:schemeClr val="tx1"/>
+                </a:solidFill>
+                <a:effectLst/>
+                <a:latin typeface="Times New Roman" panose="02020603050405020304" pitchFamily="18" charset="0"/>
+                <a:ea typeface="Calibri" panose="020F0502020204030204" pitchFamily="34" charset="0"/>
+                <a:cs typeface="Times New Roman" panose="02020603050405020304" pitchFamily="18" charset="0"/>
+              </a:rPr>
+              <a:t>Why Do Keynote Speakers Keep Suggesting That Improving Security Is Possible?</a:t>
+            </a:r>
+            <a:r>
+              <a:rPr kumimoji="0" lang="en-US" altLang="en-US" sz="1200" b="0" i="0" u="none" strike="noStrike" cap="none" normalizeH="0" baseline="0" dirty="0">
+                <a:ln>
+                  <a:noFill/>
+                </a:ln>
+                <a:solidFill>
+                  <a:schemeClr val="tx1"/>
+                </a:solidFill>
+                <a:effectLst/>
+                <a:latin typeface="Times New Roman" panose="02020603050405020304" pitchFamily="18" charset="0"/>
+                <a:ea typeface="Calibri" panose="020F0502020204030204" pitchFamily="34" charset="0"/>
+                <a:cs typeface="Times New Roman" panose="02020603050405020304" pitchFamily="18" charset="0"/>
+              </a:rPr>
+              <a:t> </a:t>
+            </a:r>
+            <a:br>
+              <a:rPr kumimoji="0" lang="en-US" altLang="en-US" sz="1200" b="0" i="0" u="none" strike="noStrike" cap="none" normalizeH="0" baseline="0" dirty="0">
+                <a:ln>
+                  <a:noFill/>
+                </a:ln>
+                <a:solidFill>
+                  <a:schemeClr val="tx1"/>
+                </a:solidFill>
+                <a:effectLst/>
+                <a:latin typeface="Times New Roman" panose="02020603050405020304" pitchFamily="18" charset="0"/>
+                <a:ea typeface="Calibri" panose="020F0502020204030204" pitchFamily="34" charset="0"/>
+                <a:cs typeface="Times New Roman" panose="02020603050405020304" pitchFamily="18" charset="0"/>
+              </a:rPr>
+            </a:br>
+            <a:r>
+              <a:rPr kumimoji="0" lang="en-US" altLang="en-US" sz="1200" b="0" i="0" u="none" strike="noStrike" cap="none" normalizeH="0" baseline="0" dirty="0">
+                <a:ln>
+                  <a:noFill/>
+                </a:ln>
+                <a:solidFill>
+                  <a:schemeClr val="tx1"/>
+                </a:solidFill>
+                <a:effectLst/>
+                <a:latin typeface="Times New Roman" panose="02020603050405020304" pitchFamily="18" charset="0"/>
+                <a:ea typeface="Calibri" panose="020F0502020204030204" pitchFamily="34" charset="0"/>
+                <a:cs typeface="Times New Roman" panose="02020603050405020304" pitchFamily="18" charset="0"/>
+              </a:rPr>
+              <a:t>Retrieved from YouTube: https://www.youtube.com/watch?v=ajGX7odA87k</a:t>
+            </a:r>
+            <a:endParaRPr kumimoji="0" lang="en-US" altLang="en-US" sz="800" b="0" i="0" u="none" strike="noStrike" cap="none" normalizeH="0" baseline="0" dirty="0">
+              <a:ln>
+                <a:noFill/>
+              </a:ln>
+              <a:solidFill>
+                <a:schemeClr val="tx1"/>
+              </a:solidFill>
+              <a:effectLst/>
+            </a:endParaRPr>
+          </a:p>
+          <a:p>
+            <a:pPr marL="0" marR="0" lvl="0" indent="0" algn="l" defTabSz="914400" rtl="0" eaLnBrk="0" fontAlgn="base" latinLnBrk="0" hangingPunct="0">
+              <a:lnSpc>
+                <a:spcPct val="100000"/>
+              </a:lnSpc>
+              <a:spcBef>
+                <a:spcPct val="0"/>
+              </a:spcBef>
+              <a:spcAft>
+                <a:spcPct val="0"/>
+              </a:spcAft>
+              <a:buClrTx/>
+              <a:buSzTx/>
+              <a:buFontTx/>
+              <a:buNone/>
+              <a:tabLst/>
+            </a:pPr>
+            <a:r>
+              <a:rPr kumimoji="0" lang="en-US" altLang="en-US" sz="1200" b="0" i="0" u="none" strike="noStrike" cap="none" normalizeH="0" baseline="0" dirty="0">
+                <a:ln>
+                  <a:noFill/>
+                </a:ln>
+                <a:solidFill>
+                  <a:schemeClr val="tx1"/>
+                </a:solidFill>
+                <a:effectLst/>
+                <a:latin typeface="Times New Roman" panose="02020603050405020304" pitchFamily="18" charset="0"/>
+                <a:ea typeface="Calibri" panose="020F0502020204030204" pitchFamily="34" charset="0"/>
+                <a:cs typeface="Times New Roman" panose="02020603050405020304" pitchFamily="18" charset="0"/>
+              </a:rPr>
+              <a:t>Mickens, J. (2015, September 9th). </a:t>
+            </a:r>
+            <a:r>
+              <a:rPr kumimoji="0" lang="en-US" altLang="en-US" sz="1200" b="0" i="1" u="none" strike="noStrike" cap="none" normalizeH="0" baseline="0" dirty="0">
+                <a:ln>
+                  <a:noFill/>
+                </a:ln>
+                <a:solidFill>
+                  <a:schemeClr val="tx1"/>
+                </a:solidFill>
+                <a:effectLst/>
+                <a:latin typeface="Times New Roman" panose="02020603050405020304" pitchFamily="18" charset="0"/>
+                <a:ea typeface="Calibri" panose="020F0502020204030204" pitchFamily="34" charset="0"/>
+                <a:cs typeface="Times New Roman" panose="02020603050405020304" pitchFamily="18" charset="0"/>
+              </a:rPr>
+              <a:t>Not Even Close, The State of Computer Security with Slides</a:t>
+            </a:r>
+            <a:r>
+              <a:rPr kumimoji="0" lang="en-US" altLang="en-US" sz="1200" b="0" i="0" u="none" strike="noStrike" cap="none" normalizeH="0" baseline="0" dirty="0">
+                <a:ln>
+                  <a:noFill/>
+                </a:ln>
+                <a:solidFill>
+                  <a:schemeClr val="tx1"/>
+                </a:solidFill>
+                <a:effectLst/>
+                <a:latin typeface="Times New Roman" panose="02020603050405020304" pitchFamily="18" charset="0"/>
+                <a:ea typeface="Calibri" panose="020F0502020204030204" pitchFamily="34" charset="0"/>
+                <a:cs typeface="Times New Roman" panose="02020603050405020304" pitchFamily="18" charset="0"/>
+              </a:rPr>
+              <a:t>. Retrieved from YouTube: https://youtu.be/tF24WHumvIc</a:t>
+            </a:r>
+            <a:endParaRPr kumimoji="0" lang="en-US" altLang="en-US" sz="800" b="0" i="0" u="none" strike="noStrike" cap="none" normalizeH="0" baseline="0" dirty="0">
+              <a:ln>
+                <a:noFill/>
+              </a:ln>
+              <a:solidFill>
+                <a:schemeClr val="tx1"/>
+              </a:solidFill>
+              <a:effectLst/>
+            </a:endParaRPr>
+          </a:p>
+          <a:p>
+            <a:pPr marL="0" marR="0" lvl="0" indent="0" algn="l" defTabSz="914400" rtl="0" eaLnBrk="0" fontAlgn="base" latinLnBrk="0" hangingPunct="0">
+              <a:lnSpc>
+                <a:spcPct val="100000"/>
+              </a:lnSpc>
+              <a:spcBef>
+                <a:spcPct val="0"/>
+              </a:spcBef>
+              <a:spcAft>
+                <a:spcPct val="0"/>
+              </a:spcAft>
+              <a:buClrTx/>
+              <a:buSzTx/>
+              <a:buFontTx/>
+              <a:buNone/>
+              <a:tabLst/>
+            </a:pPr>
+            <a:r>
+              <a:rPr kumimoji="0" lang="en-US" altLang="en-US" sz="1200" b="0" i="0" u="none" strike="noStrike" cap="none" normalizeH="0" baseline="0" dirty="0" err="1">
+                <a:ln>
+                  <a:noFill/>
+                </a:ln>
+                <a:solidFill>
+                  <a:schemeClr val="tx1"/>
+                </a:solidFill>
+                <a:effectLst/>
+                <a:latin typeface="Times New Roman" panose="02020603050405020304" pitchFamily="18" charset="0"/>
+                <a:ea typeface="Calibri" panose="020F0502020204030204" pitchFamily="34" charset="0"/>
+                <a:cs typeface="Times New Roman" panose="02020603050405020304" pitchFamily="18" charset="0"/>
+              </a:rPr>
+              <a:t>Paller</a:t>
+            </a:r>
+            <a:r>
+              <a:rPr kumimoji="0" lang="en-US" altLang="en-US" sz="1200" b="0" i="0" u="none" strike="noStrike" cap="none" normalizeH="0" baseline="0" dirty="0">
+                <a:ln>
+                  <a:noFill/>
+                </a:ln>
+                <a:solidFill>
+                  <a:schemeClr val="tx1"/>
+                </a:solidFill>
+                <a:effectLst/>
+                <a:latin typeface="Times New Roman" panose="02020603050405020304" pitchFamily="18" charset="0"/>
+                <a:ea typeface="Calibri" panose="020F0502020204030204" pitchFamily="34" charset="0"/>
+                <a:cs typeface="Times New Roman" panose="02020603050405020304" pitchFamily="18" charset="0"/>
+              </a:rPr>
+              <a:t> et al. (2019, March 7th). The Five Most Dangerous New Attack Techniques and How to Counter Them. </a:t>
+            </a:r>
+            <a:r>
+              <a:rPr kumimoji="0" lang="en-US" altLang="en-US" sz="1200" b="0" i="1" u="none" strike="noStrike" cap="none" normalizeH="0" baseline="0" dirty="0">
+                <a:ln>
+                  <a:noFill/>
+                </a:ln>
+                <a:solidFill>
+                  <a:schemeClr val="tx1"/>
+                </a:solidFill>
+                <a:effectLst/>
+                <a:latin typeface="Times New Roman" panose="02020603050405020304" pitchFamily="18" charset="0"/>
+                <a:ea typeface="Calibri" panose="020F0502020204030204" pitchFamily="34" charset="0"/>
+                <a:cs typeface="Times New Roman" panose="02020603050405020304" pitchFamily="18" charset="0"/>
+              </a:rPr>
+              <a:t>RSA Conference.</a:t>
+            </a:r>
+            <a:r>
+              <a:rPr kumimoji="0" lang="en-US" altLang="en-US" sz="1200" b="0" i="0" u="none" strike="noStrike" cap="none" normalizeH="0" baseline="0" dirty="0">
+                <a:ln>
+                  <a:noFill/>
+                </a:ln>
+                <a:solidFill>
+                  <a:schemeClr val="tx1"/>
+                </a:solidFill>
+                <a:effectLst/>
+                <a:latin typeface="Times New Roman" panose="02020603050405020304" pitchFamily="18" charset="0"/>
+                <a:ea typeface="Calibri" panose="020F0502020204030204" pitchFamily="34" charset="0"/>
+                <a:cs typeface="Times New Roman" panose="02020603050405020304" pitchFamily="18" charset="0"/>
+              </a:rPr>
+              <a:t> Retrieved from YouTube.</a:t>
+            </a:r>
+            <a:endParaRPr kumimoji="0" lang="en-US" altLang="en-US" sz="800" b="0" i="0" u="none" strike="noStrike" cap="none" normalizeH="0" baseline="0" dirty="0">
+              <a:ln>
+                <a:noFill/>
+              </a:ln>
+              <a:solidFill>
+                <a:schemeClr val="tx1"/>
+              </a:solidFill>
+              <a:effectLst/>
+            </a:endParaRPr>
+          </a:p>
+          <a:p>
+            <a:pPr marL="0" marR="0" lvl="0" indent="0" algn="l" defTabSz="914400" rtl="0" eaLnBrk="0" fontAlgn="base" latinLnBrk="0" hangingPunct="0">
+              <a:lnSpc>
+                <a:spcPct val="100000"/>
+              </a:lnSpc>
+              <a:spcBef>
+                <a:spcPct val="0"/>
+              </a:spcBef>
+              <a:spcAft>
+                <a:spcPct val="0"/>
+              </a:spcAft>
+              <a:buClrTx/>
+              <a:buSzTx/>
+              <a:buFontTx/>
+              <a:buNone/>
+              <a:tabLst/>
+            </a:pPr>
+            <a:r>
+              <a:rPr kumimoji="0" lang="en-US" altLang="en-US" sz="1200" b="0" i="0" u="none" strike="noStrike" cap="none" normalizeH="0" baseline="0" dirty="0">
+                <a:ln>
+                  <a:noFill/>
+                </a:ln>
+                <a:solidFill>
+                  <a:schemeClr val="tx1"/>
+                </a:solidFill>
+                <a:effectLst/>
+                <a:latin typeface="Times New Roman" panose="02020603050405020304" pitchFamily="18" charset="0"/>
+                <a:ea typeface="Calibri" panose="020F0502020204030204" pitchFamily="34" charset="0"/>
+                <a:cs typeface="Times New Roman" panose="02020603050405020304" pitchFamily="18" charset="0"/>
+              </a:rPr>
+              <a:t>Proctor, R., &amp; J, C. (2015). The Role of Human Factors/Ergonomics in the Science of Security: Decision Making and Action Selection in Cyberspace. </a:t>
+            </a:r>
+            <a:br>
+              <a:rPr kumimoji="0" lang="en-US" altLang="en-US" sz="1200" b="0" i="0" u="none" strike="noStrike" cap="none" normalizeH="0" baseline="0" dirty="0">
+                <a:ln>
+                  <a:noFill/>
+                </a:ln>
+                <a:solidFill>
+                  <a:schemeClr val="tx1"/>
+                </a:solidFill>
+                <a:effectLst/>
+                <a:latin typeface="Times New Roman" panose="02020603050405020304" pitchFamily="18" charset="0"/>
+                <a:ea typeface="Calibri" panose="020F0502020204030204" pitchFamily="34" charset="0"/>
+                <a:cs typeface="Times New Roman" panose="02020603050405020304" pitchFamily="18" charset="0"/>
+              </a:rPr>
+            </a:br>
+            <a:r>
+              <a:rPr kumimoji="0" lang="en-US" altLang="en-US" sz="1200" b="0" i="1" u="none" strike="noStrike" cap="none" normalizeH="0" baseline="0" dirty="0">
+                <a:ln>
+                  <a:noFill/>
+                </a:ln>
+                <a:solidFill>
+                  <a:schemeClr val="tx1"/>
+                </a:solidFill>
+                <a:effectLst/>
+                <a:latin typeface="Times New Roman" panose="02020603050405020304" pitchFamily="18" charset="0"/>
+                <a:ea typeface="Calibri" panose="020F0502020204030204" pitchFamily="34" charset="0"/>
+                <a:cs typeface="Times New Roman" panose="02020603050405020304" pitchFamily="18" charset="0"/>
+              </a:rPr>
+              <a:t>Human Factors Aug; Vol. 57 (5)</a:t>
+            </a:r>
+            <a:r>
+              <a:rPr kumimoji="0" lang="en-US" altLang="en-US" sz="1200" b="0" i="0" u="none" strike="noStrike" cap="none" normalizeH="0" baseline="0" dirty="0">
+                <a:ln>
+                  <a:noFill/>
+                </a:ln>
+                <a:solidFill>
+                  <a:schemeClr val="tx1"/>
+                </a:solidFill>
+                <a:effectLst/>
+                <a:latin typeface="Times New Roman" panose="02020603050405020304" pitchFamily="18" charset="0"/>
+                <a:ea typeface="Calibri" panose="020F0502020204030204" pitchFamily="34" charset="0"/>
+                <a:cs typeface="Times New Roman" panose="02020603050405020304" pitchFamily="18" charset="0"/>
+              </a:rPr>
+              <a:t>, 721-727.</a:t>
+            </a:r>
+            <a:endParaRPr kumimoji="0" lang="en-US" altLang="en-US" sz="800" b="0" i="0" u="none" strike="noStrike" cap="none" normalizeH="0" baseline="0" dirty="0">
+              <a:ln>
+                <a:noFill/>
+              </a:ln>
+              <a:solidFill>
+                <a:schemeClr val="tx1"/>
+              </a:solidFill>
+              <a:effectLst/>
+            </a:endParaRPr>
+          </a:p>
+          <a:p>
+            <a:pPr marL="0" marR="0" lvl="0" indent="0" algn="l" defTabSz="914400" rtl="0" eaLnBrk="0" fontAlgn="base" latinLnBrk="0" hangingPunct="0">
+              <a:lnSpc>
+                <a:spcPct val="100000"/>
+              </a:lnSpc>
+              <a:spcBef>
+                <a:spcPct val="0"/>
+              </a:spcBef>
+              <a:spcAft>
+                <a:spcPct val="0"/>
+              </a:spcAft>
+              <a:buClrTx/>
+              <a:buSzTx/>
+              <a:buFontTx/>
+              <a:buNone/>
+              <a:tabLst/>
+            </a:pPr>
+            <a:r>
+              <a:rPr kumimoji="0" lang="en-US" altLang="en-US" sz="1200" b="0" i="0" u="none" strike="noStrike" cap="none" normalizeH="0" baseline="0" dirty="0" err="1">
+                <a:ln>
+                  <a:noFill/>
+                </a:ln>
+                <a:solidFill>
+                  <a:schemeClr val="tx1"/>
+                </a:solidFill>
+                <a:effectLst/>
+                <a:latin typeface="Times New Roman" panose="02020603050405020304" pitchFamily="18" charset="0"/>
+                <a:ea typeface="Calibri" panose="020F0502020204030204" pitchFamily="34" charset="0"/>
+                <a:cs typeface="Times New Roman" panose="02020603050405020304" pitchFamily="18" charset="0"/>
+              </a:rPr>
+              <a:t>Valiente</a:t>
+            </a:r>
+            <a:r>
+              <a:rPr kumimoji="0" lang="en-US" altLang="en-US" sz="1200" b="0" i="0" u="none" strike="noStrike" cap="none" normalizeH="0" baseline="0" dirty="0">
+                <a:ln>
+                  <a:noFill/>
+                </a:ln>
+                <a:solidFill>
+                  <a:schemeClr val="tx1"/>
+                </a:solidFill>
+                <a:effectLst/>
+                <a:latin typeface="Times New Roman" panose="02020603050405020304" pitchFamily="18" charset="0"/>
+                <a:ea typeface="Calibri" panose="020F0502020204030204" pitchFamily="34" charset="0"/>
+                <a:cs typeface="Times New Roman" panose="02020603050405020304" pitchFamily="18" charset="0"/>
+              </a:rPr>
+              <a:t>, C. (2017). Addressing Malware WITH Cybersecurity Awareness. </a:t>
+            </a:r>
+            <a:r>
+              <a:rPr kumimoji="0" lang="en-US" altLang="en-US" sz="1200" b="0" i="1" u="none" strike="noStrike" cap="none" normalizeH="0" baseline="0" dirty="0">
+                <a:ln>
+                  <a:noFill/>
+                </a:ln>
+                <a:solidFill>
+                  <a:schemeClr val="tx1"/>
+                </a:solidFill>
+                <a:effectLst/>
+                <a:latin typeface="Times New Roman" panose="02020603050405020304" pitchFamily="18" charset="0"/>
+                <a:ea typeface="Calibri" panose="020F0502020204030204" pitchFamily="34" charset="0"/>
+                <a:cs typeface="Times New Roman" panose="02020603050405020304" pitchFamily="18" charset="0"/>
+              </a:rPr>
+              <a:t>ISSA Journal. Oct, Vol. 15, Issue 10</a:t>
+            </a:r>
+            <a:r>
+              <a:rPr kumimoji="0" lang="en-US" altLang="en-US" sz="1200" b="0" i="0" u="none" strike="noStrike" cap="none" normalizeH="0" baseline="0" dirty="0">
+                <a:ln>
+                  <a:noFill/>
+                </a:ln>
+                <a:solidFill>
+                  <a:schemeClr val="tx1"/>
+                </a:solidFill>
+                <a:effectLst/>
+                <a:latin typeface="Times New Roman" panose="02020603050405020304" pitchFamily="18" charset="0"/>
+                <a:ea typeface="Calibri" panose="020F0502020204030204" pitchFamily="34" charset="0"/>
+                <a:cs typeface="Times New Roman" panose="02020603050405020304" pitchFamily="18" charset="0"/>
+              </a:rPr>
+              <a:t>, 16-22.</a:t>
+            </a:r>
+            <a:endParaRPr kumimoji="0" lang="en-US" altLang="en-US" sz="800" b="0" i="0" u="none" strike="noStrike" cap="none" normalizeH="0" baseline="0" dirty="0">
+              <a:ln>
+                <a:noFill/>
+              </a:ln>
+              <a:solidFill>
+                <a:schemeClr val="tx1"/>
+              </a:solidFill>
+              <a:effectLst/>
+            </a:endParaRPr>
+          </a:p>
+          <a:p>
+            <a:pPr marL="0" marR="0" lvl="0" indent="0" algn="l" defTabSz="914400" rtl="0" eaLnBrk="0" fontAlgn="base" latinLnBrk="0" hangingPunct="0">
+              <a:lnSpc>
+                <a:spcPct val="100000"/>
+              </a:lnSpc>
+              <a:spcBef>
+                <a:spcPct val="0"/>
+              </a:spcBef>
+              <a:spcAft>
+                <a:spcPct val="0"/>
+              </a:spcAft>
+              <a:buClrTx/>
+              <a:buSzTx/>
+              <a:buFontTx/>
+              <a:buNone/>
+              <a:tabLst/>
+            </a:pPr>
+            <a:r>
+              <a:rPr kumimoji="0" lang="en-US" altLang="en-US" sz="1200" b="0" i="0" u="none" strike="noStrike" cap="none" normalizeH="0" baseline="0" dirty="0">
+                <a:ln>
+                  <a:noFill/>
+                </a:ln>
+                <a:solidFill>
+                  <a:schemeClr val="tx1"/>
+                </a:solidFill>
+                <a:effectLst/>
+                <a:latin typeface="Times New Roman" panose="02020603050405020304" pitchFamily="18" charset="0"/>
+                <a:ea typeface="Calibri" panose="020F0502020204030204" pitchFamily="34" charset="0"/>
+                <a:cs typeface="Times New Roman" panose="02020603050405020304" pitchFamily="18" charset="0"/>
+              </a:rPr>
+              <a:t>Whitty et al. (2015). Individual differences in cybersecurity behaviors: an examination of who is sharing passwords. </a:t>
+            </a:r>
+            <a:br>
+              <a:rPr kumimoji="0" lang="en-US" altLang="en-US" sz="1200" b="0" i="0" u="none" strike="noStrike" cap="none" normalizeH="0" baseline="0" dirty="0">
+                <a:ln>
+                  <a:noFill/>
+                </a:ln>
+                <a:solidFill>
+                  <a:schemeClr val="tx1"/>
+                </a:solidFill>
+                <a:effectLst/>
+                <a:latin typeface="Times New Roman" panose="02020603050405020304" pitchFamily="18" charset="0"/>
+                <a:ea typeface="Calibri" panose="020F0502020204030204" pitchFamily="34" charset="0"/>
+                <a:cs typeface="Times New Roman" panose="02020603050405020304" pitchFamily="18" charset="0"/>
+              </a:rPr>
+            </a:br>
+            <a:r>
+              <a:rPr kumimoji="0" lang="en-US" altLang="en-US" sz="1200" b="0" i="1" u="none" strike="noStrike" cap="none" normalizeH="0" baseline="0" dirty="0">
+                <a:ln>
+                  <a:noFill/>
+                </a:ln>
+                <a:solidFill>
+                  <a:schemeClr val="tx1"/>
+                </a:solidFill>
+                <a:effectLst/>
+                <a:latin typeface="Times New Roman" panose="02020603050405020304" pitchFamily="18" charset="0"/>
+                <a:ea typeface="Calibri" panose="020F0502020204030204" pitchFamily="34" charset="0"/>
+                <a:cs typeface="Times New Roman" panose="02020603050405020304" pitchFamily="18" charset="0"/>
+              </a:rPr>
+              <a:t>Cyberpsychology, Behavior And Social Networking Jan; Vol. 18 (1)</a:t>
+            </a:r>
+            <a:r>
+              <a:rPr kumimoji="0" lang="en-US" altLang="en-US" sz="1200" b="0" i="0" u="none" strike="noStrike" cap="none" normalizeH="0" baseline="0" dirty="0">
+                <a:ln>
+                  <a:noFill/>
+                </a:ln>
+                <a:solidFill>
+                  <a:schemeClr val="tx1"/>
+                </a:solidFill>
+                <a:effectLst/>
+                <a:latin typeface="Times New Roman" panose="02020603050405020304" pitchFamily="18" charset="0"/>
+                <a:ea typeface="Calibri" panose="020F0502020204030204" pitchFamily="34" charset="0"/>
+                <a:cs typeface="Times New Roman" panose="02020603050405020304" pitchFamily="18" charset="0"/>
+              </a:rPr>
+              <a:t>, 3-7.</a:t>
+            </a:r>
+            <a:endParaRPr kumimoji="0" lang="en-US" altLang="en-US" sz="800" b="0" i="0" u="none" strike="noStrike" cap="none" normalizeH="0" baseline="0" dirty="0">
+              <a:ln>
+                <a:noFill/>
+              </a:ln>
+              <a:solidFill>
+                <a:schemeClr val="tx1"/>
+              </a:solidFill>
+              <a:effectLst/>
+            </a:endParaRPr>
+          </a:p>
+          <a:p>
+            <a:pPr marL="0" marR="0" lvl="0" indent="0" algn="l" defTabSz="914400" rtl="0" eaLnBrk="0" fontAlgn="base" latinLnBrk="0" hangingPunct="0">
+              <a:lnSpc>
+                <a:spcPct val="100000"/>
+              </a:lnSpc>
+              <a:spcBef>
+                <a:spcPct val="0"/>
+              </a:spcBef>
+              <a:spcAft>
+                <a:spcPct val="0"/>
+              </a:spcAft>
+              <a:buClrTx/>
+              <a:buSzTx/>
+              <a:buFontTx/>
+              <a:buNone/>
+              <a:tabLst/>
+            </a:pPr>
+            <a:endParaRPr kumimoji="0" lang="en-US" altLang="en-US" sz="1800" b="0" i="0" u="none" strike="noStrike" cap="none" normalizeH="0" baseline="0" dirty="0">
+              <a:ln>
+                <a:noFill/>
+              </a:ln>
+              <a:solidFill>
+                <a:schemeClr val="tx1"/>
+              </a:solidFill>
+              <a:effectLst/>
+              <a:latin typeface="Arial" panose="020B0604020202020204" pitchFamily="34" charset="0"/>
+            </a:endParaRPr>
           </a:p>
         </p:txBody>
       </p:sp>

</xml_diff>